<commit_message>
Final phase slide about 60%
</commit_message>
<xml_diff>
--- a/slide/D17CQAT01_PhanDai_N17DCAT013.pptx
+++ b/slide/D17CQAT01_PhanDai_N17DCAT013.pptx
@@ -10,10 +10,10 @@
   <p:sldIdLst>
     <p:sldId id="256" r:id="rId2"/>
     <p:sldId id="257" r:id="rId3"/>
-    <p:sldId id="263" r:id="rId4"/>
-    <p:sldId id="261" r:id="rId5"/>
-    <p:sldId id="260" r:id="rId6"/>
-    <p:sldId id="264" r:id="rId7"/>
+    <p:sldId id="261" r:id="rId4"/>
+    <p:sldId id="260" r:id="rId5"/>
+    <p:sldId id="264" r:id="rId6"/>
+    <p:sldId id="266" r:id="rId7"/>
     <p:sldId id="265" r:id="rId8"/>
     <p:sldId id="262" r:id="rId9"/>
     <p:sldId id="259" r:id="rId10"/>
@@ -206,7 +206,7 @@
           <a:p>
             <a:fld id="{4D90CDED-DED5-4950-8D8A-00FFCAA83A1B}" type="datetimeFigureOut">
               <a:rPr lang="en-US" smtClean="0"/>
-              <a:t>12/7/2021</a:t>
+              <a:t>12/8/2021</a:t>
             </a:fld>
             <a:endParaRPr lang="en-US"/>
           </a:p>
@@ -877,7 +877,7 @@
           <a:p>
             <a:fld id="{9CC9E0FF-7D19-4510-9DCE-23D201D9E916}" type="datetime1">
               <a:rPr lang="en-US" smtClean="0"/>
-              <a:t>12/7/2021</a:t>
+              <a:t>12/8/2021</a:t>
             </a:fld>
             <a:endParaRPr lang="en-US"/>
           </a:p>
@@ -1056,7 +1056,7 @@
           <a:p>
             <a:fld id="{02BE6C0D-AE79-4D98-BA3B-E3751AE5331F}" type="datetime1">
               <a:rPr lang="en-US" smtClean="0"/>
-              <a:t>12/7/2021</a:t>
+              <a:t>12/8/2021</a:t>
             </a:fld>
             <a:endParaRPr lang="en-US"/>
           </a:p>
@@ -1236,7 +1236,7 @@
           <a:p>
             <a:fld id="{64794B53-B5A7-48E6-89FC-70BEF208D151}" type="datetime1">
               <a:rPr lang="en-US" smtClean="0"/>
-              <a:t>12/7/2021</a:t>
+              <a:t>12/8/2021</a:t>
             </a:fld>
             <a:endParaRPr lang="en-US"/>
           </a:p>
@@ -1406,7 +1406,7 @@
           <a:p>
             <a:fld id="{E4F4B884-B57B-462C-B739-9A72F1ADE961}" type="datetime1">
               <a:rPr lang="en-US" smtClean="0"/>
-              <a:t>12/7/2021</a:t>
+              <a:t>12/8/2021</a:t>
             </a:fld>
             <a:endParaRPr lang="en-US"/>
           </a:p>
@@ -1719,7 +1719,7 @@
           <a:p>
             <a:fld id="{B9C8D748-A08B-490E-87AA-BC3835B708B2}" type="datetime1">
               <a:rPr lang="en-US" smtClean="0"/>
-              <a:t>12/7/2021</a:t>
+              <a:t>12/8/2021</a:t>
             </a:fld>
             <a:endParaRPr lang="en-US"/>
           </a:p>
@@ -2105,7 +2105,7 @@
           <a:p>
             <a:fld id="{0FCBCAE6-D603-4735-B4B0-803AAA3FEC04}" type="datetime1">
               <a:rPr lang="en-US" smtClean="0"/>
-              <a:t>12/7/2021</a:t>
+              <a:t>12/8/2021</a:t>
             </a:fld>
             <a:endParaRPr lang="en-US"/>
           </a:p>
@@ -2539,7 +2539,7 @@
           <a:p>
             <a:fld id="{17C15CAB-E48F-495C-92CD-4CF2B2C1B0ED}" type="datetime1">
               <a:rPr lang="en-US" smtClean="0"/>
-              <a:t>12/7/2021</a:t>
+              <a:t>12/8/2021</a:t>
             </a:fld>
             <a:endParaRPr lang="en-US"/>
           </a:p>
@@ -2657,7 +2657,7 @@
           <a:p>
             <a:fld id="{5302AA14-F259-4723-9AF0-36DE127C0145}" type="datetime1">
               <a:rPr lang="en-US" smtClean="0"/>
-              <a:t>12/7/2021</a:t>
+              <a:t>12/8/2021</a:t>
             </a:fld>
             <a:endParaRPr lang="en-US"/>
           </a:p>
@@ -2752,7 +2752,7 @@
           <a:p>
             <a:fld id="{C9349F59-A2E8-4E73-9F17-B6C9798F4358}" type="datetime1">
               <a:rPr lang="en-US" smtClean="0"/>
-              <a:t>12/7/2021</a:t>
+              <a:t>12/8/2021</a:t>
             </a:fld>
             <a:endParaRPr lang="en-US"/>
           </a:p>
@@ -3102,7 +3102,7 @@
           <a:p>
             <a:fld id="{44F06C92-CE98-4B24-91B3-57666E0FED09}" type="datetime1">
               <a:rPr lang="en-US" smtClean="0"/>
-              <a:t>12/7/2021</a:t>
+              <a:t>12/8/2021</a:t>
             </a:fld>
             <a:endParaRPr lang="en-US"/>
           </a:p>
@@ -3527,7 +3527,7 @@
           <a:p>
             <a:fld id="{15CAC543-8889-4E95-B4AC-6EDFB98064E3}" type="datetime1">
               <a:rPr lang="en-US" smtClean="0"/>
-              <a:t>12/7/2021</a:t>
+              <a:t>12/8/2021</a:t>
             </a:fld>
             <a:endParaRPr lang="en-US"/>
           </a:p>
@@ -3808,7 +3808,7 @@
           <a:p>
             <a:fld id="{BDFF3CA4-504F-4AB7-961C-755BCE655230}" type="datetime1">
               <a:rPr lang="en-US" smtClean="0"/>
-              <a:t>12/7/2021</a:t>
+              <a:t>12/8/2021</a:t>
             </a:fld>
             <a:endParaRPr lang="en-US"/>
           </a:p>
@@ -5270,13 +5270,6 @@
                 </a:rPr>
                 <a:t>YOU</a:t>
               </a:r>
-              <a:endParaRPr lang="en-US" sz="7500" i="1" dirty="0">
-                <a:solidFill>
-                  <a:srgbClr val="A61A1D"/>
-                </a:solidFill>
-                <a:latin typeface="Roboto Black" panose="02000000000000000000" pitchFamily="2" charset="0"/>
-                <a:ea typeface="Roboto Black" panose="02000000000000000000" pitchFamily="2" charset="0"/>
-              </a:endParaRPr>
             </a:p>
           </p:txBody>
         </p:sp>
@@ -5447,7 +5440,7 @@
         </p:nvSpPr>
         <p:spPr>
           <a:xfrm>
-            <a:off x="1069848" y="484632"/>
+            <a:off x="1069848" y="445596"/>
             <a:ext cx="10058400" cy="677418"/>
           </a:xfrm>
         </p:spPr>
@@ -5458,15 +5451,15 @@
           <a:lstStyle/>
           <a:p>
             <a:r>
-              <a:rPr lang="en-US" sz="4000" dirty="0" smtClean="0">
-                <a:latin typeface="Arial" panose="020B0604020202020204" pitchFamily="34" charset="0"/>
-                <a:cs typeface="Arial" panose="020B0604020202020204" pitchFamily="34" charset="0"/>
+              <a:rPr lang="en-US" sz="4000" b="1" dirty="0" smtClean="0">
+                <a:latin typeface="Times New Roman" panose="02020603050405020304" pitchFamily="18" charset="0"/>
+                <a:cs typeface="Times New Roman" panose="02020603050405020304" pitchFamily="18" charset="0"/>
               </a:rPr>
               <a:t>Mục tiêu đạt được</a:t>
             </a:r>
-            <a:endParaRPr lang="en-US" sz="4000" dirty="0">
-              <a:latin typeface="Arial" panose="020B0604020202020204" pitchFamily="34" charset="0"/>
-              <a:cs typeface="Arial" panose="020B0604020202020204" pitchFamily="34" charset="0"/>
+            <a:endParaRPr lang="en-US" sz="4000" b="1" dirty="0">
+              <a:latin typeface="Times New Roman" panose="02020603050405020304" pitchFamily="18" charset="0"/>
+              <a:cs typeface="Times New Roman" panose="02020603050405020304" pitchFamily="18" charset="0"/>
             </a:endParaRPr>
           </a:p>
         </p:txBody>
@@ -5491,6 +5484,467 @@
               <a:t>2</a:t>
             </a:r>
             <a:endParaRPr lang="en-US" dirty="0"/>
+          </a:p>
+        </p:txBody>
+      </p:sp>
+      <p:sp>
+        <p:nvSpPr>
+          <p:cNvPr id="3" name="TextBox 2"/>
+          <p:cNvSpPr txBox="1"/>
+          <p:nvPr/>
+        </p:nvSpPr>
+        <p:spPr>
+          <a:xfrm>
+            <a:off x="1069848" y="1283516"/>
+            <a:ext cx="10058400" cy="2877711"/>
+          </a:xfrm>
+          <a:prstGeom prst="rect">
+            <a:avLst/>
+          </a:prstGeom>
+          <a:noFill/>
+        </p:spPr>
+        <p:txBody>
+          <a:bodyPr wrap="square" rtlCol="0">
+            <a:spAutoFit/>
+          </a:bodyPr>
+          <a:lstStyle/>
+          <a:p>
+            <a:pPr>
+              <a:lnSpc>
+                <a:spcPct val="150000"/>
+              </a:lnSpc>
+              <a:spcBef>
+                <a:spcPts val="600"/>
+              </a:spcBef>
+            </a:pPr>
+            <a:r>
+              <a:rPr lang="en-US" sz="2400" b="1" dirty="0" smtClean="0">
+                <a:solidFill>
+                  <a:schemeClr val="accent2">
+                    <a:lumMod val="50000"/>
+                  </a:schemeClr>
+                </a:solidFill>
+                <a:latin typeface="Roboto" panose="02000000000000000000" pitchFamily="2" charset="0"/>
+                <a:ea typeface="Roboto" panose="02000000000000000000" pitchFamily="2" charset="0"/>
+                <a:cs typeface="Arial" panose="020B0604020202020204" pitchFamily="34" charset="0"/>
+              </a:rPr>
+              <a:t>VỀ LÝ THUYẾT</a:t>
+            </a:r>
+          </a:p>
+          <a:p>
+            <a:pPr>
+              <a:lnSpc>
+                <a:spcPct val="150000"/>
+              </a:lnSpc>
+              <a:spcBef>
+                <a:spcPts val="600"/>
+              </a:spcBef>
+            </a:pPr>
+            <a:r>
+              <a:rPr lang="en-US" sz="1600" dirty="0" smtClean="0">
+                <a:latin typeface="Arial" panose="020B0604020202020204" pitchFamily="34" charset="0"/>
+                <a:cs typeface="Arial" panose="020B0604020202020204" pitchFamily="34" charset="0"/>
+              </a:rPr>
+              <a:t>- </a:t>
+            </a:r>
+            <a:r>
+              <a:rPr lang="en-US" sz="1600" dirty="0">
+                <a:latin typeface="Arial" panose="020B0604020202020204" pitchFamily="34" charset="0"/>
+                <a:cs typeface="Arial" panose="020B0604020202020204" pitchFamily="34" charset="0"/>
+              </a:rPr>
+              <a:t>Tìm hiểu cơ chế hoạt động của DNS truyền thống</a:t>
+            </a:r>
+            <a:r>
+              <a:rPr lang="en-US" sz="1600" dirty="0" smtClean="0">
+                <a:latin typeface="Arial" panose="020B0604020202020204" pitchFamily="34" charset="0"/>
+                <a:cs typeface="Arial" panose="020B0604020202020204" pitchFamily="34" charset="0"/>
+              </a:rPr>
+              <a:t>.</a:t>
+            </a:r>
+            <a:r>
+              <a:rPr lang="en-US" sz="1600" u="dotted" dirty="0" smtClean="0">
+                <a:latin typeface="Arial" panose="020B0604020202020204" pitchFamily="34" charset="0"/>
+                <a:cs typeface="Arial" panose="020B0604020202020204" pitchFamily="34" charset="0"/>
+              </a:rPr>
+              <a:t>					      </a:t>
+            </a:r>
+            <a:r>
+              <a:rPr lang="en-US" sz="1600" dirty="0" smtClean="0">
+                <a:latin typeface="Arial" panose="020B0604020202020204" pitchFamily="34" charset="0"/>
+                <a:cs typeface="Arial" panose="020B0604020202020204" pitchFamily="34" charset="0"/>
+              </a:rPr>
+              <a:t>3</a:t>
+            </a:r>
+            <a:endParaRPr lang="en-US" sz="1600" dirty="0">
+              <a:latin typeface="Arial" panose="020B0604020202020204" pitchFamily="34" charset="0"/>
+              <a:cs typeface="Arial" panose="020B0604020202020204" pitchFamily="34" charset="0"/>
+            </a:endParaRPr>
+          </a:p>
+          <a:p>
+            <a:pPr>
+              <a:lnSpc>
+                <a:spcPct val="150000"/>
+              </a:lnSpc>
+              <a:spcBef>
+                <a:spcPts val="600"/>
+              </a:spcBef>
+            </a:pPr>
+            <a:r>
+              <a:rPr lang="en-US" sz="1600" dirty="0">
+                <a:latin typeface="Arial" panose="020B0604020202020204" pitchFamily="34" charset="0"/>
+                <a:cs typeface="Arial" panose="020B0604020202020204" pitchFamily="34" charset="0"/>
+              </a:rPr>
+              <a:t>- Tìm hiểu các ưu và nhược điểm của DNS truyền thống</a:t>
+            </a:r>
+            <a:r>
+              <a:rPr lang="en-US" sz="1600" dirty="0" smtClean="0">
+                <a:latin typeface="Arial" panose="020B0604020202020204" pitchFamily="34" charset="0"/>
+                <a:cs typeface="Arial" panose="020B0604020202020204" pitchFamily="34" charset="0"/>
+              </a:rPr>
+              <a:t>.</a:t>
+            </a:r>
+            <a:r>
+              <a:rPr lang="en-US" sz="1600" u="dotted" dirty="0">
+                <a:latin typeface="Arial" panose="020B0604020202020204" pitchFamily="34" charset="0"/>
+                <a:cs typeface="Arial" panose="020B0604020202020204" pitchFamily="34" charset="0"/>
+              </a:rPr>
+              <a:t> 					      </a:t>
+            </a:r>
+            <a:r>
+              <a:rPr lang="en-US" sz="1600" dirty="0" smtClean="0">
+                <a:latin typeface="Arial" panose="020B0604020202020204" pitchFamily="34" charset="0"/>
+                <a:cs typeface="Arial" panose="020B0604020202020204" pitchFamily="34" charset="0"/>
+              </a:rPr>
+              <a:t>4</a:t>
+            </a:r>
+            <a:endParaRPr lang="en-US" sz="1600" dirty="0">
+              <a:latin typeface="Arial" panose="020B0604020202020204" pitchFamily="34" charset="0"/>
+              <a:cs typeface="Arial" panose="020B0604020202020204" pitchFamily="34" charset="0"/>
+            </a:endParaRPr>
+          </a:p>
+          <a:p>
+            <a:pPr>
+              <a:lnSpc>
+                <a:spcPct val="150000"/>
+              </a:lnSpc>
+              <a:spcBef>
+                <a:spcPts val="600"/>
+              </a:spcBef>
+            </a:pPr>
+            <a:r>
+              <a:rPr lang="en-US" sz="1600" dirty="0">
+                <a:latin typeface="Arial" panose="020B0604020202020204" pitchFamily="34" charset="0"/>
+                <a:cs typeface="Arial" panose="020B0604020202020204" pitchFamily="34" charset="0"/>
+              </a:rPr>
+              <a:t>- Tìm hiểu tổng quan về công nghệ Blockchain và giao thức đồng thuận PoW, </a:t>
+            </a:r>
+            <a:r>
+              <a:rPr lang="en-US" sz="1600" dirty="0" smtClean="0">
+                <a:latin typeface="Arial" panose="020B0604020202020204" pitchFamily="34" charset="0"/>
+                <a:cs typeface="Arial" panose="020B0604020202020204" pitchFamily="34" charset="0"/>
+              </a:rPr>
+              <a:t>PoS</a:t>
+            </a:r>
+            <a:r>
+              <a:rPr lang="en-US" sz="1600" u="dotted" dirty="0">
+                <a:latin typeface="Arial" panose="020B0604020202020204" pitchFamily="34" charset="0"/>
+                <a:cs typeface="Arial" panose="020B0604020202020204" pitchFamily="34" charset="0"/>
+              </a:rPr>
+              <a:t>. 		      </a:t>
+            </a:r>
+            <a:r>
+              <a:rPr lang="en-US" sz="1600" dirty="0" smtClean="0">
+                <a:latin typeface="Arial" panose="020B0604020202020204" pitchFamily="34" charset="0"/>
+                <a:cs typeface="Arial" panose="020B0604020202020204" pitchFamily="34" charset="0"/>
+              </a:rPr>
+              <a:t>5</a:t>
+            </a:r>
+            <a:endParaRPr lang="en-US" sz="1600" dirty="0">
+              <a:latin typeface="Arial" panose="020B0604020202020204" pitchFamily="34" charset="0"/>
+              <a:cs typeface="Arial" panose="020B0604020202020204" pitchFamily="34" charset="0"/>
+            </a:endParaRPr>
+          </a:p>
+          <a:p>
+            <a:pPr>
+              <a:lnSpc>
+                <a:spcPct val="150000"/>
+              </a:lnSpc>
+              <a:spcBef>
+                <a:spcPts val="600"/>
+              </a:spcBef>
+            </a:pPr>
+            <a:r>
+              <a:rPr lang="en-US" sz="1600" dirty="0">
+                <a:latin typeface="Arial" panose="020B0604020202020204" pitchFamily="34" charset="0"/>
+                <a:cs typeface="Arial" panose="020B0604020202020204" pitchFamily="34" charset="0"/>
+              </a:rPr>
+              <a:t>- Một số phần mềm DNS dựa trên blockchain hiện có</a:t>
+            </a:r>
+            <a:r>
+              <a:rPr lang="en-US" sz="1600" u="dotted" dirty="0" smtClean="0">
+                <a:latin typeface="Arial" panose="020B0604020202020204" pitchFamily="34" charset="0"/>
+                <a:cs typeface="Arial" panose="020B0604020202020204" pitchFamily="34" charset="0"/>
+              </a:rPr>
+              <a:t>.</a:t>
+            </a:r>
+            <a:r>
+              <a:rPr lang="en-US" sz="1600" u="dotted" dirty="0">
+                <a:latin typeface="Arial" panose="020B0604020202020204" pitchFamily="34" charset="0"/>
+                <a:cs typeface="Arial" panose="020B0604020202020204" pitchFamily="34" charset="0"/>
+              </a:rPr>
+              <a:t> 	      </a:t>
+            </a:r>
+            <a:r>
+              <a:rPr lang="en-US" sz="1600" u="dotted" dirty="0" smtClean="0">
+                <a:latin typeface="Arial" panose="020B0604020202020204" pitchFamily="34" charset="0"/>
+                <a:cs typeface="Arial" panose="020B0604020202020204" pitchFamily="34" charset="0"/>
+              </a:rPr>
+              <a:t>				      </a:t>
+            </a:r>
+            <a:r>
+              <a:rPr lang="en-US" sz="1600" dirty="0" smtClean="0">
+                <a:latin typeface="Arial" panose="020B0604020202020204" pitchFamily="34" charset="0"/>
+                <a:cs typeface="Arial" panose="020B0604020202020204" pitchFamily="34" charset="0"/>
+              </a:rPr>
+              <a:t>3</a:t>
+            </a:r>
+            <a:endParaRPr lang="en-US" sz="1600" dirty="0">
+              <a:latin typeface="Arial" panose="020B0604020202020204" pitchFamily="34" charset="0"/>
+              <a:cs typeface="Arial" panose="020B0604020202020204" pitchFamily="34" charset="0"/>
+            </a:endParaRPr>
+          </a:p>
+          <a:p>
+            <a:pPr>
+              <a:lnSpc>
+                <a:spcPct val="150000"/>
+              </a:lnSpc>
+              <a:spcBef>
+                <a:spcPts val="600"/>
+              </a:spcBef>
+            </a:pPr>
+            <a:r>
+              <a:rPr lang="en-US" sz="1600" dirty="0">
+                <a:latin typeface="Arial" panose="020B0604020202020204" pitchFamily="34" charset="0"/>
+                <a:cs typeface="Arial" panose="020B0604020202020204" pitchFamily="34" charset="0"/>
+              </a:rPr>
+              <a:t>- Xây dựng cơ chế hoạt động của DNS dựa trên blockchain</a:t>
+            </a:r>
+            <a:r>
+              <a:rPr lang="en-US" sz="1600" u="dotted" dirty="0" smtClean="0">
+                <a:latin typeface="Arial" panose="020B0604020202020204" pitchFamily="34" charset="0"/>
+                <a:cs typeface="Arial" panose="020B0604020202020204" pitchFamily="34" charset="0"/>
+              </a:rPr>
+              <a:t>.</a:t>
+            </a:r>
+            <a:r>
+              <a:rPr lang="en-US" sz="1600" u="dotted" dirty="0">
+                <a:latin typeface="Arial" panose="020B0604020202020204" pitchFamily="34" charset="0"/>
+                <a:cs typeface="Arial" panose="020B0604020202020204" pitchFamily="34" charset="0"/>
+              </a:rPr>
+              <a:t> 	      </a:t>
+            </a:r>
+            <a:r>
+              <a:rPr lang="en-US" sz="1600" u="dotted" dirty="0" smtClean="0">
+                <a:latin typeface="Arial" panose="020B0604020202020204" pitchFamily="34" charset="0"/>
+                <a:cs typeface="Arial" panose="020B0604020202020204" pitchFamily="34" charset="0"/>
+              </a:rPr>
+              <a:t>				      </a:t>
+            </a:r>
+            <a:r>
+              <a:rPr lang="en-US" sz="1600" dirty="0" smtClean="0">
+                <a:latin typeface="Arial" panose="020B0604020202020204" pitchFamily="34" charset="0"/>
+                <a:cs typeface="Arial" panose="020B0604020202020204" pitchFamily="34" charset="0"/>
+              </a:rPr>
+              <a:t>3</a:t>
+            </a:r>
+            <a:endParaRPr lang="en-US" sz="1600" dirty="0">
+              <a:latin typeface="Arial" panose="020B0604020202020204" pitchFamily="34" charset="0"/>
+              <a:cs typeface="Arial" panose="020B0604020202020204" pitchFamily="34" charset="0"/>
+            </a:endParaRPr>
+          </a:p>
+        </p:txBody>
+      </p:sp>
+      <p:sp>
+        <p:nvSpPr>
+          <p:cNvPr id="5" name="TextBox 4"/>
+          <p:cNvSpPr txBox="1"/>
+          <p:nvPr/>
+        </p:nvSpPr>
+        <p:spPr>
+          <a:xfrm>
+            <a:off x="1069848" y="4321729"/>
+            <a:ext cx="10058400" cy="1538883"/>
+          </a:xfrm>
+          <a:prstGeom prst="rect">
+            <a:avLst/>
+          </a:prstGeom>
+          <a:noFill/>
+        </p:spPr>
+        <p:txBody>
+          <a:bodyPr wrap="square" rtlCol="0">
+            <a:spAutoFit/>
+          </a:bodyPr>
+          <a:lstStyle/>
+          <a:p>
+            <a:pPr>
+              <a:lnSpc>
+                <a:spcPct val="150000"/>
+              </a:lnSpc>
+              <a:spcBef>
+                <a:spcPts val="600"/>
+              </a:spcBef>
+            </a:pPr>
+            <a:r>
+              <a:rPr lang="en-US" sz="2400" b="1" dirty="0" smtClean="0">
+                <a:solidFill>
+                  <a:schemeClr val="accent2">
+                    <a:lumMod val="50000"/>
+                  </a:schemeClr>
+                </a:solidFill>
+                <a:latin typeface="Roboto" panose="02000000000000000000" pitchFamily="2" charset="0"/>
+                <a:ea typeface="Roboto" panose="02000000000000000000" pitchFamily="2" charset="0"/>
+                <a:cs typeface="Arial" panose="020B0604020202020204" pitchFamily="34" charset="0"/>
+              </a:rPr>
+              <a:t>VỀ THỰC HÀNH</a:t>
+            </a:r>
+          </a:p>
+          <a:p>
+            <a:pPr>
+              <a:lnSpc>
+                <a:spcPct val="150000"/>
+              </a:lnSpc>
+              <a:spcBef>
+                <a:spcPts val="600"/>
+              </a:spcBef>
+            </a:pPr>
+            <a:r>
+              <a:rPr lang="en-US" sz="1600" dirty="0" smtClean="0">
+                <a:latin typeface="Arial" panose="020B0604020202020204" pitchFamily="34" charset="0"/>
+                <a:cs typeface="Arial" panose="020B0604020202020204" pitchFamily="34" charset="0"/>
+              </a:rPr>
+              <a:t>- </a:t>
+            </a:r>
+            <a:r>
+              <a:rPr lang="en-US" sz="1600" dirty="0">
+                <a:latin typeface="Arial" panose="020B0604020202020204" pitchFamily="34" charset="0"/>
+                <a:cs typeface="Arial" panose="020B0604020202020204" pitchFamily="34" charset="0"/>
+              </a:rPr>
+              <a:t>Xây dựng một hệ và triển khai DNS trên một private blockchain với giao thức đồng thuận PoW</a:t>
+            </a:r>
+            <a:r>
+              <a:rPr lang="en-US" sz="1600" dirty="0" smtClean="0">
+                <a:latin typeface="Arial" panose="020B0604020202020204" pitchFamily="34" charset="0"/>
+                <a:cs typeface="Arial" panose="020B0604020202020204" pitchFamily="34" charset="0"/>
+              </a:rPr>
+              <a:t>.</a:t>
+            </a:r>
+            <a:r>
+              <a:rPr lang="en-US" sz="1600" u="dotted" dirty="0" smtClean="0">
+                <a:latin typeface="Arial" panose="020B0604020202020204" pitchFamily="34" charset="0"/>
+                <a:cs typeface="Arial" panose="020B0604020202020204" pitchFamily="34" charset="0"/>
+              </a:rPr>
+              <a:t>	       </a:t>
+            </a:r>
+            <a:r>
+              <a:rPr lang="en-US" sz="1600" dirty="0" smtClean="0">
+                <a:latin typeface="Arial" panose="020B0604020202020204" pitchFamily="34" charset="0"/>
+                <a:cs typeface="Arial" panose="020B0604020202020204" pitchFamily="34" charset="0"/>
+              </a:rPr>
+              <a:t>3</a:t>
+            </a:r>
+            <a:endParaRPr lang="en-US" sz="1600" dirty="0">
+              <a:latin typeface="Arial" panose="020B0604020202020204" pitchFamily="34" charset="0"/>
+              <a:cs typeface="Arial" panose="020B0604020202020204" pitchFamily="34" charset="0"/>
+            </a:endParaRPr>
+          </a:p>
+          <a:p>
+            <a:pPr>
+              <a:lnSpc>
+                <a:spcPct val="150000"/>
+              </a:lnSpc>
+              <a:spcBef>
+                <a:spcPts val="600"/>
+              </a:spcBef>
+            </a:pPr>
+            <a:r>
+              <a:rPr lang="en-US" sz="1600" dirty="0">
+                <a:latin typeface="Arial" panose="020B0604020202020204" pitchFamily="34" charset="0"/>
+                <a:cs typeface="Arial" panose="020B0604020202020204" pitchFamily="34" charset="0"/>
+              </a:rPr>
+              <a:t>- Xây dựng các kịch bản thử nghiệm cho giải pháp</a:t>
+            </a:r>
+            <a:r>
+              <a:rPr lang="en-US" sz="1600" dirty="0" smtClean="0">
+                <a:latin typeface="Arial" panose="020B0604020202020204" pitchFamily="34" charset="0"/>
+                <a:cs typeface="Arial" panose="020B0604020202020204" pitchFamily="34" charset="0"/>
+              </a:rPr>
+              <a:t>.</a:t>
+            </a:r>
+            <a:r>
+              <a:rPr lang="en-US" sz="1600" u="dotted" dirty="0" smtClean="0">
+                <a:latin typeface="Arial" panose="020B0604020202020204" pitchFamily="34" charset="0"/>
+                <a:cs typeface="Arial" panose="020B0604020202020204" pitchFamily="34" charset="0"/>
+              </a:rPr>
+              <a:t>					       </a:t>
+            </a:r>
+            <a:r>
+              <a:rPr lang="en-US" sz="1600" dirty="0" smtClean="0">
+                <a:latin typeface="Arial" panose="020B0604020202020204" pitchFamily="34" charset="0"/>
+                <a:cs typeface="Arial" panose="020B0604020202020204" pitchFamily="34" charset="0"/>
+              </a:rPr>
+              <a:t>3</a:t>
+            </a:r>
+            <a:endParaRPr lang="en-US" sz="1600" dirty="0">
+              <a:latin typeface="Arial" panose="020B0604020202020204" pitchFamily="34" charset="0"/>
+              <a:cs typeface="Arial" panose="020B0604020202020204" pitchFamily="34" charset="0"/>
+            </a:endParaRPr>
+          </a:p>
+        </p:txBody>
+      </p:sp>
+      <p:sp>
+        <p:nvSpPr>
+          <p:cNvPr id="7" name="Rectangle 6"/>
+          <p:cNvSpPr/>
+          <p:nvPr/>
+        </p:nvSpPr>
+        <p:spPr>
+          <a:xfrm>
+            <a:off x="0" y="0"/>
+            <a:ext cx="427839" cy="6858000"/>
+          </a:xfrm>
+          <a:prstGeom prst="rect">
+            <a:avLst/>
+          </a:prstGeom>
+          <a:solidFill>
+            <a:srgbClr val="AA2100"/>
+          </a:solidFill>
+        </p:spPr>
+        <p:style>
+          <a:lnRef idx="2">
+            <a:schemeClr val="accent1">
+              <a:shade val="50000"/>
+            </a:schemeClr>
+          </a:lnRef>
+          <a:fillRef idx="1">
+            <a:schemeClr val="accent1"/>
+          </a:fillRef>
+          <a:effectRef idx="0">
+            <a:schemeClr val="accent1"/>
+          </a:effectRef>
+          <a:fontRef idx="minor">
+            <a:schemeClr val="lt1"/>
+          </a:fontRef>
+        </p:style>
+        <p:txBody>
+          <a:bodyPr rtlCol="0" anchor="ctr"/>
+          <a:lstStyle/>
+          <a:p>
+            <a:pPr algn="ctr"/>
+            <a:endParaRPr lang="en-US">
+              <a:solidFill>
+                <a:srgbClr val="FF0000"/>
+              </a:solidFill>
+            </a:endParaRPr>
           </a:p>
         </p:txBody>
       </p:sp>
@@ -5507,9 +5961,273 @@
   <p:timing>
     <p:tnLst>
       <p:par>
-        <p:cTn id="1" dur="indefinite" restart="never" nodeType="tmRoot"/>
+        <p:cTn id="1" dur="indefinite" restart="never" nodeType="tmRoot">
+          <p:childTnLst>
+            <p:seq concurrent="1" nextAc="seek">
+              <p:cTn id="2" dur="indefinite" nodeType="mainSeq">
+                <p:childTnLst>
+                  <p:par>
+                    <p:cTn id="3" fill="hold">
+                      <p:stCondLst>
+                        <p:cond delay="indefinite"/>
+                        <p:cond evt="onBegin" delay="0">
+                          <p:tn val="2"/>
+                        </p:cond>
+                      </p:stCondLst>
+                      <p:childTnLst>
+                        <p:par>
+                          <p:cTn id="4" fill="hold">
+                            <p:stCondLst>
+                              <p:cond delay="0"/>
+                            </p:stCondLst>
+                            <p:childTnLst>
+                              <p:par>
+                                <p:cTn id="5" presetID="10" presetClass="entr" presetSubtype="0" fill="hold" grpId="0" nodeType="withEffect">
+                                  <p:stCondLst>
+                                    <p:cond delay="0"/>
+                                  </p:stCondLst>
+                                  <p:childTnLst>
+                                    <p:set>
+                                      <p:cBhvr>
+                                        <p:cTn id="6" dur="1" fill="hold">
+                                          <p:stCondLst>
+                                            <p:cond delay="0"/>
+                                          </p:stCondLst>
+                                        </p:cTn>
+                                        <p:tgtEl>
+                                          <p:spTgt spid="2"/>
+                                        </p:tgtEl>
+                                        <p:attrNameLst>
+                                          <p:attrName>style.visibility</p:attrName>
+                                        </p:attrNameLst>
+                                      </p:cBhvr>
+                                      <p:to>
+                                        <p:strVal val="visible"/>
+                                      </p:to>
+                                    </p:set>
+                                    <p:animEffect transition="in" filter="fade">
+                                      <p:cBhvr>
+                                        <p:cTn id="7" dur="500"/>
+                                        <p:tgtEl>
+                                          <p:spTgt spid="2"/>
+                                        </p:tgtEl>
+                                      </p:cBhvr>
+                                    </p:animEffect>
+                                  </p:childTnLst>
+                                </p:cTn>
+                              </p:par>
+                              <p:par>
+                                <p:cTn id="8" presetID="42" presetClass="entr" presetSubtype="0" fill="hold" grpId="0" nodeType="withEffect">
+                                  <p:stCondLst>
+                                    <p:cond delay="300"/>
+                                  </p:stCondLst>
+                                  <p:childTnLst>
+                                    <p:set>
+                                      <p:cBhvr>
+                                        <p:cTn id="9" dur="1" fill="hold">
+                                          <p:stCondLst>
+                                            <p:cond delay="0"/>
+                                          </p:stCondLst>
+                                        </p:cTn>
+                                        <p:tgtEl>
+                                          <p:spTgt spid="3"/>
+                                        </p:tgtEl>
+                                        <p:attrNameLst>
+                                          <p:attrName>style.visibility</p:attrName>
+                                        </p:attrNameLst>
+                                      </p:cBhvr>
+                                      <p:to>
+                                        <p:strVal val="visible"/>
+                                      </p:to>
+                                    </p:set>
+                                    <p:animEffect transition="in" filter="fade">
+                                      <p:cBhvr>
+                                        <p:cTn id="10" dur="800"/>
+                                        <p:tgtEl>
+                                          <p:spTgt spid="3"/>
+                                        </p:tgtEl>
+                                      </p:cBhvr>
+                                    </p:animEffect>
+                                    <p:anim calcmode="lin" valueType="num">
+                                      <p:cBhvr>
+                                        <p:cTn id="11" dur="800" fill="hold"/>
+                                        <p:tgtEl>
+                                          <p:spTgt spid="3"/>
+                                        </p:tgtEl>
+                                        <p:attrNameLst>
+                                          <p:attrName>ppt_x</p:attrName>
+                                        </p:attrNameLst>
+                                      </p:cBhvr>
+                                      <p:tavLst>
+                                        <p:tav tm="0">
+                                          <p:val>
+                                            <p:strVal val="#ppt_x"/>
+                                          </p:val>
+                                        </p:tav>
+                                        <p:tav tm="100000">
+                                          <p:val>
+                                            <p:strVal val="#ppt_x"/>
+                                          </p:val>
+                                        </p:tav>
+                                      </p:tavLst>
+                                    </p:anim>
+                                    <p:anim calcmode="lin" valueType="num">
+                                      <p:cBhvr>
+                                        <p:cTn id="12" dur="800" fill="hold"/>
+                                        <p:tgtEl>
+                                          <p:spTgt spid="3"/>
+                                        </p:tgtEl>
+                                        <p:attrNameLst>
+                                          <p:attrName>ppt_y</p:attrName>
+                                        </p:attrNameLst>
+                                      </p:cBhvr>
+                                      <p:tavLst>
+                                        <p:tav tm="0">
+                                          <p:val>
+                                            <p:strVal val="#ppt_y+.1"/>
+                                          </p:val>
+                                        </p:tav>
+                                        <p:tav tm="100000">
+                                          <p:val>
+                                            <p:strVal val="#ppt_y"/>
+                                          </p:val>
+                                        </p:tav>
+                                      </p:tavLst>
+                                    </p:anim>
+                                  </p:childTnLst>
+                                </p:cTn>
+                              </p:par>
+                            </p:childTnLst>
+                          </p:cTn>
+                        </p:par>
+                      </p:childTnLst>
+                    </p:cTn>
+                  </p:par>
+                  <p:par>
+                    <p:cTn id="13" fill="hold">
+                      <p:stCondLst>
+                        <p:cond delay="indefinite"/>
+                      </p:stCondLst>
+                      <p:childTnLst>
+                        <p:par>
+                          <p:cTn id="14" fill="hold">
+                            <p:stCondLst>
+                              <p:cond delay="0"/>
+                            </p:stCondLst>
+                            <p:childTnLst>
+                              <p:par>
+                                <p:cTn id="15" presetID="42" presetClass="entr" presetSubtype="0" fill="hold" grpId="0" nodeType="clickEffect">
+                                  <p:stCondLst>
+                                    <p:cond delay="0"/>
+                                  </p:stCondLst>
+                                  <p:childTnLst>
+                                    <p:set>
+                                      <p:cBhvr>
+                                        <p:cTn id="16" dur="1" fill="hold">
+                                          <p:stCondLst>
+                                            <p:cond delay="0"/>
+                                          </p:stCondLst>
+                                        </p:cTn>
+                                        <p:tgtEl>
+                                          <p:spTgt spid="5"/>
+                                        </p:tgtEl>
+                                        <p:attrNameLst>
+                                          <p:attrName>style.visibility</p:attrName>
+                                        </p:attrNameLst>
+                                      </p:cBhvr>
+                                      <p:to>
+                                        <p:strVal val="visible"/>
+                                      </p:to>
+                                    </p:set>
+                                    <p:animEffect transition="in" filter="fade">
+                                      <p:cBhvr>
+                                        <p:cTn id="17" dur="1000"/>
+                                        <p:tgtEl>
+                                          <p:spTgt spid="5"/>
+                                        </p:tgtEl>
+                                      </p:cBhvr>
+                                    </p:animEffect>
+                                    <p:anim calcmode="lin" valueType="num">
+                                      <p:cBhvr>
+                                        <p:cTn id="18" dur="1000" fill="hold"/>
+                                        <p:tgtEl>
+                                          <p:spTgt spid="5"/>
+                                        </p:tgtEl>
+                                        <p:attrNameLst>
+                                          <p:attrName>ppt_x</p:attrName>
+                                        </p:attrNameLst>
+                                      </p:cBhvr>
+                                      <p:tavLst>
+                                        <p:tav tm="0">
+                                          <p:val>
+                                            <p:strVal val="#ppt_x"/>
+                                          </p:val>
+                                        </p:tav>
+                                        <p:tav tm="100000">
+                                          <p:val>
+                                            <p:strVal val="#ppt_x"/>
+                                          </p:val>
+                                        </p:tav>
+                                      </p:tavLst>
+                                    </p:anim>
+                                    <p:anim calcmode="lin" valueType="num">
+                                      <p:cBhvr>
+                                        <p:cTn id="19" dur="1000" fill="hold"/>
+                                        <p:tgtEl>
+                                          <p:spTgt spid="5"/>
+                                        </p:tgtEl>
+                                        <p:attrNameLst>
+                                          <p:attrName>ppt_y</p:attrName>
+                                        </p:attrNameLst>
+                                      </p:cBhvr>
+                                      <p:tavLst>
+                                        <p:tav tm="0">
+                                          <p:val>
+                                            <p:strVal val="#ppt_y+.1"/>
+                                          </p:val>
+                                        </p:tav>
+                                        <p:tav tm="100000">
+                                          <p:val>
+                                            <p:strVal val="#ppt_y"/>
+                                          </p:val>
+                                        </p:tav>
+                                      </p:tavLst>
+                                    </p:anim>
+                                  </p:childTnLst>
+                                </p:cTn>
+                              </p:par>
+                            </p:childTnLst>
+                          </p:cTn>
+                        </p:par>
+                      </p:childTnLst>
+                    </p:cTn>
+                  </p:par>
+                </p:childTnLst>
+              </p:cTn>
+              <p:prevCondLst>
+                <p:cond evt="onPrev" delay="0">
+                  <p:tgtEl>
+                    <p:sldTgt/>
+                  </p:tgtEl>
+                </p:cond>
+              </p:prevCondLst>
+              <p:nextCondLst>
+                <p:cond evt="onNext" delay="0">
+                  <p:tgtEl>
+                    <p:sldTgt/>
+                  </p:tgtEl>
+                </p:cond>
+              </p:nextCondLst>
+            </p:seq>
+          </p:childTnLst>
+        </p:cTn>
       </p:par>
     </p:tnLst>
+    <p:bldLst>
+      <p:bldP spid="2" grpId="0"/>
+      <p:bldP spid="3" grpId="0"/>
+      <p:bldP spid="5" grpId="0"/>
+    </p:bldLst>
   </p:timing>
 </p:sld>
 </file>
@@ -5533,42 +6251,6 @@
       </p:grpSpPr>
       <p:sp>
         <p:nvSpPr>
-          <p:cNvPr id="2" name="Title 1"/>
-          <p:cNvSpPr>
-            <a:spLocks noGrp="1"/>
-          </p:cNvSpPr>
-          <p:nvPr>
-            <p:ph type="title"/>
-          </p:nvPr>
-        </p:nvSpPr>
-        <p:spPr>
-          <a:xfrm>
-            <a:off x="1069848" y="484632"/>
-            <a:ext cx="10058400" cy="677418"/>
-          </a:xfrm>
-        </p:spPr>
-        <p:txBody>
-          <a:bodyPr>
-            <a:normAutofit/>
-          </a:bodyPr>
-          <a:lstStyle/>
-          <a:p>
-            <a:r>
-              <a:rPr lang="en-US" sz="4000" dirty="0" smtClean="0">
-                <a:latin typeface="Arial" panose="020B0604020202020204" pitchFamily="34" charset="0"/>
-                <a:cs typeface="Arial" panose="020B0604020202020204" pitchFamily="34" charset="0"/>
-              </a:rPr>
-              <a:t>Mục lục</a:t>
-            </a:r>
-            <a:endParaRPr lang="en-US" sz="4000" dirty="0">
-              <a:latin typeface="Arial" panose="020B0604020202020204" pitchFamily="34" charset="0"/>
-              <a:cs typeface="Arial" panose="020B0604020202020204" pitchFamily="34" charset="0"/>
-            </a:endParaRPr>
-          </a:p>
-        </p:txBody>
-      </p:sp>
-      <p:sp>
-        <p:nvSpPr>
           <p:cNvPr id="6" name="Slide Number Placeholder 5"/>
           <p:cNvSpPr>
             <a:spLocks noGrp="1"/>
@@ -5584,16 +6266,894 @@
           <a:p>
             <a:r>
               <a:rPr lang="en-US" dirty="0" smtClean="0"/>
-              <a:t>2</a:t>
+              <a:t>3</a:t>
             </a:r>
             <a:endParaRPr lang="en-US" dirty="0"/>
           </a:p>
         </p:txBody>
       </p:sp>
+      <p:sp>
+        <p:nvSpPr>
+          <p:cNvPr id="7" name="Title 1"/>
+          <p:cNvSpPr>
+            <a:spLocks noGrp="1"/>
+          </p:cNvSpPr>
+          <p:nvPr>
+            <p:ph type="title"/>
+          </p:nvPr>
+        </p:nvSpPr>
+        <p:spPr>
+          <a:xfrm>
+            <a:off x="898956" y="311992"/>
+            <a:ext cx="7763797" cy="646331"/>
+          </a:xfrm>
+        </p:spPr>
+        <p:txBody>
+          <a:bodyPr wrap="square">
+            <a:spAutoFit/>
+          </a:bodyPr>
+          <a:lstStyle/>
+          <a:p>
+            <a:r>
+              <a:rPr lang="en-US" sz="4000" b="1" dirty="0" smtClean="0">
+                <a:latin typeface="Times New Roman" panose="02020603050405020304" pitchFamily="18" charset="0"/>
+                <a:cs typeface="Times New Roman" panose="02020603050405020304" pitchFamily="18" charset="0"/>
+              </a:rPr>
+              <a:t>DNS - DOMAIN NAME SYSTEM</a:t>
+            </a:r>
+            <a:endParaRPr lang="en-US" sz="4000" b="1" dirty="0">
+              <a:latin typeface="Times New Roman" panose="02020603050405020304" pitchFamily="18" charset="0"/>
+              <a:cs typeface="Times New Roman" panose="02020603050405020304" pitchFamily="18" charset="0"/>
+            </a:endParaRPr>
+          </a:p>
+        </p:txBody>
+      </p:sp>
+      <p:sp>
+        <p:nvSpPr>
+          <p:cNvPr id="8" name="Rectangle 7"/>
+          <p:cNvSpPr/>
+          <p:nvPr/>
+        </p:nvSpPr>
+        <p:spPr>
+          <a:xfrm>
+            <a:off x="0" y="0"/>
+            <a:ext cx="427839" cy="6858000"/>
+          </a:xfrm>
+          <a:prstGeom prst="rect">
+            <a:avLst/>
+          </a:prstGeom>
+          <a:solidFill>
+            <a:srgbClr val="AA2100"/>
+          </a:solidFill>
+        </p:spPr>
+        <p:style>
+          <a:lnRef idx="2">
+            <a:schemeClr val="accent1">
+              <a:shade val="50000"/>
+            </a:schemeClr>
+          </a:lnRef>
+          <a:fillRef idx="1">
+            <a:schemeClr val="accent1"/>
+          </a:fillRef>
+          <a:effectRef idx="0">
+            <a:schemeClr val="accent1"/>
+          </a:effectRef>
+          <a:fontRef idx="minor">
+            <a:schemeClr val="lt1"/>
+          </a:fontRef>
+        </p:style>
+        <p:txBody>
+          <a:bodyPr rtlCol="0" anchor="ctr"/>
+          <a:lstStyle/>
+          <a:p>
+            <a:pPr algn="ctr"/>
+            <a:endParaRPr lang="en-US">
+              <a:solidFill>
+                <a:srgbClr val="FF0000"/>
+              </a:solidFill>
+            </a:endParaRPr>
+          </a:p>
+        </p:txBody>
+      </p:sp>
+      <p:sp>
+        <p:nvSpPr>
+          <p:cNvPr id="43" name="TextBox 42"/>
+          <p:cNvSpPr txBox="1"/>
+          <p:nvPr/>
+        </p:nvSpPr>
+        <p:spPr>
+          <a:xfrm>
+            <a:off x="1089343" y="1064742"/>
+            <a:ext cx="6064481" cy="646331"/>
+          </a:xfrm>
+          <a:prstGeom prst="rect">
+            <a:avLst/>
+          </a:prstGeom>
+          <a:noFill/>
+        </p:spPr>
+        <p:txBody>
+          <a:bodyPr wrap="none" rtlCol="0">
+            <a:spAutoFit/>
+          </a:bodyPr>
+          <a:lstStyle/>
+          <a:p>
+            <a:pPr>
+              <a:lnSpc>
+                <a:spcPct val="150000"/>
+              </a:lnSpc>
+              <a:spcBef>
+                <a:spcPts val="600"/>
+              </a:spcBef>
+            </a:pPr>
+            <a:r>
+              <a:rPr lang="en-US" sz="2400" b="1" dirty="0" smtClean="0">
+                <a:solidFill>
+                  <a:schemeClr val="accent2">
+                    <a:lumMod val="50000"/>
+                  </a:schemeClr>
+                </a:solidFill>
+                <a:latin typeface="Roboto" panose="02000000000000000000" pitchFamily="2" charset="0"/>
+                <a:ea typeface="Roboto" panose="02000000000000000000" pitchFamily="2" charset="0"/>
+                <a:cs typeface="Arial" panose="020B0604020202020204" pitchFamily="34" charset="0"/>
+              </a:rPr>
+              <a:t>DNS </a:t>
+            </a:r>
+            <a:r>
+              <a:rPr lang="en-US" sz="2400" b="1" dirty="0">
+                <a:solidFill>
+                  <a:schemeClr val="accent2">
+                    <a:lumMod val="50000"/>
+                  </a:schemeClr>
+                </a:solidFill>
+                <a:latin typeface="Roboto" panose="02000000000000000000" pitchFamily="2" charset="0"/>
+                <a:ea typeface="Roboto" panose="02000000000000000000" pitchFamily="2" charset="0"/>
+                <a:cs typeface="Arial" panose="020B0604020202020204" pitchFamily="34" charset="0"/>
+              </a:rPr>
+              <a:t>truyền </a:t>
+            </a:r>
+            <a:r>
+              <a:rPr lang="en-US" sz="2400" b="1" dirty="0" smtClean="0">
+                <a:solidFill>
+                  <a:schemeClr val="accent2">
+                    <a:lumMod val="50000"/>
+                  </a:schemeClr>
+                </a:solidFill>
+                <a:latin typeface="Roboto" panose="02000000000000000000" pitchFamily="2" charset="0"/>
+                <a:ea typeface="Roboto" panose="02000000000000000000" pitchFamily="2" charset="0"/>
+                <a:cs typeface="Arial" panose="020B0604020202020204" pitchFamily="34" charset="0"/>
+              </a:rPr>
+              <a:t>thống hoạt động như thế nào ?</a:t>
+            </a:r>
+            <a:endParaRPr lang="en-US" sz="2400" b="1" dirty="0">
+              <a:solidFill>
+                <a:schemeClr val="accent2">
+                  <a:lumMod val="50000"/>
+                </a:schemeClr>
+              </a:solidFill>
+              <a:latin typeface="Roboto" panose="02000000000000000000" pitchFamily="2" charset="0"/>
+              <a:ea typeface="Roboto" panose="02000000000000000000" pitchFamily="2" charset="0"/>
+              <a:cs typeface="Arial" panose="020B0604020202020204" pitchFamily="34" charset="0"/>
+            </a:endParaRPr>
+          </a:p>
+        </p:txBody>
+      </p:sp>
+      <p:pic>
+        <p:nvPicPr>
+          <p:cNvPr id="44" name="Picture 43" descr="DNS - DNS on Blockchain - Nameshield"/>
+          <p:cNvPicPr/>
+          <p:nvPr/>
+        </p:nvPicPr>
+        <p:blipFill>
+          <a:blip r:embed="rId2">
+            <a:extLst>
+              <a:ext uri="{28A0092B-C50C-407E-A947-70E740481C1C}">
+                <a14:useLocalDpi xmlns:a14="http://schemas.microsoft.com/office/drawing/2010/main" val="0"/>
+              </a:ext>
+            </a:extLst>
+          </a:blip>
+          <a:srcRect/>
+          <a:stretch>
+            <a:fillRect/>
+          </a:stretch>
+        </p:blipFill>
+        <p:spPr>
+          <a:xfrm>
+            <a:off x="1089343" y="1987452"/>
+            <a:ext cx="5257609" cy="3312142"/>
+          </a:xfrm>
+          <a:prstGeom prst="rect">
+            <a:avLst/>
+          </a:prstGeom>
+          <a:noFill/>
+          <a:ln w="12700">
+            <a:solidFill>
+              <a:schemeClr val="tx1"/>
+            </a:solidFill>
+          </a:ln>
+        </p:spPr>
+      </p:pic>
+      <p:sp>
+        <p:nvSpPr>
+          <p:cNvPr id="46" name="TextBox 45"/>
+          <p:cNvSpPr txBox="1"/>
+          <p:nvPr/>
+        </p:nvSpPr>
+        <p:spPr>
+          <a:xfrm>
+            <a:off x="6534816" y="1878809"/>
+            <a:ext cx="5238982" cy="4335033"/>
+          </a:xfrm>
+          <a:prstGeom prst="rect">
+            <a:avLst/>
+          </a:prstGeom>
+          <a:noFill/>
+        </p:spPr>
+        <p:txBody>
+          <a:bodyPr wrap="square" rtlCol="0">
+            <a:spAutoFit/>
+          </a:bodyPr>
+          <a:lstStyle/>
+          <a:p>
+            <a:pPr lvl="0">
+              <a:lnSpc>
+                <a:spcPct val="114000"/>
+              </a:lnSpc>
+              <a:spcAft>
+                <a:spcPts val="600"/>
+              </a:spcAft>
+            </a:pPr>
+            <a:r>
+              <a:rPr lang="en-US" sz="1600" dirty="0" smtClean="0">
+                <a:latin typeface="Arial" panose="020B0604020202020204" pitchFamily="34" charset="0"/>
+                <a:cs typeface="Arial" panose="020B0604020202020204" pitchFamily="34" charset="0"/>
+              </a:rPr>
+              <a:t>Máy tính tìm kiếm tên </a:t>
+            </a:r>
+            <a:r>
+              <a:rPr lang="en-US" sz="1600" dirty="0">
+                <a:latin typeface="Arial" panose="020B0604020202020204" pitchFamily="34" charset="0"/>
+                <a:cs typeface="Arial" panose="020B0604020202020204" pitchFamily="34" charset="0"/>
+              </a:rPr>
+              <a:t>miền </a:t>
+            </a:r>
+            <a:r>
+              <a:rPr lang="en-US" sz="1600" i="1" dirty="0" smtClean="0">
+                <a:latin typeface="Arial" panose="020B0604020202020204" pitchFamily="34" charset="0"/>
+                <a:cs typeface="Arial" panose="020B0604020202020204" pitchFamily="34" charset="0"/>
+              </a:rPr>
+              <a:t>cryptoms.fr </a:t>
+            </a:r>
+          </a:p>
+          <a:p>
+            <a:pPr marL="342900" indent="-342900" algn="just">
+              <a:lnSpc>
+                <a:spcPct val="114000"/>
+              </a:lnSpc>
+              <a:spcAft>
+                <a:spcPts val="1200"/>
+              </a:spcAft>
+              <a:buFont typeface="+mj-lt"/>
+              <a:buAutoNum type="arabicParenR"/>
+            </a:pPr>
+            <a:r>
+              <a:rPr lang="en-US" sz="1400" dirty="0" smtClean="0">
+                <a:solidFill>
+                  <a:srgbClr val="002060"/>
+                </a:solidFill>
+                <a:latin typeface="Arial" panose="020B0604020202020204" pitchFamily="34" charset="0"/>
+                <a:cs typeface="Arial" panose="020B0604020202020204" pitchFamily="34" charset="0"/>
+              </a:rPr>
+              <a:t>Máy tính trước khi gửi đi,DNS resolver sẽ kiểm tra domain trong Web cache hoặc DNS cache để trả lại kết quả.</a:t>
+            </a:r>
+          </a:p>
+          <a:p>
+            <a:pPr marL="342900" lvl="0" indent="-342900" algn="just">
+              <a:lnSpc>
+                <a:spcPct val="114000"/>
+              </a:lnSpc>
+              <a:spcAft>
+                <a:spcPts val="1200"/>
+              </a:spcAft>
+              <a:buFont typeface="+mj-lt"/>
+              <a:buAutoNum type="arabicParenR"/>
+            </a:pPr>
+            <a:r>
+              <a:rPr lang="en-US" sz="1400" dirty="0" smtClean="0">
+                <a:solidFill>
+                  <a:srgbClr val="002060"/>
+                </a:solidFill>
+                <a:latin typeface="Arial" panose="020B0604020202020204" pitchFamily="34" charset="0"/>
+                <a:cs typeface="Arial" panose="020B0604020202020204" pitchFamily="34" charset="0"/>
+              </a:rPr>
+              <a:t>Nếu không có kết quả, DR sẽ hỏi tên miền mức ROOT chỉ cho máy chủ tên miền cục bộ địa chỉ mà nó quản lý có đuôi “.fr”. </a:t>
+            </a:r>
+          </a:p>
+          <a:p>
+            <a:pPr marL="342900" lvl="0" indent="-342900" algn="just">
+              <a:lnSpc>
+                <a:spcPct val="114000"/>
+              </a:lnSpc>
+              <a:spcAft>
+                <a:spcPts val="1200"/>
+              </a:spcAft>
+              <a:buFont typeface="+mj-lt"/>
+              <a:buAutoNum type="arabicParenR"/>
+            </a:pPr>
+            <a:r>
+              <a:rPr lang="en-US" sz="1400" dirty="0" smtClean="0">
+                <a:solidFill>
+                  <a:srgbClr val="002060"/>
+                </a:solidFill>
+                <a:latin typeface="Arial" panose="020B0604020202020204" pitchFamily="34" charset="0"/>
+                <a:cs typeface="Arial" panose="020B0604020202020204" pitchFamily="34" charset="0"/>
+              </a:rPr>
+              <a:t>DR </a:t>
+            </a:r>
+            <a:r>
+              <a:rPr lang="en-US" sz="1400" dirty="0">
+                <a:solidFill>
+                  <a:srgbClr val="002060"/>
+                </a:solidFill>
+                <a:latin typeface="Arial" panose="020B0604020202020204" pitchFamily="34" charset="0"/>
+                <a:cs typeface="Arial" panose="020B0604020202020204" pitchFamily="34" charset="0"/>
+              </a:rPr>
+              <a:t>gửi yêu cầu đến máy chủ quản lý tên miền Pháp “.fr” tìm tên miền cryptoms.fr. </a:t>
+            </a:r>
+          </a:p>
+          <a:p>
+            <a:pPr marL="342900" lvl="0" indent="-342900" algn="just">
+              <a:lnSpc>
+                <a:spcPct val="114000"/>
+              </a:lnSpc>
+              <a:spcAft>
+                <a:spcPts val="1200"/>
+              </a:spcAft>
+              <a:buFont typeface="+mj-lt"/>
+              <a:buAutoNum type="arabicParenR"/>
+            </a:pPr>
+            <a:r>
+              <a:rPr lang="en-US" sz="1400" dirty="0" smtClean="0">
+                <a:solidFill>
+                  <a:srgbClr val="002060"/>
+                </a:solidFill>
+                <a:latin typeface="Arial" panose="020B0604020202020204" pitchFamily="34" charset="0"/>
+                <a:cs typeface="Arial" panose="020B0604020202020204" pitchFamily="34" charset="0"/>
+              </a:rPr>
+              <a:t>DR </a:t>
+            </a:r>
+            <a:r>
+              <a:rPr lang="en-US" sz="1400" dirty="0">
+                <a:solidFill>
+                  <a:srgbClr val="002060"/>
+                </a:solidFill>
+                <a:latin typeface="Arial" panose="020B0604020202020204" pitchFamily="34" charset="0"/>
+                <a:cs typeface="Arial" panose="020B0604020202020204" pitchFamily="34" charset="0"/>
+              </a:rPr>
+              <a:t>sẽ hỏi máy chủ quản lý tên miền “.fr” địa chỉ IP của tên miền “cryptoms.fr” và gửi trả lại cho </a:t>
+            </a:r>
+            <a:r>
+              <a:rPr lang="en-US" sz="1400" dirty="0" smtClean="0">
+                <a:solidFill>
+                  <a:srgbClr val="002060"/>
+                </a:solidFill>
+                <a:latin typeface="Arial" panose="020B0604020202020204" pitchFamily="34" charset="0"/>
+                <a:cs typeface="Arial" panose="020B0604020202020204" pitchFamily="34" charset="0"/>
+              </a:rPr>
+              <a:t>DR, sau đó chuyển đến </a:t>
+            </a:r>
+            <a:r>
+              <a:rPr lang="en-US" sz="1400" dirty="0">
+                <a:solidFill>
+                  <a:srgbClr val="002060"/>
+                </a:solidFill>
+                <a:latin typeface="Arial" panose="020B0604020202020204" pitchFamily="34" charset="0"/>
+                <a:cs typeface="Arial" panose="020B0604020202020204" pitchFamily="34" charset="0"/>
+              </a:rPr>
+              <a:t>máy của người dùng. </a:t>
+            </a:r>
+            <a:endParaRPr lang="en-US" sz="1400" dirty="0" smtClean="0">
+              <a:solidFill>
+                <a:srgbClr val="002060"/>
+              </a:solidFill>
+              <a:latin typeface="Arial" panose="020B0604020202020204" pitchFamily="34" charset="0"/>
+              <a:cs typeface="Arial" panose="020B0604020202020204" pitchFamily="34" charset="0"/>
+            </a:endParaRPr>
+          </a:p>
+          <a:p>
+            <a:pPr algn="just">
+              <a:lnSpc>
+                <a:spcPct val="114000"/>
+              </a:lnSpc>
+              <a:spcAft>
+                <a:spcPts val="600"/>
+              </a:spcAft>
+            </a:pPr>
+            <a:r>
+              <a:rPr lang="en-US" sz="1400" b="1" dirty="0" smtClean="0">
+                <a:solidFill>
+                  <a:srgbClr val="002060"/>
+                </a:solidFill>
+                <a:latin typeface="Arial" panose="020B0604020202020204" pitchFamily="34" charset="0"/>
+                <a:cs typeface="Arial" panose="020B0604020202020204" pitchFamily="34" charset="0"/>
+              </a:rPr>
+              <a:t>Người </a:t>
+            </a:r>
+            <a:r>
+              <a:rPr lang="en-US" sz="1400" b="1" dirty="0">
+                <a:solidFill>
+                  <a:srgbClr val="002060"/>
+                </a:solidFill>
+                <a:latin typeface="Arial" panose="020B0604020202020204" pitchFamily="34" charset="0"/>
+                <a:cs typeface="Arial" panose="020B0604020202020204" pitchFamily="34" charset="0"/>
+              </a:rPr>
+              <a:t>dùng sử dụng địa chỉ IP này kết nối đến server chứa website có địa chỉ “cryptoms.fr”.</a:t>
+            </a:r>
+          </a:p>
+          <a:p>
+            <a:pPr marL="342900" lvl="0" indent="-342900" algn="just">
+              <a:lnSpc>
+                <a:spcPct val="114000"/>
+              </a:lnSpc>
+              <a:spcAft>
+                <a:spcPts val="600"/>
+              </a:spcAft>
+              <a:buFont typeface="+mj-lt"/>
+              <a:buAutoNum type="arabicParenR"/>
+            </a:pPr>
+            <a:endParaRPr lang="en-US" sz="1400" dirty="0" smtClean="0">
+              <a:solidFill>
+                <a:srgbClr val="002060"/>
+              </a:solidFill>
+              <a:latin typeface="Arial" panose="020B0604020202020204" pitchFamily="34" charset="0"/>
+              <a:cs typeface="Arial" panose="020B0604020202020204" pitchFamily="34" charset="0"/>
+            </a:endParaRPr>
+          </a:p>
+        </p:txBody>
+      </p:sp>
+      <p:sp>
+        <p:nvSpPr>
+          <p:cNvPr id="47" name="TextBox 46"/>
+          <p:cNvSpPr txBox="1"/>
+          <p:nvPr/>
+        </p:nvSpPr>
+        <p:spPr>
+          <a:xfrm>
+            <a:off x="7153824" y="6361062"/>
+            <a:ext cx="4334841" cy="276999"/>
+          </a:xfrm>
+          <a:prstGeom prst="rect">
+            <a:avLst/>
+          </a:prstGeom>
+          <a:noFill/>
+        </p:spPr>
+        <p:txBody>
+          <a:bodyPr wrap="none" rtlCol="0">
+            <a:spAutoFit/>
+          </a:bodyPr>
+          <a:lstStyle/>
+          <a:p>
+            <a:pPr lvl="0"/>
+            <a:r>
+              <a:rPr lang="en-US" sz="1200" dirty="0" smtClean="0"/>
+              <a:t>* DNS </a:t>
+            </a:r>
+            <a:r>
+              <a:rPr lang="en-US" sz="1200" dirty="0"/>
+              <a:t>resolver – DR – Máy chủ phân giải tên miền cục bộ </a:t>
+            </a:r>
+          </a:p>
+        </p:txBody>
+      </p:sp>
+      <p:grpSp>
+        <p:nvGrpSpPr>
+          <p:cNvPr id="65" name="Group 64"/>
+          <p:cNvGrpSpPr/>
+          <p:nvPr/>
+        </p:nvGrpSpPr>
+        <p:grpSpPr>
+          <a:xfrm>
+            <a:off x="8387112" y="283957"/>
+            <a:ext cx="3386686" cy="1427116"/>
+            <a:chOff x="7134329" y="1186348"/>
+            <a:chExt cx="3386686" cy="1427116"/>
+          </a:xfrm>
+        </p:grpSpPr>
+        <p:grpSp>
+          <p:nvGrpSpPr>
+            <p:cNvPr id="55" name="Group 54"/>
+            <p:cNvGrpSpPr/>
+            <p:nvPr/>
+          </p:nvGrpSpPr>
+          <p:grpSpPr>
+            <a:xfrm>
+              <a:off x="7134329" y="1892225"/>
+              <a:ext cx="3386686" cy="721239"/>
+              <a:chOff x="6799292" y="1802892"/>
+              <a:chExt cx="3386686" cy="721239"/>
+            </a:xfrm>
+          </p:grpSpPr>
+          <p:pic>
+            <p:nvPicPr>
+              <p:cNvPr id="48" name="Picture 47"/>
+              <p:cNvPicPr>
+                <a:picLocks noChangeAspect="1"/>
+              </p:cNvPicPr>
+              <p:nvPr/>
+            </p:nvPicPr>
+            <p:blipFill>
+              <a:blip r:embed="rId3"/>
+              <a:stretch>
+                <a:fillRect/>
+              </a:stretch>
+            </p:blipFill>
+            <p:spPr>
+              <a:xfrm>
+                <a:off x="6799292" y="1802892"/>
+                <a:ext cx="3386686" cy="721239"/>
+              </a:xfrm>
+              <a:prstGeom prst="rect">
+                <a:avLst/>
+              </a:prstGeom>
+              <a:ln w="12700">
+                <a:solidFill>
+                  <a:schemeClr val="tx1"/>
+                </a:solidFill>
+              </a:ln>
+            </p:spPr>
+          </p:pic>
+          <p:sp>
+            <p:nvSpPr>
+              <p:cNvPr id="49" name="Rectangle 48"/>
+              <p:cNvSpPr/>
+              <p:nvPr/>
+            </p:nvSpPr>
+            <p:spPr>
+              <a:xfrm>
+                <a:off x="8602133" y="1905000"/>
+                <a:ext cx="778933" cy="203200"/>
+              </a:xfrm>
+              <a:prstGeom prst="rect">
+                <a:avLst/>
+              </a:prstGeom>
+              <a:noFill/>
+              <a:ln w="19050"/>
+            </p:spPr>
+            <p:style>
+              <a:lnRef idx="2">
+                <a:schemeClr val="accent1">
+                  <a:shade val="50000"/>
+                </a:schemeClr>
+              </a:lnRef>
+              <a:fillRef idx="1">
+                <a:schemeClr val="accent1"/>
+              </a:fillRef>
+              <a:effectRef idx="0">
+                <a:schemeClr val="accent1"/>
+              </a:effectRef>
+              <a:fontRef idx="minor">
+                <a:schemeClr val="lt1"/>
+              </a:fontRef>
+            </p:style>
+            <p:txBody>
+              <a:bodyPr rtlCol="0" anchor="ctr"/>
+              <a:lstStyle/>
+              <a:p>
+                <a:pPr algn="ctr"/>
+                <a:endParaRPr lang="en-US"/>
+              </a:p>
+            </p:txBody>
+          </p:sp>
+          <p:sp>
+            <p:nvSpPr>
+              <p:cNvPr id="50" name="Rectangle 49"/>
+              <p:cNvSpPr/>
+              <p:nvPr/>
+            </p:nvSpPr>
+            <p:spPr>
+              <a:xfrm>
+                <a:off x="7823200" y="1905000"/>
+                <a:ext cx="778933" cy="203200"/>
+              </a:xfrm>
+              <a:prstGeom prst="rect">
+                <a:avLst/>
+              </a:prstGeom>
+              <a:noFill/>
+              <a:ln w="19050"/>
+            </p:spPr>
+            <p:style>
+              <a:lnRef idx="2">
+                <a:schemeClr val="accent1">
+                  <a:shade val="50000"/>
+                </a:schemeClr>
+              </a:lnRef>
+              <a:fillRef idx="1">
+                <a:schemeClr val="accent1"/>
+              </a:fillRef>
+              <a:effectRef idx="0">
+                <a:schemeClr val="accent1"/>
+              </a:effectRef>
+              <a:fontRef idx="minor">
+                <a:schemeClr val="lt1"/>
+              </a:fontRef>
+            </p:style>
+            <p:txBody>
+              <a:bodyPr rtlCol="0" anchor="ctr"/>
+              <a:lstStyle/>
+              <a:p>
+                <a:pPr algn="ctr"/>
+                <a:endParaRPr lang="en-US"/>
+              </a:p>
+            </p:txBody>
+          </p:sp>
+          <p:sp>
+            <p:nvSpPr>
+              <p:cNvPr id="51" name="Rectangle 50"/>
+              <p:cNvSpPr/>
+              <p:nvPr/>
+            </p:nvSpPr>
+            <p:spPr>
+              <a:xfrm>
+                <a:off x="7044267" y="1905000"/>
+                <a:ext cx="778933" cy="203200"/>
+              </a:xfrm>
+              <a:prstGeom prst="rect">
+                <a:avLst/>
+              </a:prstGeom>
+              <a:noFill/>
+              <a:ln w="19050"/>
+            </p:spPr>
+            <p:style>
+              <a:lnRef idx="2">
+                <a:schemeClr val="accent1">
+                  <a:shade val="50000"/>
+                </a:schemeClr>
+              </a:lnRef>
+              <a:fillRef idx="1">
+                <a:schemeClr val="accent1"/>
+              </a:fillRef>
+              <a:effectRef idx="0">
+                <a:schemeClr val="accent1"/>
+              </a:effectRef>
+              <a:fontRef idx="minor">
+                <a:schemeClr val="lt1"/>
+              </a:fontRef>
+            </p:style>
+            <p:txBody>
+              <a:bodyPr rtlCol="0" anchor="ctr"/>
+              <a:lstStyle/>
+              <a:p>
+                <a:pPr algn="ctr"/>
+                <a:endParaRPr lang="en-US"/>
+              </a:p>
+            </p:txBody>
+          </p:sp>
+        </p:grpSp>
+        <p:cxnSp>
+          <p:nvCxnSpPr>
+            <p:cNvPr id="53" name="Straight Connector 52"/>
+            <p:cNvCxnSpPr/>
+            <p:nvPr/>
+          </p:nvCxnSpPr>
+          <p:spPr>
+            <a:xfrm flipH="1" flipV="1">
+              <a:off x="8729132" y="1494125"/>
+              <a:ext cx="1" cy="471486"/>
+            </a:xfrm>
+            <a:prstGeom prst="line">
+              <a:avLst/>
+            </a:prstGeom>
+            <a:ln w="12700"/>
+          </p:spPr>
+          <p:style>
+            <a:lnRef idx="1">
+              <a:schemeClr val="accent1"/>
+            </a:lnRef>
+            <a:fillRef idx="0">
+              <a:schemeClr val="accent1"/>
+            </a:fillRef>
+            <a:effectRef idx="0">
+              <a:schemeClr val="accent1"/>
+            </a:effectRef>
+            <a:fontRef idx="minor">
+              <a:schemeClr val="tx1"/>
+            </a:fontRef>
+          </p:style>
+        </p:cxnSp>
+        <p:cxnSp>
+          <p:nvCxnSpPr>
+            <p:cNvPr id="54" name="Straight Connector 53"/>
+            <p:cNvCxnSpPr>
+              <a:stCxn id="49" idx="0"/>
+            </p:cNvCxnSpPr>
+            <p:nvPr/>
+          </p:nvCxnSpPr>
+          <p:spPr>
+            <a:xfrm flipH="1" flipV="1">
+              <a:off x="9326635" y="1679388"/>
+              <a:ext cx="2" cy="314945"/>
+            </a:xfrm>
+            <a:prstGeom prst="line">
+              <a:avLst/>
+            </a:prstGeom>
+            <a:ln w="12700"/>
+          </p:spPr>
+          <p:style>
+            <a:lnRef idx="1">
+              <a:schemeClr val="accent1"/>
+            </a:lnRef>
+            <a:fillRef idx="0">
+              <a:schemeClr val="accent1"/>
+            </a:fillRef>
+            <a:effectRef idx="0">
+              <a:schemeClr val="accent1"/>
+            </a:effectRef>
+            <a:fontRef idx="minor">
+              <a:schemeClr val="tx1"/>
+            </a:fontRef>
+          </p:style>
+        </p:cxnSp>
+        <p:cxnSp>
+          <p:nvCxnSpPr>
+            <p:cNvPr id="56" name="Straight Connector 55"/>
+            <p:cNvCxnSpPr/>
+            <p:nvPr/>
+          </p:nvCxnSpPr>
+          <p:spPr>
+            <a:xfrm flipH="1" flipV="1">
+              <a:off x="8022445" y="1683564"/>
+              <a:ext cx="1" cy="295632"/>
+            </a:xfrm>
+            <a:prstGeom prst="line">
+              <a:avLst/>
+            </a:prstGeom>
+            <a:ln w="12700"/>
+          </p:spPr>
+          <p:style>
+            <a:lnRef idx="1">
+              <a:schemeClr val="accent1"/>
+            </a:lnRef>
+            <a:fillRef idx="0">
+              <a:schemeClr val="accent1"/>
+            </a:fillRef>
+            <a:effectRef idx="0">
+              <a:schemeClr val="accent1"/>
+            </a:effectRef>
+            <a:fontRef idx="minor">
+              <a:schemeClr val="tx1"/>
+            </a:fontRef>
+          </p:style>
+        </p:cxnSp>
+        <p:sp>
+          <p:nvSpPr>
+            <p:cNvPr id="62" name="TextBox 61"/>
+            <p:cNvSpPr txBox="1"/>
+            <p:nvPr/>
+          </p:nvSpPr>
+          <p:spPr>
+            <a:xfrm>
+              <a:off x="8348346" y="1186348"/>
+              <a:ext cx="742424" cy="307777"/>
+            </a:xfrm>
+            <a:prstGeom prst="rect">
+              <a:avLst/>
+            </a:prstGeom>
+            <a:noFill/>
+          </p:spPr>
+          <p:txBody>
+            <a:bodyPr wrap="square" rtlCol="0">
+              <a:spAutoFit/>
+            </a:bodyPr>
+            <a:lstStyle/>
+            <a:p>
+              <a:r>
+                <a:rPr lang="en-US" sz="1400" dirty="0" smtClean="0">
+                  <a:solidFill>
+                    <a:srgbClr val="A61A1D"/>
+                  </a:solidFill>
+                  <a:latin typeface="Times New Roman" panose="02020603050405020304" pitchFamily="18" charset="0"/>
+                  <a:cs typeface="Times New Roman" panose="02020603050405020304" pitchFamily="18" charset="0"/>
+                </a:rPr>
+                <a:t>domain</a:t>
+              </a:r>
+              <a:endParaRPr lang="en-US" sz="1400" dirty="0">
+                <a:solidFill>
+                  <a:srgbClr val="A61A1D"/>
+                </a:solidFill>
+                <a:latin typeface="Times New Roman" panose="02020603050405020304" pitchFamily="18" charset="0"/>
+                <a:cs typeface="Times New Roman" panose="02020603050405020304" pitchFamily="18" charset="0"/>
+              </a:endParaRPr>
+            </a:p>
+          </p:txBody>
+        </p:sp>
+        <p:sp>
+          <p:nvSpPr>
+            <p:cNvPr id="63" name="TextBox 62"/>
+            <p:cNvSpPr txBox="1"/>
+            <p:nvPr/>
+          </p:nvSpPr>
+          <p:spPr>
+            <a:xfrm>
+              <a:off x="9079612" y="1347398"/>
+              <a:ext cx="494046" cy="307777"/>
+            </a:xfrm>
+            <a:prstGeom prst="rect">
+              <a:avLst/>
+            </a:prstGeom>
+            <a:noFill/>
+          </p:spPr>
+          <p:txBody>
+            <a:bodyPr wrap="none" rtlCol="0">
+              <a:spAutoFit/>
+            </a:bodyPr>
+            <a:lstStyle/>
+            <a:p>
+              <a:r>
+                <a:rPr lang="en-US" sz="1400" dirty="0" smtClean="0">
+                  <a:solidFill>
+                    <a:srgbClr val="A61A1D"/>
+                  </a:solidFill>
+                  <a:latin typeface="Times New Roman" panose="02020603050405020304" pitchFamily="18" charset="0"/>
+                  <a:cs typeface="Times New Roman" panose="02020603050405020304" pitchFamily="18" charset="0"/>
+                </a:rPr>
+                <a:t>path</a:t>
+              </a:r>
+              <a:endParaRPr lang="en-US" sz="1400" dirty="0">
+                <a:solidFill>
+                  <a:srgbClr val="A61A1D"/>
+                </a:solidFill>
+                <a:latin typeface="Times New Roman" panose="02020603050405020304" pitchFamily="18" charset="0"/>
+                <a:cs typeface="Times New Roman" panose="02020603050405020304" pitchFamily="18" charset="0"/>
+              </a:endParaRPr>
+            </a:p>
+          </p:txBody>
+        </p:sp>
+        <p:sp>
+          <p:nvSpPr>
+            <p:cNvPr id="64" name="TextBox 63"/>
+            <p:cNvSpPr txBox="1"/>
+            <p:nvPr/>
+          </p:nvSpPr>
+          <p:spPr>
+            <a:xfrm>
+              <a:off x="7625883" y="1340236"/>
+              <a:ext cx="782587" cy="307777"/>
+            </a:xfrm>
+            <a:prstGeom prst="rect">
+              <a:avLst/>
+            </a:prstGeom>
+            <a:noFill/>
+          </p:spPr>
+          <p:txBody>
+            <a:bodyPr wrap="none" rtlCol="0">
+              <a:spAutoFit/>
+            </a:bodyPr>
+            <a:lstStyle/>
+            <a:p>
+              <a:r>
+                <a:rPr lang="en-US" sz="1400" dirty="0" smtClean="0">
+                  <a:solidFill>
+                    <a:srgbClr val="A61A1D"/>
+                  </a:solidFill>
+                  <a:latin typeface="Times New Roman" panose="02020603050405020304" pitchFamily="18" charset="0"/>
+                  <a:cs typeface="Times New Roman" panose="02020603050405020304" pitchFamily="18" charset="0"/>
+                </a:rPr>
+                <a:t>protocol</a:t>
+              </a:r>
+              <a:endParaRPr lang="en-US" sz="1400" dirty="0">
+                <a:solidFill>
+                  <a:srgbClr val="A61A1D"/>
+                </a:solidFill>
+                <a:latin typeface="Times New Roman" panose="02020603050405020304" pitchFamily="18" charset="0"/>
+                <a:cs typeface="Times New Roman" panose="02020603050405020304" pitchFamily="18" charset="0"/>
+              </a:endParaRPr>
+            </a:p>
+          </p:txBody>
+        </p:sp>
+      </p:grpSp>
     </p:spTree>
     <p:extLst>
       <p:ext uri="{BB962C8B-B14F-4D97-AF65-F5344CB8AC3E}">
-        <p14:creationId xmlns:p14="http://schemas.microsoft.com/office/powerpoint/2010/main" val="246030168"/>
+        <p14:creationId xmlns:p14="http://schemas.microsoft.com/office/powerpoint/2010/main" val="1037630341"/>
       </p:ext>
     </p:extLst>
   </p:cSld>
@@ -5603,9 +7163,91 @@
   <p:timing>
     <p:tnLst>
       <p:par>
-        <p:cTn id="1" dur="indefinite" restart="never" nodeType="tmRoot"/>
+        <p:cTn id="1" dur="indefinite" restart="never" nodeType="tmRoot">
+          <p:childTnLst>
+            <p:seq concurrent="1" nextAc="seek">
+              <p:cTn id="2" dur="indefinite" nodeType="mainSeq">
+                <p:childTnLst>
+                  <p:par>
+                    <p:cTn id="3" fill="hold">
+                      <p:stCondLst>
+                        <p:cond delay="indefinite"/>
+                        <p:cond evt="onBegin" delay="0">
+                          <p:tn val="2"/>
+                        </p:cond>
+                      </p:stCondLst>
+                      <p:childTnLst>
+                        <p:par>
+                          <p:cTn id="4" fill="hold">
+                            <p:stCondLst>
+                              <p:cond delay="0"/>
+                            </p:stCondLst>
+                            <p:childTnLst>
+                              <p:par>
+                                <p:cTn id="5" presetID="10" presetClass="entr" presetSubtype="0" fill="hold" grpId="0" nodeType="withEffect">
+                                  <p:stCondLst>
+                                    <p:cond delay="0"/>
+                                  </p:stCondLst>
+                                  <p:childTnLst>
+                                    <p:set>
+                                      <p:cBhvr>
+                                        <p:cTn id="6" dur="1" fill="hold">
+                                          <p:stCondLst>
+                                            <p:cond delay="0"/>
+                                          </p:stCondLst>
+                                        </p:cTn>
+                                        <p:tgtEl>
+                                          <p:spTgt spid="7"/>
+                                        </p:tgtEl>
+                                        <p:attrNameLst>
+                                          <p:attrName>style.visibility</p:attrName>
+                                        </p:attrNameLst>
+                                      </p:cBhvr>
+                                      <p:to>
+                                        <p:strVal val="visible"/>
+                                      </p:to>
+                                    </p:set>
+                                    <p:animEffect transition="in" filter="fade">
+                                      <p:cBhvr>
+                                        <p:cTn id="7" dur="500"/>
+                                        <p:tgtEl>
+                                          <p:spTgt spid="7"/>
+                                        </p:tgtEl>
+                                      </p:cBhvr>
+                                    </p:animEffect>
+                                  </p:childTnLst>
+                                </p:cTn>
+                              </p:par>
+                            </p:childTnLst>
+                          </p:cTn>
+                        </p:par>
+                      </p:childTnLst>
+                    </p:cTn>
+                  </p:par>
+                </p:childTnLst>
+              </p:cTn>
+              <p:prevCondLst>
+                <p:cond evt="onPrev" delay="0">
+                  <p:tgtEl>
+                    <p:sldTgt/>
+                  </p:tgtEl>
+                </p:cond>
+              </p:prevCondLst>
+              <p:nextCondLst>
+                <p:cond evt="onNext" delay="0">
+                  <p:tgtEl>
+                    <p:sldTgt/>
+                  </p:tgtEl>
+                </p:cond>
+              </p:nextCondLst>
+            </p:seq>
+          </p:childTnLst>
+        </p:cTn>
       </p:par>
     </p:tnLst>
+    <p:bldLst>
+      <p:bldP spid="7" grpId="0"/>
+    </p:bldLst>
   </p:timing>
 </p:sld>
 </file>
@@ -5629,7 +7271,30 @@
       </p:grpSpPr>
       <p:sp>
         <p:nvSpPr>
-          <p:cNvPr id="2" name="Title 1"/>
+          <p:cNvPr id="4" name="Slide Number Placeholder 3"/>
+          <p:cNvSpPr>
+            <a:spLocks noGrp="1"/>
+          </p:cNvSpPr>
+          <p:nvPr>
+            <p:ph type="sldNum" sz="quarter" idx="12"/>
+          </p:nvPr>
+        </p:nvSpPr>
+        <p:spPr/>
+        <p:txBody>
+          <a:bodyPr/>
+          <a:lstStyle/>
+          <a:p>
+            <a:fld id="{040DEF24-717E-4741-8753-F7E431A261E5}" type="slidenum">
+              <a:rPr lang="en-US" smtClean="0"/>
+              <a:t>4</a:t>
+            </a:fld>
+            <a:endParaRPr lang="en-US"/>
+          </a:p>
+        </p:txBody>
+      </p:sp>
+      <p:sp>
+        <p:nvSpPr>
+          <p:cNvPr id="6" name="Title 1"/>
           <p:cNvSpPr>
             <a:spLocks noGrp="1"/>
           </p:cNvSpPr>
@@ -5639,7 +7304,7 @@
         </p:nvSpPr>
         <p:spPr>
           <a:xfrm>
-            <a:off x="1069848" y="484632"/>
+            <a:off x="1069848" y="198491"/>
             <a:ext cx="10058400" cy="629793"/>
           </a:xfrm>
         </p:spPr>
@@ -5650,11 +7315,18 @@
           <a:lstStyle/>
           <a:p>
             <a:r>
-              <a:rPr lang="en-US" sz="4000" dirty="0" smtClean="0">
-                <a:latin typeface="Arial" panose="020B0604020202020204" pitchFamily="34" charset="0"/>
-                <a:cs typeface="Arial" panose="020B0604020202020204" pitchFamily="34" charset="0"/>
-              </a:rPr>
-              <a:t>DNS là gì ?</a:t>
+              <a:rPr lang="en-US" sz="4000" b="1" dirty="0">
+                <a:latin typeface="Times New Roman" panose="02020603050405020304" pitchFamily="18" charset="0"/>
+                <a:cs typeface="Times New Roman" panose="02020603050405020304" pitchFamily="18" charset="0"/>
+              </a:rPr>
+              <a:t>DNS - DOMAIN NAME </a:t>
+            </a:r>
+            <a:r>
+              <a:rPr lang="en-US" sz="4000" b="1" dirty="0" smtClean="0">
+                <a:latin typeface="Times New Roman" panose="02020603050405020304" pitchFamily="18" charset="0"/>
+                <a:cs typeface="Times New Roman" panose="02020603050405020304" pitchFamily="18" charset="0"/>
+              </a:rPr>
+              <a:t>SYSTEM </a:t>
             </a:r>
             <a:endParaRPr lang="en-US" sz="4000" dirty="0">
               <a:latin typeface="Arial" panose="020B0604020202020204" pitchFamily="34" charset="0"/>
@@ -5665,7 +7337,101 @@
       </p:sp>
       <p:sp>
         <p:nvSpPr>
-          <p:cNvPr id="4" name="Subtitle 2"/>
+          <p:cNvPr id="2" name="Rectangle 1"/>
+          <p:cNvSpPr/>
+          <p:nvPr/>
+        </p:nvSpPr>
+        <p:spPr>
+          <a:xfrm>
+            <a:off x="1069848" y="933021"/>
+            <a:ext cx="5769528" cy="461665"/>
+          </a:xfrm>
+          <a:prstGeom prst="rect">
+            <a:avLst/>
+          </a:prstGeom>
+        </p:spPr>
+        <p:txBody>
+          <a:bodyPr wrap="none">
+            <a:spAutoFit/>
+          </a:bodyPr>
+          <a:lstStyle/>
+          <a:p>
+            <a:r>
+              <a:rPr lang="en-US" sz="2400" b="1" dirty="0" smtClean="0">
+                <a:solidFill>
+                  <a:schemeClr val="accent2">
+                    <a:lumMod val="50000"/>
+                  </a:schemeClr>
+                </a:solidFill>
+                <a:latin typeface="Roboto" panose="02000000000000000000" pitchFamily="2" charset="0"/>
+                <a:ea typeface="Roboto" panose="02000000000000000000" pitchFamily="2" charset="0"/>
+                <a:cs typeface="Arial" panose="020B0604020202020204" pitchFamily="34" charset="0"/>
+              </a:rPr>
+              <a:t>Ưu và nhược điểm của DNS truyền thống</a:t>
+            </a:r>
+            <a:endParaRPr lang="en-US" sz="2400" b="1" dirty="0">
+              <a:solidFill>
+                <a:schemeClr val="accent2">
+                  <a:lumMod val="50000"/>
+                </a:schemeClr>
+              </a:solidFill>
+              <a:latin typeface="Roboto" panose="02000000000000000000" pitchFamily="2" charset="0"/>
+              <a:ea typeface="Roboto" panose="02000000000000000000" pitchFamily="2" charset="0"/>
+              <a:cs typeface="Arial" panose="020B0604020202020204" pitchFamily="34" charset="0"/>
+            </a:endParaRPr>
+          </a:p>
+        </p:txBody>
+      </p:sp>
+      <p:sp>
+        <p:nvSpPr>
+          <p:cNvPr id="7" name="Rectangle 6"/>
+          <p:cNvSpPr/>
+          <p:nvPr/>
+        </p:nvSpPr>
+        <p:spPr>
+          <a:xfrm>
+            <a:off x="0" y="0"/>
+            <a:ext cx="427839" cy="6858000"/>
+          </a:xfrm>
+          <a:prstGeom prst="rect">
+            <a:avLst/>
+          </a:prstGeom>
+          <a:solidFill>
+            <a:srgbClr val="AA2100"/>
+          </a:solidFill>
+        </p:spPr>
+        <p:style>
+          <a:lnRef idx="2">
+            <a:schemeClr val="accent1">
+              <a:shade val="50000"/>
+            </a:schemeClr>
+          </a:lnRef>
+          <a:fillRef idx="1">
+            <a:schemeClr val="accent1"/>
+          </a:fillRef>
+          <a:effectRef idx="0">
+            <a:schemeClr val="accent1"/>
+          </a:effectRef>
+          <a:fontRef idx="minor">
+            <a:schemeClr val="lt1"/>
+          </a:fontRef>
+        </p:style>
+        <p:txBody>
+          <a:bodyPr rtlCol="0" anchor="ctr"/>
+          <a:lstStyle/>
+          <a:p>
+            <a:pPr algn="ctr"/>
+            <a:endParaRPr lang="en-US">
+              <a:solidFill>
+                <a:srgbClr val="FF0000"/>
+              </a:solidFill>
+            </a:endParaRPr>
+          </a:p>
+        </p:txBody>
+      </p:sp>
+      <p:sp>
+        <p:nvSpPr>
+          <p:cNvPr id="5" name="Content Placeholder 4"/>
           <p:cNvSpPr>
             <a:spLocks noGrp="1"/>
           </p:cNvSpPr>
@@ -5675,50 +7441,276 @@
         </p:nvSpPr>
         <p:spPr>
           <a:xfrm>
-            <a:off x="1069848" y="1302258"/>
-            <a:ext cx="10058400" cy="4050792"/>
+            <a:off x="1172501" y="1499423"/>
+            <a:ext cx="3197352" cy="5023911"/>
           </a:xfrm>
         </p:spPr>
         <p:txBody>
           <a:bodyPr>
-            <a:normAutofit/>
+            <a:normAutofit fontScale="25000" lnSpcReduction="20000"/>
           </a:bodyPr>
           <a:lstStyle/>
           <a:p>
-            <a:r>
-              <a:rPr lang="en-US" dirty="0" smtClean="0"/>
-              <a:t>Domain name system </a:t>
-            </a:r>
-            <a:endParaRPr lang="vi-VN" dirty="0"/>
-          </a:p>
-        </p:txBody>
-      </p:sp>
-      <p:sp>
-        <p:nvSpPr>
-          <p:cNvPr id="6" name="Slide Number Placeholder 5"/>
-          <p:cNvSpPr>
-            <a:spLocks noGrp="1"/>
-          </p:cNvSpPr>
-          <p:nvPr>
-            <p:ph type="sldNum" sz="quarter" idx="12"/>
-          </p:nvPr>
-        </p:nvSpPr>
-        <p:spPr/>
-        <p:txBody>
-          <a:bodyPr/>
+            <a:pPr lvl="0" algn="just">
+              <a:spcAft>
+                <a:spcPts val="300"/>
+              </a:spcAft>
+            </a:pPr>
+            <a:r>
+              <a:rPr lang="en-US" sz="4000" b="1" dirty="0"/>
+              <a:t>Sự quan trọng với Internet: </a:t>
+            </a:r>
+            <a:r>
+              <a:rPr lang="en-US" sz="4000" dirty="0"/>
+              <a:t>DNS là một hệ thống toàn cầu giúp người dùng sử dụng Internet hiệu quả. Với tầm quan trọng của Internet đối với xã hội, điều này càng khiến DNS có vai trò không thể thiếu giúp Internet phát triển bền vững. Có thể nói nếu thiếu DNS, Internet không thể tồn tại lâu dài.</a:t>
+            </a:r>
+            <a:r>
+              <a:rPr lang="en-US" sz="4000" b="1" dirty="0"/>
+              <a:t>	</a:t>
+            </a:r>
+          </a:p>
+          <a:p>
+            <a:pPr lvl="0" algn="just">
+              <a:spcAft>
+                <a:spcPts val="300"/>
+              </a:spcAft>
+            </a:pPr>
+            <a:r>
+              <a:rPr lang="en-US" sz="4000" b="1" dirty="0"/>
+              <a:t>Không cần lưu trữ một dãy IP dài và khó nhớ: </a:t>
+            </a:r>
+            <a:r>
+              <a:rPr lang="en-US" sz="4000" dirty="0"/>
+              <a:t>DNS đưa ra một phương pháp tiện lợi hơn, chuyển đổi những tên domain, tên sub-domain thành IP. Việc tự nhớ một dãy số không có ý nghĩa gây cản trở giữa người dùng và trang web mà họ thường xuyên xem. DNS giúp được điều đó và mang tính hữu dụng cho các công cụ tìm kiếm.</a:t>
+            </a:r>
+          </a:p>
+          <a:p>
+            <a:pPr lvl="0" algn="just">
+              <a:spcAft>
+                <a:spcPts val="300"/>
+              </a:spcAft>
+            </a:pPr>
+            <a:r>
+              <a:rPr lang="en-US" sz="4000" b="1" dirty="0"/>
+              <a:t>Dễ truy cập hơn không có nghĩa là dễ bị tấn công hơn: </a:t>
+            </a:r>
+            <a:r>
+              <a:rPr lang="en-US" sz="4000" dirty="0"/>
+              <a:t>DNS Server được thiết kế cho mục đích bảo mật thường đảm bảo rằng sẽ cản trở những mục đích tấn công vào hệ thống. Tuy nhiên một điều quan trọng là cần phải được áp dụng những biện pháp bảo mật khác với tốc độ phát triển công nghệ hiện nay. </a:t>
+            </a:r>
+          </a:p>
+          <a:p>
+            <a:pPr lvl="0" algn="just">
+              <a:spcAft>
+                <a:spcPts val="300"/>
+              </a:spcAft>
+            </a:pPr>
+            <a:r>
+              <a:rPr lang="en-US" sz="4000" b="1" dirty="0"/>
+              <a:t>DNS có tốc độ truy cập Internet cao nhất: </a:t>
+            </a:r>
+            <a:r>
+              <a:rPr lang="en-US" sz="4000" dirty="0" smtClean="0"/>
+              <a:t>Doanh nghiệp hoặc cá nhân sử dụng DNS Server có thể tận dụng từ tốc độ truy cập đó để đảm bảo công việc của mình.</a:t>
+            </a:r>
+            <a:endParaRPr lang="en-US" sz="4000" dirty="0"/>
+          </a:p>
+          <a:p>
+            <a:pPr lvl="0" algn="just">
+              <a:spcAft>
+                <a:spcPts val="300"/>
+              </a:spcAft>
+            </a:pPr>
+            <a:r>
+              <a:rPr lang="en-US" sz="4000" b="1" dirty="0"/>
+              <a:t>Cập nhật danh sách IP dễ dàng: </a:t>
+            </a:r>
+            <a:r>
+              <a:rPr lang="en-US" sz="4000" dirty="0"/>
+              <a:t>Việc cập nhật IP xảy ra thường xuyên và về phía người dùng cũng vậy. Thông thường thì rất mất thời gian và công sức. Nhưng với cấu trúc của DNS thì có thể làm được việc này một cách dễ dàng.</a:t>
+            </a:r>
+          </a:p>
+          <a:p>
+            <a:pPr algn="just">
+              <a:lnSpc>
+                <a:spcPct val="134000"/>
+              </a:lnSpc>
+              <a:spcBef>
+                <a:spcPts val="300"/>
+              </a:spcBef>
+              <a:spcAft>
+                <a:spcPts val="300"/>
+              </a:spcAft>
+            </a:pPr>
+            <a:endParaRPr lang="en-US" dirty="0"/>
+          </a:p>
+        </p:txBody>
+      </p:sp>
+      <p:sp>
+        <p:nvSpPr>
+          <p:cNvPr id="10" name="TextBox 9"/>
+          <p:cNvSpPr txBox="1"/>
+          <p:nvPr/>
+        </p:nvSpPr>
+        <p:spPr>
+          <a:xfrm>
+            <a:off x="8355547" y="1499423"/>
+            <a:ext cx="3031067" cy="4154984"/>
+          </a:xfrm>
+          <a:prstGeom prst="rect">
+            <a:avLst/>
+          </a:prstGeom>
+          <a:noFill/>
+        </p:spPr>
+        <p:txBody>
+          <a:bodyPr wrap="square" rtlCol="0">
+            <a:spAutoFit/>
+          </a:bodyPr>
           <a:lstStyle/>
           <a:p>
-            <a:r>
-              <a:rPr lang="en-US" dirty="0" smtClean="0"/>
-              <a:t>2</a:t>
-            </a:r>
-            <a:endParaRPr lang="en-US" dirty="0"/>
+            <a:pPr marL="182880" indent="-182880" algn="just">
+              <a:lnSpc>
+                <a:spcPct val="70000"/>
+              </a:lnSpc>
+              <a:spcBef>
+                <a:spcPts val="1200"/>
+              </a:spcBef>
+              <a:buClr>
+                <a:schemeClr val="accent1">
+                  <a:lumMod val="75000"/>
+                </a:schemeClr>
+              </a:buClr>
+              <a:buSzPct val="85000"/>
+              <a:buFont typeface="Wingdings" pitchFamily="2" charset="2"/>
+              <a:buChar char="§"/>
+            </a:pPr>
+            <a:r>
+              <a:rPr lang="en-US" sz="1000" b="1" dirty="0"/>
+              <a:t>DNS phụ thuộc vào sự kiểm soát của Hoa Kỳ: </a:t>
+            </a:r>
+            <a:r>
+              <a:rPr lang="en-US" sz="1000" dirty="0"/>
+              <a:t>DNS Server được kiểm soát tập trung bởi một tổ chức phi lợi nhuận là ICANN có trụ sở tại Hoa Kỳ. Điều này gây khó khăn cho các nước không phụ thuộc vào Hoa Kỳ có thể sử dụng dịch vụ này.</a:t>
+            </a:r>
+          </a:p>
+          <a:p>
+            <a:pPr marL="182880" indent="-182880" algn="just">
+              <a:lnSpc>
+                <a:spcPct val="70000"/>
+              </a:lnSpc>
+              <a:spcBef>
+                <a:spcPts val="1200"/>
+              </a:spcBef>
+              <a:buClr>
+                <a:schemeClr val="accent1">
+                  <a:lumMod val="75000"/>
+                </a:schemeClr>
+              </a:buClr>
+              <a:buSzPct val="85000"/>
+              <a:buFont typeface="Wingdings" pitchFamily="2" charset="2"/>
+              <a:buChar char="§"/>
+            </a:pPr>
+            <a:r>
+              <a:rPr lang="en-US" sz="1000" b="1" dirty="0"/>
+              <a:t>DNS queries thường không mang bất kì thông tin về client khởi tạo nó: </a:t>
+            </a:r>
+            <a:r>
+              <a:rPr lang="en-US" sz="1000" dirty="0"/>
+              <a:t>Điều này lý giải cho việc hacker rất hay nhắm vào DNS. Bởi vì phía Server chỉ thấy địa chỉ IP từ nơi query tới và có thể bị điều khiển bởi các hacker. ( DNS request = DNS query ).</a:t>
+            </a:r>
+          </a:p>
+          <a:p>
+            <a:pPr marL="182880" indent="-182880" algn="just">
+              <a:lnSpc>
+                <a:spcPct val="70000"/>
+              </a:lnSpc>
+              <a:spcBef>
+                <a:spcPts val="1200"/>
+              </a:spcBef>
+              <a:buClr>
+                <a:schemeClr val="accent1">
+                  <a:lumMod val="75000"/>
+                </a:schemeClr>
+              </a:buClr>
+              <a:buSzPct val="85000"/>
+              <a:buFont typeface="Wingdings" pitchFamily="2" charset="2"/>
+              <a:buChar char="§"/>
+            </a:pPr>
+            <a:r>
+              <a:rPr lang="en-US" sz="1000" b="1" dirty="0"/>
+              <a:t>DNS dựa vào quan hệ chủ-tớ: </a:t>
+            </a:r>
+            <a:r>
+              <a:rPr lang="en-US" sz="1000" dirty="0"/>
+              <a:t>Điều này có nghĩa rằng nếu server ở máy chủ bị hỏng hoặc bị điều khiển bằng cách nào đó, sẽ khiến cho người dùng truy cập vào trang web hoặc database nằm trong server. Hacker có thể phát huy điểm mạnh của mình bằng cách nhắm vào các máy chủ và dẫn người dùng tới trang web khác, họ có thể tìm cách để lừa đảo thông tin.</a:t>
+            </a:r>
+          </a:p>
+          <a:p>
+            <a:pPr marL="182880" indent="-182880" algn="just">
+              <a:lnSpc>
+                <a:spcPct val="70000"/>
+              </a:lnSpc>
+              <a:spcBef>
+                <a:spcPts val="1200"/>
+              </a:spcBef>
+              <a:buClr>
+                <a:schemeClr val="accent1">
+                  <a:lumMod val="75000"/>
+                </a:schemeClr>
+              </a:buClr>
+              <a:buSzPct val="85000"/>
+              <a:buFont typeface="Wingdings" pitchFamily="2" charset="2"/>
+              <a:buChar char="§"/>
+            </a:pPr>
+            <a:r>
+              <a:rPr lang="en-US" sz="1000" b="1" dirty="0"/>
+              <a:t>Khi DNS Server sập, World Wide Web cũng vậy: </a:t>
+            </a:r>
+            <a:r>
+              <a:rPr lang="en-US" sz="1000" dirty="0"/>
+              <a:t>Mặc dù đã có back up của server và server gốc. Tại vì khi một server bị crash ( hư ) thì sẽ dẫn tới các local network lân cận sẽ không thể kết nối với client được.</a:t>
+            </a:r>
+          </a:p>
+          <a:p>
+            <a:pPr marL="182880" indent="-182880" algn="just">
+              <a:lnSpc>
+                <a:spcPct val="70000"/>
+              </a:lnSpc>
+              <a:spcBef>
+                <a:spcPts val="1200"/>
+              </a:spcBef>
+              <a:buClr>
+                <a:schemeClr val="accent1">
+                  <a:lumMod val="75000"/>
+                </a:schemeClr>
+              </a:buClr>
+              <a:buSzPct val="85000"/>
+              <a:buFont typeface="Wingdings" pitchFamily="2" charset="2"/>
+              <a:buChar char="§"/>
+            </a:pPr>
+            <a:r>
+              <a:rPr lang="en-US" sz="1000" b="1" dirty="0"/>
+              <a:t>DNS là nguyên nhân chính dẫn đến cuộc tấn công DNS: </a:t>
+            </a:r>
+            <a:r>
+              <a:rPr lang="en-US" sz="1000" dirty="0"/>
+              <a:t>Địa chỉ của DNS được thay đổi với địa chỉ giả mạo do đó người dùng sẽ bị dẫn đến các website khác. </a:t>
+            </a:r>
+            <a:r>
+              <a:rPr lang="en-US" sz="1000" dirty="0"/>
+              <a:t>Từ đó hacker có thể thu thập thông tin cá nhân của người dùng đó</a:t>
+            </a:r>
+            <a:r>
+              <a:rPr lang="en-US" sz="1000" dirty="0" smtClean="0"/>
+              <a:t>.</a:t>
+            </a:r>
+            <a:endParaRPr lang="en-US" sz="1000" dirty="0"/>
           </a:p>
         </p:txBody>
       </p:sp>
       <p:pic>
         <p:nvPicPr>
-          <p:cNvPr id="5" name="Picture 4" descr="https://cdn.kinhtedothi.vn/499/2020/11/25/25dol1.jpg"/>
+          <p:cNvPr id="11" name="Picture 10" descr="https://cdn.kinhtedothi.vn/499/2020/11/25/25dol1.jpg"/>
           <p:cNvPicPr/>
           <p:nvPr/>
         </p:nvPicPr>
@@ -5737,8 +7729,8 @@
         </p:blipFill>
         <p:spPr>
           <a:xfrm>
-            <a:off x="1346073" y="1755711"/>
-            <a:ext cx="5399405" cy="3143885"/>
+            <a:off x="4472506" y="2424550"/>
+            <a:ext cx="3780388" cy="2304730"/>
           </a:xfrm>
           <a:prstGeom prst="rect">
             <a:avLst/>
@@ -5754,7 +7746,7 @@
     </p:spTree>
     <p:extLst>
       <p:ext uri="{BB962C8B-B14F-4D97-AF65-F5344CB8AC3E}">
-        <p14:creationId xmlns:p14="http://schemas.microsoft.com/office/powerpoint/2010/main" val="1037630341"/>
+        <p14:creationId xmlns:p14="http://schemas.microsoft.com/office/powerpoint/2010/main" val="1784222693"/>
       </p:ext>
     </p:extLst>
   </p:cSld>
@@ -5798,23 +7790,93 @@
             <p:ph idx="1"/>
           </p:nvPr>
         </p:nvSpPr>
-        <p:spPr/>
-        <p:txBody>
-          <a:bodyPr/>
+        <p:spPr>
+          <a:xfrm>
+            <a:off x="1069848" y="1403604"/>
+            <a:ext cx="10058400" cy="3109129"/>
+          </a:xfrm>
+        </p:spPr>
+        <p:txBody>
+          <a:bodyPr>
+            <a:normAutofit fontScale="40000" lnSpcReduction="20000"/>
+          </a:bodyPr>
           <a:lstStyle/>
           <a:p>
-            <a:r>
-              <a:rPr lang="vi-VN" dirty="0"/>
-              <a:t>Giới thiệu nội dung từng phần của đề tài và những nội dung nhấn mạnh (mỗi</a:t>
-            </a:r>
-          </a:p>
-          <a:p>
-            <a:pPr marL="0" indent="0">
-              <a:buNone/>
+            <a:pPr>
+              <a:lnSpc>
+                <a:spcPct val="170000"/>
+              </a:lnSpc>
             </a:pPr>
             <a:r>
-              <a:rPr lang="vi-VN" dirty="0"/>
-              <a:t>chương mục từ 2-4 slide)</a:t>
+              <a:rPr lang="en-US" sz="2500" dirty="0"/>
+              <a:t>Blockchain là công nghệ chuỗi – khối, cho phép truyền tải dữ liệu một cách an toàn dựa trên hệ thống mã hóa vô cùng phức tạp, tương tự như cuốn sổ cái kế toán của một công ty, nơi mà tiền được giám sát chặt chẽ và ghi nhận mọi giao dịch trên mạng ngang hàng.</a:t>
+            </a:r>
+          </a:p>
+          <a:p>
+            <a:pPr>
+              <a:lnSpc>
+                <a:spcPct val="170000"/>
+              </a:lnSpc>
+            </a:pPr>
+            <a:r>
+              <a:rPr lang="en-US" sz="2500" dirty="0"/>
+              <a:t>Mỗi khối (block) đều chứa thông tin về thời gian khởi tạo và được liên kết với khối trước đó, kèm theo đó là một mã thời gian và dữ liệu giao dịch. Dữ liệu khi đã được mạng lưới chấp nhận thì sẽ không có cách nào thay đổi được. Blockchain được thiết kế để chống lại việc gian lận, thay đổi của dữ liệu.</a:t>
+            </a:r>
+          </a:p>
+          <a:p>
+            <a:pPr>
+              <a:lnSpc>
+                <a:spcPct val="170000"/>
+              </a:lnSpc>
+            </a:pPr>
+            <a:r>
+              <a:rPr lang="en-US" sz="2500" dirty="0"/>
+              <a:t>Công nghệ Blockchain là sự kết hợp giữa 3 loại công nghệ :</a:t>
+            </a:r>
+          </a:p>
+          <a:p>
+            <a:pPr lvl="0">
+              <a:lnSpc>
+                <a:spcPct val="170000"/>
+              </a:lnSpc>
+            </a:pPr>
+            <a:r>
+              <a:rPr lang="en-US" sz="2500" b="1" dirty="0"/>
+              <a:t>Mật mã học:</a:t>
+            </a:r>
+            <a:r>
+              <a:rPr lang="en-US" sz="2500" dirty="0"/>
+              <a:t> để đảm bảo tính minh bạch, toàn vẹn và riêng tư thì công nghệ Blockchain đã sử dụng public key hoặc hàm hash function.</a:t>
+            </a:r>
+          </a:p>
+          <a:p>
+            <a:pPr lvl="0">
+              <a:lnSpc>
+                <a:spcPct val="170000"/>
+              </a:lnSpc>
+            </a:pPr>
+            <a:r>
+              <a:rPr lang="en-US" sz="2500" b="1" dirty="0"/>
+              <a:t>Mạng ngang hàng:</a:t>
+            </a:r>
+            <a:r>
+              <a:rPr lang="en-US" sz="2500" dirty="0"/>
+              <a:t> Mỗi một nút trong mạng được xem như một client và cũng là server để lưu trữ bản sao ứng dụng.</a:t>
+            </a:r>
+          </a:p>
+          <a:p>
+            <a:pPr lvl="0">
+              <a:lnSpc>
+                <a:spcPct val="170000"/>
+              </a:lnSpc>
+            </a:pPr>
+            <a:r>
+              <a:rPr lang="en-US" sz="2500" b="1" dirty="0"/>
+              <a:t>Lý thuyết trò chơi:</a:t>
+            </a:r>
+            <a:r>
+              <a:rPr lang="en-US" sz="2500" dirty="0"/>
+              <a:t> Tất cả các nút tham gia vào hệ thống đều phải tuân thủ luật chơi đồng thuận (giao thức PoW, PoS,…) và được thúc đẩy bởi động lực kinh tế.</a:t>
             </a:r>
           </a:p>
           <a:p>
@@ -5872,7 +7934,7 @@
                 <a:latin typeface="Arial" panose="020B0604020202020204" pitchFamily="34" charset="0"/>
                 <a:cs typeface="Arial" panose="020B0604020202020204" pitchFamily="34" charset="0"/>
               </a:rPr>
-              <a:t>blockchain là gì ?</a:t>
+              <a:t>Blockchain VÀ DNS BLOCKCHAIN </a:t>
             </a:r>
             <a:endParaRPr lang="en-US" sz="4000" dirty="0">
               <a:latin typeface="Arial" panose="020B0604020202020204" pitchFamily="34" charset="0"/>
@@ -5881,16 +7943,264 @@
           </a:p>
         </p:txBody>
       </p:sp>
+      <p:sp>
+        <p:nvSpPr>
+          <p:cNvPr id="5" name="Rectangle 4"/>
+          <p:cNvSpPr/>
+          <p:nvPr/>
+        </p:nvSpPr>
+        <p:spPr>
+          <a:xfrm>
+            <a:off x="0" y="0"/>
+            <a:ext cx="427839" cy="6858000"/>
+          </a:xfrm>
+          <a:prstGeom prst="rect">
+            <a:avLst/>
+          </a:prstGeom>
+          <a:solidFill>
+            <a:srgbClr val="AA2100"/>
+          </a:solidFill>
+        </p:spPr>
+        <p:style>
+          <a:lnRef idx="2">
+            <a:schemeClr val="accent1">
+              <a:shade val="50000"/>
+            </a:schemeClr>
+          </a:lnRef>
+          <a:fillRef idx="1">
+            <a:schemeClr val="accent1"/>
+          </a:fillRef>
+          <a:effectRef idx="0">
+            <a:schemeClr val="accent1"/>
+          </a:effectRef>
+          <a:fontRef idx="minor">
+            <a:schemeClr val="lt1"/>
+          </a:fontRef>
+        </p:style>
+        <p:txBody>
+          <a:bodyPr rtlCol="0" anchor="ctr"/>
+          <a:lstStyle/>
+          <a:p>
+            <a:pPr algn="ctr"/>
+            <a:endParaRPr lang="en-US">
+              <a:solidFill>
+                <a:srgbClr val="FF0000"/>
+              </a:solidFill>
+            </a:endParaRPr>
+          </a:p>
+        </p:txBody>
+      </p:sp>
+      <p:sp>
+        <p:nvSpPr>
+          <p:cNvPr id="2" name="Rectangle 1"/>
+          <p:cNvSpPr/>
+          <p:nvPr/>
+        </p:nvSpPr>
+        <p:spPr>
+          <a:xfrm>
+            <a:off x="2379133" y="4315079"/>
+            <a:ext cx="1159933" cy="587121"/>
+          </a:xfrm>
+          <a:prstGeom prst="rect">
+            <a:avLst/>
+          </a:prstGeom>
+        </p:spPr>
+        <p:style>
+          <a:lnRef idx="2">
+            <a:schemeClr val="accent1">
+              <a:shade val="50000"/>
+            </a:schemeClr>
+          </a:lnRef>
+          <a:fillRef idx="1">
+            <a:schemeClr val="accent1"/>
+          </a:fillRef>
+          <a:effectRef idx="0">
+            <a:schemeClr val="accent1"/>
+          </a:effectRef>
+          <a:fontRef idx="minor">
+            <a:schemeClr val="lt1"/>
+          </a:fontRef>
+        </p:style>
+        <p:txBody>
+          <a:bodyPr rtlCol="0" anchor="ctr"/>
+          <a:lstStyle/>
+          <a:p>
+            <a:pPr algn="ctr"/>
+            <a:endParaRPr lang="en-US"/>
+          </a:p>
+        </p:txBody>
+      </p:sp>
+      <p:cxnSp>
+        <p:nvCxnSpPr>
+          <p:cNvPr id="8" name="Curved Connector 7"/>
+          <p:cNvCxnSpPr>
+            <a:stCxn id="2" idx="3"/>
+          </p:cNvCxnSpPr>
+          <p:nvPr/>
+        </p:nvCxnSpPr>
+        <p:spPr>
+          <a:xfrm>
+            <a:off x="3539066" y="4608640"/>
+            <a:ext cx="1117600" cy="299106"/>
+          </a:xfrm>
+          <a:prstGeom prst="curvedConnector3">
+            <a:avLst/>
+          </a:prstGeom>
+          <a:ln>
+            <a:headEnd type="triangle"/>
+            <a:tailEnd type="triangle"/>
+          </a:ln>
+        </p:spPr>
+        <p:style>
+          <a:lnRef idx="1">
+            <a:schemeClr val="accent1"/>
+          </a:lnRef>
+          <a:fillRef idx="0">
+            <a:schemeClr val="accent1"/>
+          </a:fillRef>
+          <a:effectRef idx="0">
+            <a:schemeClr val="accent1"/>
+          </a:effectRef>
+          <a:fontRef idx="minor">
+            <a:schemeClr val="tx1"/>
+          </a:fontRef>
+        </p:style>
+      </p:cxnSp>
+      <p:sp>
+        <p:nvSpPr>
+          <p:cNvPr id="9" name="Rectangle 8"/>
+          <p:cNvSpPr/>
+          <p:nvPr/>
+        </p:nvSpPr>
+        <p:spPr>
+          <a:xfrm>
+            <a:off x="4656666" y="4315079"/>
+            <a:ext cx="1159933" cy="587121"/>
+          </a:xfrm>
+          <a:prstGeom prst="rect">
+            <a:avLst/>
+          </a:prstGeom>
+        </p:spPr>
+        <p:style>
+          <a:lnRef idx="2">
+            <a:schemeClr val="accent1">
+              <a:shade val="50000"/>
+            </a:schemeClr>
+          </a:lnRef>
+          <a:fillRef idx="1">
+            <a:schemeClr val="accent1"/>
+          </a:fillRef>
+          <a:effectRef idx="0">
+            <a:schemeClr val="accent1"/>
+          </a:effectRef>
+          <a:fontRef idx="minor">
+            <a:schemeClr val="lt1"/>
+          </a:fontRef>
+        </p:style>
+        <p:txBody>
+          <a:bodyPr rtlCol="0" anchor="ctr"/>
+          <a:lstStyle/>
+          <a:p>
+            <a:pPr algn="ctr"/>
+            <a:endParaRPr lang="en-US"/>
+          </a:p>
+        </p:txBody>
+      </p:sp>
+      <p:cxnSp>
+        <p:nvCxnSpPr>
+          <p:cNvPr id="10" name="Curved Connector 9"/>
+          <p:cNvCxnSpPr>
+            <a:stCxn id="9" idx="3"/>
+          </p:cNvCxnSpPr>
+          <p:nvPr/>
+        </p:nvCxnSpPr>
+        <p:spPr>
+          <a:xfrm>
+            <a:off x="5816599" y="4608640"/>
+            <a:ext cx="1117600" cy="335893"/>
+          </a:xfrm>
+          <a:prstGeom prst="curvedConnector3">
+            <a:avLst>
+              <a:gd name="adj1" fmla="val 50000"/>
+            </a:avLst>
+          </a:prstGeom>
+          <a:ln>
+            <a:headEnd type="triangle"/>
+            <a:tailEnd type="triangle"/>
+          </a:ln>
+        </p:spPr>
+        <p:style>
+          <a:lnRef idx="1">
+            <a:schemeClr val="accent1"/>
+          </a:lnRef>
+          <a:fillRef idx="0">
+            <a:schemeClr val="accent1"/>
+          </a:fillRef>
+          <a:effectRef idx="0">
+            <a:schemeClr val="accent1"/>
+          </a:effectRef>
+          <a:fontRef idx="minor">
+            <a:schemeClr val="tx1"/>
+          </a:fontRef>
+        </p:style>
+      </p:cxnSp>
+      <p:sp>
+        <p:nvSpPr>
+          <p:cNvPr id="11" name="Rectangle 10"/>
+          <p:cNvSpPr/>
+          <p:nvPr/>
+        </p:nvSpPr>
+        <p:spPr>
+          <a:xfrm>
+            <a:off x="6934199" y="4357412"/>
+            <a:ext cx="1159933" cy="587121"/>
+          </a:xfrm>
+          <a:prstGeom prst="rect">
+            <a:avLst/>
+          </a:prstGeom>
+        </p:spPr>
+        <p:style>
+          <a:lnRef idx="2">
+            <a:schemeClr val="accent1">
+              <a:shade val="50000"/>
+            </a:schemeClr>
+          </a:lnRef>
+          <a:fillRef idx="1">
+            <a:schemeClr val="accent1"/>
+          </a:fillRef>
+          <a:effectRef idx="0">
+            <a:schemeClr val="accent1"/>
+          </a:effectRef>
+          <a:fontRef idx="minor">
+            <a:schemeClr val="lt1"/>
+          </a:fontRef>
+        </p:style>
+        <p:txBody>
+          <a:bodyPr rtlCol="0" anchor="ctr"/>
+          <a:lstStyle/>
+          <a:p>
+            <a:pPr algn="ctr"/>
+            <a:endParaRPr lang="en-US"/>
+          </a:p>
+        </p:txBody>
+      </p:sp>
     </p:spTree>
     <p:extLst>
       <p:ext uri="{BB962C8B-B14F-4D97-AF65-F5344CB8AC3E}">
-        <p14:creationId xmlns:p14="http://schemas.microsoft.com/office/powerpoint/2010/main" val="1784222693"/>
+        <p14:creationId xmlns:p14="http://schemas.microsoft.com/office/powerpoint/2010/main" val="3871431453"/>
       </p:ext>
     </p:extLst>
   </p:cSld>
   <p:clrMapOvr>
     <a:masterClrMapping/>
   </p:clrMapOvr>
+  <p:timing>
+    <p:tnLst>
+      <p:par>
+        <p:cTn id="1" dur="indefinite" restart="never" nodeType="tmRoot"/>
+      </p:par>
+    </p:tnLst>
+  </p:timing>
 </p:sld>
 </file>
 
@@ -5913,40 +8223,6 @@
       </p:grpSpPr>
       <p:sp>
         <p:nvSpPr>
-          <p:cNvPr id="3" name="Content Placeholder 2"/>
-          <p:cNvSpPr>
-            <a:spLocks noGrp="1"/>
-          </p:cNvSpPr>
-          <p:nvPr>
-            <p:ph idx="1"/>
-          </p:nvPr>
-        </p:nvSpPr>
-        <p:spPr/>
-        <p:txBody>
-          <a:bodyPr/>
-          <a:lstStyle/>
-          <a:p>
-            <a:r>
-              <a:rPr lang="vi-VN" dirty="0"/>
-              <a:t>Giới thiệu nội dung từng phần của đề tài và những nội dung nhấn mạnh (mỗi</a:t>
-            </a:r>
-          </a:p>
-          <a:p>
-            <a:pPr marL="0" indent="0">
-              <a:buNone/>
-            </a:pPr>
-            <a:r>
-              <a:rPr lang="vi-VN" dirty="0"/>
-              <a:t>chương mục từ 2-4 slide)</a:t>
-            </a:r>
-          </a:p>
-          <a:p>
-            <a:endParaRPr lang="en-US" dirty="0"/>
-          </a:p>
-        </p:txBody>
-      </p:sp>
-      <p:sp>
-        <p:nvSpPr>
           <p:cNvPr id="4" name="Slide Number Placeholder 3"/>
           <p:cNvSpPr>
             <a:spLocks noGrp="1"/>
@@ -5991,11 +8267,18 @@
           <a:lstStyle/>
           <a:p>
             <a:r>
-              <a:rPr lang="en-US" sz="4000" dirty="0" smtClean="0">
-                <a:latin typeface="Arial" panose="020B0604020202020204" pitchFamily="34" charset="0"/>
-                <a:cs typeface="Arial" panose="020B0604020202020204" pitchFamily="34" charset="0"/>
-              </a:rPr>
-              <a:t>Blockchain dns là gì ?</a:t>
+              <a:rPr lang="en-US" sz="4000" b="1" dirty="0">
+                <a:latin typeface="Times New Roman" panose="02020603050405020304" pitchFamily="18" charset="0"/>
+                <a:cs typeface="Times New Roman" panose="02020603050405020304" pitchFamily="18" charset="0"/>
+              </a:rPr>
+              <a:t>THUẬT </a:t>
+            </a:r>
+            <a:r>
+              <a:rPr lang="en-US" sz="4000" b="1" dirty="0">
+                <a:latin typeface="Times New Roman" panose="02020603050405020304" pitchFamily="18" charset="0"/>
+                <a:cs typeface="Times New Roman" panose="02020603050405020304" pitchFamily="18" charset="0"/>
+              </a:rPr>
+              <a:t>TOÁN ĐỒNG THUẬN </a:t>
             </a:r>
             <a:endParaRPr lang="en-US" sz="4000" dirty="0">
               <a:latin typeface="Arial" panose="020B0604020202020204" pitchFamily="34" charset="0"/>
@@ -6004,16 +8287,140 @@
           </a:p>
         </p:txBody>
       </p:sp>
+      <p:sp>
+        <p:nvSpPr>
+          <p:cNvPr id="5" name="Rectangle 4"/>
+          <p:cNvSpPr/>
+          <p:nvPr/>
+        </p:nvSpPr>
+        <p:spPr>
+          <a:xfrm>
+            <a:off x="0" y="0"/>
+            <a:ext cx="427839" cy="6858000"/>
+          </a:xfrm>
+          <a:prstGeom prst="rect">
+            <a:avLst/>
+          </a:prstGeom>
+          <a:solidFill>
+            <a:srgbClr val="AA2100"/>
+          </a:solidFill>
+        </p:spPr>
+        <p:style>
+          <a:lnRef idx="2">
+            <a:schemeClr val="accent1">
+              <a:shade val="50000"/>
+            </a:schemeClr>
+          </a:lnRef>
+          <a:fillRef idx="1">
+            <a:schemeClr val="accent1"/>
+          </a:fillRef>
+          <a:effectRef idx="0">
+            <a:schemeClr val="accent1"/>
+          </a:effectRef>
+          <a:fontRef idx="minor">
+            <a:schemeClr val="lt1"/>
+          </a:fontRef>
+        </p:style>
+        <p:txBody>
+          <a:bodyPr rtlCol="0" anchor="ctr"/>
+          <a:lstStyle/>
+          <a:p>
+            <a:pPr algn="ctr"/>
+            <a:endParaRPr lang="en-US">
+              <a:solidFill>
+                <a:srgbClr val="FF0000"/>
+              </a:solidFill>
+            </a:endParaRPr>
+          </a:p>
+        </p:txBody>
+      </p:sp>
+      <p:pic>
+        <p:nvPicPr>
+          <p:cNvPr id="7" name="Picture 6" descr="Thuật toán đồng thuận Blockchain là gì?"/>
+          <p:cNvPicPr/>
+          <p:nvPr/>
+        </p:nvPicPr>
+        <p:blipFill>
+          <a:blip r:embed="rId2" cstate="print">
+            <a:extLst>
+              <a:ext uri="{28A0092B-C50C-407E-A947-70E740481C1C}">
+                <a14:useLocalDpi xmlns:a14="http://schemas.microsoft.com/office/drawing/2010/main" val="0"/>
+              </a:ext>
+            </a:extLst>
+          </a:blip>
+          <a:srcRect/>
+          <a:stretch>
+            <a:fillRect/>
+          </a:stretch>
+        </p:blipFill>
+        <p:spPr>
+          <a:xfrm>
+            <a:off x="1069848" y="1247881"/>
+            <a:ext cx="4695952" cy="3239453"/>
+          </a:xfrm>
+          <a:prstGeom prst="rect">
+            <a:avLst/>
+          </a:prstGeom>
+          <a:noFill/>
+          <a:ln w="12700">
+            <a:solidFill>
+              <a:schemeClr val="tx1"/>
+            </a:solidFill>
+          </a:ln>
+        </p:spPr>
+      </p:pic>
+      <p:pic>
+        <p:nvPicPr>
+          <p:cNvPr id="8" name="Picture 7" descr="Thuật toán đồng thuận Blockchain là gì?"/>
+          <p:cNvPicPr/>
+          <p:nvPr/>
+        </p:nvPicPr>
+        <p:blipFill>
+          <a:blip r:embed="rId3" cstate="print">
+            <a:extLst>
+              <a:ext uri="{28A0092B-C50C-407E-A947-70E740481C1C}">
+                <a14:useLocalDpi xmlns:a14="http://schemas.microsoft.com/office/drawing/2010/main" val="0"/>
+              </a:ext>
+            </a:extLst>
+          </a:blip>
+          <a:srcRect/>
+          <a:stretch>
+            <a:fillRect/>
+          </a:stretch>
+        </p:blipFill>
+        <p:spPr>
+          <a:xfrm>
+            <a:off x="6099048" y="3348143"/>
+            <a:ext cx="5399405" cy="2837180"/>
+          </a:xfrm>
+          <a:prstGeom prst="rect">
+            <a:avLst/>
+          </a:prstGeom>
+          <a:noFill/>
+          <a:ln w="12700">
+            <a:solidFill>
+              <a:schemeClr val="tx1"/>
+            </a:solidFill>
+          </a:ln>
+        </p:spPr>
+      </p:pic>
     </p:spTree>
     <p:extLst>
       <p:ext uri="{BB962C8B-B14F-4D97-AF65-F5344CB8AC3E}">
-        <p14:creationId xmlns:p14="http://schemas.microsoft.com/office/powerpoint/2010/main" val="3871431453"/>
+        <p14:creationId xmlns:p14="http://schemas.microsoft.com/office/powerpoint/2010/main" val="827447603"/>
       </p:ext>
     </p:extLst>
   </p:cSld>
   <p:clrMapOvr>
     <a:masterClrMapping/>
   </p:clrMapOvr>
+  <p:timing>
+    <p:tnLst>
+      <p:par>
+        <p:cTn id="1" dur="indefinite" restart="never" nodeType="tmRoot"/>
+      </p:par>
+    </p:tnLst>
+  </p:timing>
 </p:sld>
 </file>
 
@@ -6112,6 +8519,53 @@
           </a:p>
         </p:txBody>
       </p:sp>
+      <p:sp>
+        <p:nvSpPr>
+          <p:cNvPr id="5" name="Rectangle 4"/>
+          <p:cNvSpPr/>
+          <p:nvPr/>
+        </p:nvSpPr>
+        <p:spPr>
+          <a:xfrm>
+            <a:off x="0" y="0"/>
+            <a:ext cx="427839" cy="6858000"/>
+          </a:xfrm>
+          <a:prstGeom prst="rect">
+            <a:avLst/>
+          </a:prstGeom>
+          <a:solidFill>
+            <a:srgbClr val="AA2100"/>
+          </a:solidFill>
+        </p:spPr>
+        <p:style>
+          <a:lnRef idx="2">
+            <a:schemeClr val="accent1">
+              <a:shade val="50000"/>
+            </a:schemeClr>
+          </a:lnRef>
+          <a:fillRef idx="1">
+            <a:schemeClr val="accent1"/>
+          </a:fillRef>
+          <a:effectRef idx="0">
+            <a:schemeClr val="accent1"/>
+          </a:effectRef>
+          <a:fontRef idx="minor">
+            <a:schemeClr val="lt1"/>
+          </a:fontRef>
+        </p:style>
+        <p:txBody>
+          <a:bodyPr rtlCol="0" anchor="ctr"/>
+          <a:lstStyle/>
+          <a:p>
+            <a:pPr algn="ctr"/>
+            <a:endParaRPr lang="en-US">
+              <a:solidFill>
+                <a:srgbClr val="FF0000"/>
+              </a:solidFill>
+            </a:endParaRPr>
+          </a:p>
+        </p:txBody>
+      </p:sp>
     </p:spTree>
     <p:extLst>
       <p:ext uri="{BB962C8B-B14F-4D97-AF65-F5344CB8AC3E}">
@@ -6122,6 +8576,13 @@
   <p:clrMapOvr>
     <a:masterClrMapping/>
   </p:clrMapOvr>
+  <p:timing>
+    <p:tnLst>
+      <p:par>
+        <p:cTn id="1" dur="indefinite" restart="never" nodeType="tmRoot"/>
+      </p:par>
+    </p:tnLst>
+  </p:timing>
 </p:sld>
 </file>
 
@@ -6165,22 +8626,22 @@
           <a:lstStyle/>
           <a:p>
             <a:r>
-              <a:rPr lang="vi-VN" sz="4000" dirty="0">
-                <a:latin typeface="Arial" panose="020B0604020202020204" pitchFamily="34" charset="0"/>
-                <a:cs typeface="Arial" panose="020B0604020202020204" pitchFamily="34" charset="0"/>
+              <a:rPr lang="vi-VN" sz="4000" b="1" dirty="0">
+                <a:latin typeface="Times New Roman" panose="02020603050405020304" pitchFamily="18" charset="0"/>
+                <a:cs typeface="Times New Roman" panose="02020603050405020304" pitchFamily="18" charset="0"/>
               </a:rPr>
               <a:t>Kết </a:t>
             </a:r>
             <a:r>
-              <a:rPr lang="vi-VN" sz="4000" dirty="0" smtClean="0">
-                <a:latin typeface="Arial" panose="020B0604020202020204" pitchFamily="34" charset="0"/>
-                <a:cs typeface="Arial" panose="020B0604020202020204" pitchFamily="34" charset="0"/>
+              <a:rPr lang="vi-VN" sz="4000" b="1" dirty="0">
+                <a:latin typeface="Times New Roman" panose="02020603050405020304" pitchFamily="18" charset="0"/>
+                <a:cs typeface="Times New Roman" panose="02020603050405020304" pitchFamily="18" charset="0"/>
               </a:rPr>
               <a:t>luận</a:t>
             </a:r>
-            <a:endParaRPr lang="en-US" sz="4000" dirty="0">
-              <a:latin typeface="Arial" panose="020B0604020202020204" pitchFamily="34" charset="0"/>
-              <a:cs typeface="Arial" panose="020B0604020202020204" pitchFamily="34" charset="0"/>
+            <a:endParaRPr lang="en-US" sz="4000" b="1" dirty="0">
+              <a:latin typeface="Times New Roman" panose="02020603050405020304" pitchFamily="18" charset="0"/>
+              <a:cs typeface="Times New Roman" panose="02020603050405020304" pitchFamily="18" charset="0"/>
             </a:endParaRPr>
           </a:p>
         </p:txBody>
@@ -6217,7 +8678,7 @@
         <p:spPr>
           <a:xfrm>
             <a:off x="1069848" y="5067300"/>
-            <a:ext cx="9883902" cy="872034"/>
+            <a:ext cx="9883902" cy="785343"/>
           </a:xfrm>
           <a:prstGeom prst="rect">
             <a:avLst/>
@@ -6242,23 +8703,19 @@
               </a:spcAft>
             </a:pPr>
             <a:r>
-              <a:rPr lang="en-US" dirty="0" smtClean="0">
+              <a:rPr lang="en-US" sz="1600" dirty="0" smtClean="0">
                 <a:latin typeface="Arial" panose="020B0604020202020204" pitchFamily="34" charset="0"/>
                 <a:cs typeface="Arial" panose="020B0604020202020204" pitchFamily="34" charset="0"/>
               </a:rPr>
               <a:t>=&gt; </a:t>
             </a:r>
             <a:r>
-              <a:rPr lang="en-US" dirty="0">
+              <a:rPr lang="en-US" sz="1600" dirty="0">
                 <a:latin typeface="Arial" panose="020B0604020202020204" pitchFamily="34" charset="0"/>
                 <a:cs typeface="Arial" panose="020B0604020202020204" pitchFamily="34" charset="0"/>
               </a:rPr>
               <a:t>DNS Blockchain là một giải pháp khả thi hiện nay, vừa phần nào giải quyết được bài toán bảo mật, vừa mang lại cơ hội khai thác phát triển triệt để giá trị của tên miền. </a:t>
             </a:r>
-            <a:endParaRPr lang="en-US" dirty="0">
-              <a:latin typeface="Arial" panose="020B0604020202020204" pitchFamily="34" charset="0"/>
-              <a:cs typeface="Arial" panose="020B0604020202020204" pitchFamily="34" charset="0"/>
-            </a:endParaRPr>
           </a:p>
         </p:txBody>
       </p:sp>
@@ -6271,7 +8728,7 @@
         <p:spPr>
           <a:xfrm>
             <a:off x="1069848" y="1408257"/>
-            <a:ext cx="10058400" cy="2841804"/>
+            <a:ext cx="10058400" cy="2800767"/>
           </a:xfrm>
           <a:prstGeom prst="rect">
             <a:avLst/>
@@ -6289,15 +8746,21 @@
                 <a:spcPct val="150000"/>
               </a:lnSpc>
               <a:spcBef>
-                <a:spcPts val="300"/>
+                <a:spcPts val="600"/>
               </a:spcBef>
               <a:spcAft>
                 <a:spcPts val="300"/>
               </a:spcAft>
             </a:pPr>
             <a:r>
-              <a:rPr lang="en-US" dirty="0">
-                <a:latin typeface="Arial" panose="020B0604020202020204" pitchFamily="34" charset="0"/>
+              <a:rPr lang="en-US" sz="2400" b="1" dirty="0">
+                <a:solidFill>
+                  <a:schemeClr val="accent2">
+                    <a:lumMod val="50000"/>
+                  </a:schemeClr>
+                </a:solidFill>
+                <a:latin typeface="Roboto" panose="02000000000000000000" pitchFamily="2" charset="0"/>
+                <a:ea typeface="Roboto" panose="02000000000000000000" pitchFamily="2" charset="0"/>
                 <a:cs typeface="Arial" panose="020B0604020202020204" pitchFamily="34" charset="0"/>
               </a:rPr>
               <a:t>Tóm tắt những điều mà đề tài đã đạt được:</a:t>
@@ -6318,7 +8781,7 @@
               <a:buChar char="v"/>
             </a:pPr>
             <a:r>
-              <a:rPr lang="en-US" dirty="0">
+              <a:rPr lang="en-US" sz="1600" dirty="0">
                 <a:latin typeface="Arial" panose="020B0604020202020204" pitchFamily="34" charset="0"/>
                 <a:cs typeface="Arial" panose="020B0604020202020204" pitchFamily="34" charset="0"/>
               </a:rPr>
@@ -6340,7 +8803,7 @@
               <a:buChar char="v"/>
             </a:pPr>
             <a:r>
-              <a:rPr lang="en-US" dirty="0">
+              <a:rPr lang="en-US" sz="1600" dirty="0">
                 <a:latin typeface="Arial" panose="020B0604020202020204" pitchFamily="34" charset="0"/>
                 <a:cs typeface="Arial" panose="020B0604020202020204" pitchFamily="34" charset="0"/>
               </a:rPr>
@@ -6362,7 +8825,7 @@
               <a:buChar char="v"/>
             </a:pPr>
             <a:r>
-              <a:rPr lang="en-US" dirty="0">
+              <a:rPr lang="en-US" sz="1600" dirty="0">
                 <a:latin typeface="Arial" panose="020B0604020202020204" pitchFamily="34" charset="0"/>
                 <a:cs typeface="Arial" panose="020B0604020202020204" pitchFamily="34" charset="0"/>
               </a:rPr>
@@ -6384,12 +8847,59 @@
               <a:buChar char="v"/>
             </a:pPr>
             <a:r>
-              <a:rPr lang="en-US" dirty="0">
+              <a:rPr lang="en-US" sz="1600" dirty="0">
                 <a:latin typeface="Arial" panose="020B0604020202020204" pitchFamily="34" charset="0"/>
                 <a:cs typeface="Arial" panose="020B0604020202020204" pitchFamily="34" charset="0"/>
               </a:rPr>
               <a:t>Phân giải tên miền và trả về kết quả thành công cho dù ở trên trình duyệt. </a:t>
             </a:r>
+          </a:p>
+        </p:txBody>
+      </p:sp>
+      <p:sp>
+        <p:nvSpPr>
+          <p:cNvPr id="6" name="Rectangle 5"/>
+          <p:cNvSpPr/>
+          <p:nvPr/>
+        </p:nvSpPr>
+        <p:spPr>
+          <a:xfrm>
+            <a:off x="0" y="0"/>
+            <a:ext cx="427839" cy="6858000"/>
+          </a:xfrm>
+          <a:prstGeom prst="rect">
+            <a:avLst/>
+          </a:prstGeom>
+          <a:solidFill>
+            <a:srgbClr val="AA2100"/>
+          </a:solidFill>
+        </p:spPr>
+        <p:style>
+          <a:lnRef idx="2">
+            <a:schemeClr val="accent1">
+              <a:shade val="50000"/>
+            </a:schemeClr>
+          </a:lnRef>
+          <a:fillRef idx="1">
+            <a:schemeClr val="accent1"/>
+          </a:fillRef>
+          <a:effectRef idx="0">
+            <a:schemeClr val="accent1"/>
+          </a:effectRef>
+          <a:fontRef idx="minor">
+            <a:schemeClr val="lt1"/>
+          </a:fontRef>
+        </p:style>
+        <p:txBody>
+          <a:bodyPr rtlCol="0" anchor="ctr"/>
+          <a:lstStyle/>
+          <a:p>
+            <a:pPr algn="ctr"/>
+            <a:endParaRPr lang="en-US">
+              <a:solidFill>
+                <a:srgbClr val="FF0000"/>
+              </a:solidFill>
+            </a:endParaRPr>
           </a:p>
         </p:txBody>
       </p:sp>
@@ -6403,6 +8913,13 @@
   <p:clrMapOvr>
     <a:masterClrMapping/>
   </p:clrMapOvr>
+  <p:timing>
+    <p:tnLst>
+      <p:par>
+        <p:cTn id="1" dur="indefinite" restart="never" nodeType="tmRoot"/>
+      </p:par>
+    </p:tnLst>
+  </p:timing>
 </p:sld>
 </file>
 
@@ -6446,29 +8963,29 @@
           <a:lstStyle/>
           <a:p>
             <a:r>
-              <a:rPr lang="vi-VN" sz="4000" dirty="0" smtClean="0">
-                <a:latin typeface="Arial" panose="020B0604020202020204" pitchFamily="34" charset="0"/>
-                <a:cs typeface="Arial" panose="020B0604020202020204" pitchFamily="34" charset="0"/>
+              <a:rPr lang="vi-VN" sz="4000" b="1" dirty="0">
+                <a:latin typeface="Times New Roman" panose="02020603050405020304" pitchFamily="18" charset="0"/>
+                <a:cs typeface="Times New Roman" panose="02020603050405020304" pitchFamily="18" charset="0"/>
               </a:rPr>
               <a:t>giải </a:t>
             </a:r>
             <a:r>
-              <a:rPr lang="vi-VN" sz="4000" dirty="0">
-                <a:latin typeface="Arial" panose="020B0604020202020204" pitchFamily="34" charset="0"/>
-                <a:cs typeface="Arial" panose="020B0604020202020204" pitchFamily="34" charset="0"/>
+              <a:rPr lang="vi-VN" sz="4000" b="1" dirty="0">
+                <a:latin typeface="Times New Roman" panose="02020603050405020304" pitchFamily="18" charset="0"/>
+                <a:cs typeface="Times New Roman" panose="02020603050405020304" pitchFamily="18" charset="0"/>
               </a:rPr>
               <a:t>pháp, đề </a:t>
             </a:r>
             <a:r>
-              <a:rPr lang="vi-VN" sz="4000" dirty="0" smtClean="0">
-                <a:latin typeface="Arial" panose="020B0604020202020204" pitchFamily="34" charset="0"/>
-                <a:cs typeface="Arial" panose="020B0604020202020204" pitchFamily="34" charset="0"/>
+              <a:rPr lang="vi-VN" sz="4000" b="1" dirty="0">
+                <a:latin typeface="Times New Roman" panose="02020603050405020304" pitchFamily="18" charset="0"/>
+                <a:cs typeface="Times New Roman" panose="02020603050405020304" pitchFamily="18" charset="0"/>
               </a:rPr>
               <a:t>xuất</a:t>
             </a:r>
-            <a:endParaRPr lang="en-US" sz="4000" dirty="0">
-              <a:latin typeface="Arial" panose="020B0604020202020204" pitchFamily="34" charset="0"/>
-              <a:cs typeface="Arial" panose="020B0604020202020204" pitchFamily="34" charset="0"/>
+            <a:endParaRPr lang="en-US" sz="4000" b="1" dirty="0">
+              <a:latin typeface="Times New Roman" panose="02020603050405020304" pitchFamily="18" charset="0"/>
+              <a:cs typeface="Times New Roman" panose="02020603050405020304" pitchFamily="18" charset="0"/>
             </a:endParaRPr>
           </a:p>
         </p:txBody>
@@ -6535,7 +9052,7 @@
         <p:spPr>
           <a:xfrm>
             <a:off x="1069848" y="1323975"/>
-            <a:ext cx="10744873" cy="4801314"/>
+            <a:ext cx="10744873" cy="4947508"/>
           </a:xfrm>
           <a:prstGeom prst="rect">
             <a:avLst/>
@@ -6549,8 +9066,14 @@
           <a:lstStyle/>
           <a:p>
             <a:r>
-              <a:rPr lang="en-US" dirty="0">
-                <a:latin typeface="Arial" panose="020B0604020202020204" pitchFamily="34" charset="0"/>
+              <a:rPr lang="en-US" sz="2400" b="1" dirty="0">
+                <a:solidFill>
+                  <a:schemeClr val="accent2">
+                    <a:lumMod val="50000"/>
+                  </a:schemeClr>
+                </a:solidFill>
+                <a:latin typeface="Roboto" panose="02000000000000000000" pitchFamily="2" charset="0"/>
+                <a:ea typeface="Roboto" panose="02000000000000000000" pitchFamily="2" charset="0"/>
                 <a:cs typeface="Arial" panose="020B0604020202020204" pitchFamily="34" charset="0"/>
               </a:rPr>
               <a:t>Trước khi nói về vấn đề chính, đề tài còn có những hạn chế nhất định sau đây:</a:t>
@@ -6558,35 +9081,41 @@
           </a:p>
           <a:p>
             <a:pPr marL="285750" lvl="0" indent="-285750">
+              <a:spcAft>
+                <a:spcPts val="300"/>
+              </a:spcAft>
               <a:buFont typeface="Wingdings" panose="05000000000000000000" pitchFamily="2" charset="2"/>
               <a:buChar char="§"/>
             </a:pPr>
             <a:r>
-              <a:rPr lang="en-US" dirty="0">
+              <a:rPr lang="en-US" sz="1600" dirty="0">
                 <a:latin typeface="Arial" panose="020B0604020202020204" pitchFamily="34" charset="0"/>
                 <a:cs typeface="Arial" panose="020B0604020202020204" pitchFamily="34" charset="0"/>
               </a:rPr>
               <a:t>Vì là máy tính cá nhân không thể làm việc ở thời gian liên tục và lâu dài cần phải bật tắt hàng ngày nên </a:t>
             </a:r>
             <a:r>
-              <a:rPr lang="en-US" dirty="0" smtClean="0">
+              <a:rPr lang="en-US" sz="1600" dirty="0" smtClean="0">
                 <a:latin typeface="Arial" panose="020B0604020202020204" pitchFamily="34" charset="0"/>
                 <a:cs typeface="Arial" panose="020B0604020202020204" pitchFamily="34" charset="0"/>
               </a:rPr>
               <a:t>phải dùng đến PostgreSQL.</a:t>
             </a:r>
-            <a:endParaRPr lang="en-US" dirty="0">
+            <a:endParaRPr lang="en-US" sz="1600" dirty="0">
               <a:latin typeface="Arial" panose="020B0604020202020204" pitchFamily="34" charset="0"/>
               <a:cs typeface="Arial" panose="020B0604020202020204" pitchFamily="34" charset="0"/>
             </a:endParaRPr>
           </a:p>
           <a:p>
             <a:pPr marL="285750" lvl="0" indent="-285750">
+              <a:spcAft>
+                <a:spcPts val="300"/>
+              </a:spcAft>
               <a:buFont typeface="Wingdings" panose="05000000000000000000" pitchFamily="2" charset="2"/>
               <a:buChar char="§"/>
             </a:pPr>
             <a:r>
-              <a:rPr lang="en-US" dirty="0">
+              <a:rPr lang="en-US" sz="1600" dirty="0">
                 <a:latin typeface="Arial" panose="020B0604020202020204" pitchFamily="34" charset="0"/>
                 <a:cs typeface="Arial" panose="020B0604020202020204" pitchFamily="34" charset="0"/>
               </a:rPr>
@@ -6595,49 +9124,55 @@
           </a:p>
           <a:p>
             <a:pPr marL="285750" lvl="0" indent="-285750">
+              <a:spcAft>
+                <a:spcPts val="300"/>
+              </a:spcAft>
               <a:buFont typeface="Wingdings" panose="05000000000000000000" pitchFamily="2" charset="2"/>
               <a:buChar char="§"/>
             </a:pPr>
             <a:r>
-              <a:rPr lang="en-US" dirty="0">
+              <a:rPr lang="en-US" sz="1600" dirty="0">
                 <a:latin typeface="Arial" panose="020B0604020202020204" pitchFamily="34" charset="0"/>
                 <a:cs typeface="Arial" panose="020B0604020202020204" pitchFamily="34" charset="0"/>
               </a:rPr>
               <a:t>Vì </a:t>
             </a:r>
             <a:r>
-              <a:rPr lang="en-US" dirty="0" smtClean="0">
+              <a:rPr lang="en-US" sz="1600" dirty="0" smtClean="0">
                 <a:latin typeface="Arial" panose="020B0604020202020204" pitchFamily="34" charset="0"/>
                 <a:cs typeface="Arial" panose="020B0604020202020204" pitchFamily="34" charset="0"/>
               </a:rPr>
               <a:t>không phải là một Server tiêu chuẩn nên hiệu </a:t>
             </a:r>
             <a:r>
-              <a:rPr lang="en-US" dirty="0">
+              <a:rPr lang="en-US" sz="1600" dirty="0">
                 <a:latin typeface="Arial" panose="020B0604020202020204" pitchFamily="34" charset="0"/>
                 <a:cs typeface="Arial" panose="020B0604020202020204" pitchFamily="34" charset="0"/>
               </a:rPr>
               <a:t>suất truyền dẫn có phần thấp hơn hệ thống DNS thông thường</a:t>
             </a:r>
             <a:r>
-              <a:rPr lang="en-US" dirty="0" smtClean="0">
+              <a:rPr lang="en-US" sz="1600" dirty="0" smtClean="0">
                 <a:latin typeface="Arial" panose="020B0604020202020204" pitchFamily="34" charset="0"/>
                 <a:cs typeface="Arial" panose="020B0604020202020204" pitchFamily="34" charset="0"/>
               </a:rPr>
               <a:t>.</a:t>
             </a:r>
-            <a:endParaRPr lang="en-US" dirty="0">
+            <a:endParaRPr lang="en-US" sz="1600" dirty="0">
               <a:latin typeface="Arial" panose="020B0604020202020204" pitchFamily="34" charset="0"/>
               <a:cs typeface="Arial" panose="020B0604020202020204" pitchFamily="34" charset="0"/>
             </a:endParaRPr>
           </a:p>
           <a:p>
             <a:pPr marL="285750" lvl="0" indent="-285750">
+              <a:spcAft>
+                <a:spcPts val="300"/>
+              </a:spcAft>
               <a:buFont typeface="Wingdings" panose="05000000000000000000" pitchFamily="2" charset="2"/>
               <a:buChar char="§"/>
             </a:pPr>
             <a:r>
-              <a:rPr lang="en-US" dirty="0">
+              <a:rPr lang="en-US" sz="1600" dirty="0">
                 <a:latin typeface="Arial" panose="020B0604020202020204" pitchFamily="34" charset="0"/>
                 <a:cs typeface="Arial" panose="020B0604020202020204" pitchFamily="34" charset="0"/>
               </a:rPr>
@@ -6646,18 +9181,21 @@
           </a:p>
           <a:p>
             <a:pPr marL="285750" lvl="0" indent="-285750">
+              <a:spcAft>
+                <a:spcPts val="300"/>
+              </a:spcAft>
               <a:buFont typeface="Wingdings" panose="05000000000000000000" pitchFamily="2" charset="2"/>
               <a:buChar char="§"/>
             </a:pPr>
             <a:r>
-              <a:rPr lang="en-US" dirty="0">
+              <a:rPr lang="en-US" sz="1600" dirty="0">
                 <a:latin typeface="Arial" panose="020B0604020202020204" pitchFamily="34" charset="0"/>
                 <a:cs typeface="Arial" panose="020B0604020202020204" pitchFamily="34" charset="0"/>
               </a:rPr>
               <a:t>Chưa thể ngăn được các loại tấn công nghe lén hay truyền tin</a:t>
             </a:r>
             <a:r>
-              <a:rPr lang="en-US" dirty="0" smtClean="0">
+              <a:rPr lang="en-US" sz="1600" dirty="0" smtClean="0">
                 <a:latin typeface="Arial" panose="020B0604020202020204" pitchFamily="34" charset="0"/>
                 <a:cs typeface="Arial" panose="020B0604020202020204" pitchFamily="34" charset="0"/>
               </a:rPr>
@@ -6676,8 +9214,14 @@
           </a:p>
           <a:p>
             <a:r>
-              <a:rPr lang="en-US" dirty="0">
-                <a:latin typeface="Arial" panose="020B0604020202020204" pitchFamily="34" charset="0"/>
+              <a:rPr lang="en-US" sz="2400" b="1" dirty="0">
+                <a:solidFill>
+                  <a:schemeClr val="accent2">
+                    <a:lumMod val="50000"/>
+                  </a:schemeClr>
+                </a:solidFill>
+                <a:latin typeface="Roboto" panose="02000000000000000000" pitchFamily="2" charset="0"/>
+                <a:ea typeface="Roboto" panose="02000000000000000000" pitchFamily="2" charset="0"/>
                 <a:cs typeface="Arial" panose="020B0604020202020204" pitchFamily="34" charset="0"/>
               </a:rPr>
               <a:t>Các hướng mở rộng sẽ phần lớn nhắm vào hạn chế đã nêu trên như sau :</a:t>
@@ -6685,11 +9229,14 @@
           </a:p>
           <a:p>
             <a:pPr marL="285750" lvl="0" indent="-285750">
+              <a:spcAft>
+                <a:spcPts val="300"/>
+              </a:spcAft>
               <a:buFont typeface="Wingdings" panose="05000000000000000000" pitchFamily="2" charset="2"/>
               <a:buChar char="§"/>
             </a:pPr>
             <a:r>
-              <a:rPr lang="en-US" dirty="0">
+              <a:rPr lang="en-US" sz="1600" dirty="0">
                 <a:latin typeface="Arial" panose="020B0604020202020204" pitchFamily="34" charset="0"/>
                 <a:cs typeface="Arial" panose="020B0604020202020204" pitchFamily="34" charset="0"/>
               </a:rPr>
@@ -6698,11 +9245,14 @@
           </a:p>
           <a:p>
             <a:pPr marL="285750" lvl="0" indent="-285750">
+              <a:spcAft>
+                <a:spcPts val="300"/>
+              </a:spcAft>
               <a:buFont typeface="Wingdings" panose="05000000000000000000" pitchFamily="2" charset="2"/>
               <a:buChar char="§"/>
             </a:pPr>
             <a:r>
-              <a:rPr lang="en-US" dirty="0">
+              <a:rPr lang="en-US" sz="1600" dirty="0">
                 <a:latin typeface="Arial" panose="020B0604020202020204" pitchFamily="34" charset="0"/>
                 <a:cs typeface="Arial" panose="020B0604020202020204" pitchFamily="34" charset="0"/>
               </a:rPr>
@@ -6711,16 +9261,66 @@
           </a:p>
           <a:p>
             <a:pPr marL="285750" lvl="0" indent="-285750">
+              <a:spcAft>
+                <a:spcPts val="300"/>
+              </a:spcAft>
               <a:buFont typeface="Wingdings" panose="05000000000000000000" pitchFamily="2" charset="2"/>
               <a:buChar char="§"/>
             </a:pPr>
             <a:r>
-              <a:rPr lang="en-US" dirty="0">
+              <a:rPr lang="en-US" sz="1600" dirty="0">
                 <a:latin typeface="Arial" panose="020B0604020202020204" pitchFamily="34" charset="0"/>
                 <a:cs typeface="Arial" panose="020B0604020202020204" pitchFamily="34" charset="0"/>
               </a:rPr>
               <a:t>Giao diện và ứng dụng được áp dụng ở nhiều môi trường khác nhau kể cả điện thoại. </a:t>
             </a:r>
+          </a:p>
+        </p:txBody>
+      </p:sp>
+      <p:sp>
+        <p:nvSpPr>
+          <p:cNvPr id="6" name="Rectangle 5"/>
+          <p:cNvSpPr/>
+          <p:nvPr/>
+        </p:nvSpPr>
+        <p:spPr>
+          <a:xfrm>
+            <a:off x="0" y="0"/>
+            <a:ext cx="427839" cy="6858000"/>
+          </a:xfrm>
+          <a:prstGeom prst="rect">
+            <a:avLst/>
+          </a:prstGeom>
+          <a:solidFill>
+            <a:srgbClr val="AA2100"/>
+          </a:solidFill>
+        </p:spPr>
+        <p:style>
+          <a:lnRef idx="2">
+            <a:schemeClr val="accent1">
+              <a:shade val="50000"/>
+            </a:schemeClr>
+          </a:lnRef>
+          <a:fillRef idx="1">
+            <a:schemeClr val="accent1"/>
+          </a:fillRef>
+          <a:effectRef idx="0">
+            <a:schemeClr val="accent1"/>
+          </a:effectRef>
+          <a:fontRef idx="minor">
+            <a:schemeClr val="lt1"/>
+          </a:fontRef>
+        </p:style>
+        <p:txBody>
+          <a:bodyPr rtlCol="0" anchor="ctr"/>
+          <a:lstStyle/>
+          <a:p>
+            <a:pPr algn="ctr"/>
+            <a:endParaRPr lang="en-US">
+              <a:solidFill>
+                <a:srgbClr val="FF0000"/>
+              </a:solidFill>
+            </a:endParaRPr>
           </a:p>
         </p:txBody>
       </p:sp>
@@ -6734,6 +9334,13 @@
   <p:clrMapOvr>
     <a:masterClrMapping/>
   </p:clrMapOvr>
+  <p:timing>
+    <p:tnLst>
+      <p:par>
+        <p:cTn id="1" dur="indefinite" restart="never" nodeType="tmRoot"/>
+      </p:par>
+    </p:tnLst>
+  </p:timing>
 </p:sld>
 </file>
 

</xml_diff>

<commit_message>
Set link and prepare
</commit_message>
<xml_diff>
--- a/slide/D17CQAT01_PhanDai_N17DCAT013.pptx
+++ b/slide/D17CQAT01_PhanDai_N17DCAT013.pptx
@@ -2,28 +2,28 @@
 <file path=ppt/presentation.xml><?xml version="1.0" encoding="utf-8"?>
 <p:presentation xmlns:a="http://schemas.openxmlformats.org/drawingml/2006/main" xmlns:r="http://schemas.openxmlformats.org/officeDocument/2006/relationships" xmlns:p="http://schemas.openxmlformats.org/presentationml/2006/main">
   <p:sldMasterIdLst>
-    <p:sldMasterId id="2147483660" r:id="rId1"/>
+    <p:sldMasterId id="2147483648" r:id="rId1"/>
   </p:sldMasterIdLst>
   <p:notesMasterIdLst>
-    <p:notesMasterId r:id="rId18"/>
+    <p:notesMasterId r:id="rId19"/>
   </p:notesMasterIdLst>
   <p:sldIdLst>
-    <p:sldId id="256" r:id="rId2"/>
-    <p:sldId id="257" r:id="rId3"/>
-    <p:sldId id="261" r:id="rId4"/>
-    <p:sldId id="260" r:id="rId5"/>
-    <p:sldId id="272" r:id="rId6"/>
-    <p:sldId id="266" r:id="rId7"/>
-    <p:sldId id="273" r:id="rId8"/>
-    <p:sldId id="271" r:id="rId9"/>
-    <p:sldId id="274" r:id="rId10"/>
-    <p:sldId id="275" r:id="rId11"/>
-    <p:sldId id="276" r:id="rId12"/>
-    <p:sldId id="277" r:id="rId13"/>
-    <p:sldId id="278" r:id="rId14"/>
-    <p:sldId id="262" r:id="rId15"/>
-    <p:sldId id="259" r:id="rId16"/>
-    <p:sldId id="258" r:id="rId17"/>
+    <p:sldId id="256" r:id="rId3"/>
+    <p:sldId id="257" r:id="rId4"/>
+    <p:sldId id="261" r:id="rId5"/>
+    <p:sldId id="260" r:id="rId6"/>
+    <p:sldId id="272" r:id="rId7"/>
+    <p:sldId id="266" r:id="rId8"/>
+    <p:sldId id="273" r:id="rId9"/>
+    <p:sldId id="271" r:id="rId10"/>
+    <p:sldId id="274" r:id="rId11"/>
+    <p:sldId id="275" r:id="rId12"/>
+    <p:sldId id="276" r:id="rId13"/>
+    <p:sldId id="277" r:id="rId14"/>
+    <p:sldId id="278" r:id="rId15"/>
+    <p:sldId id="262" r:id="rId16"/>
+    <p:sldId id="259" r:id="rId17"/>
+    <p:sldId id="258" r:id="rId18"/>
   </p:sldIdLst>
   <p:sldSz cx="12192000" cy="6858000"/>
   <p:notesSz cx="6858000" cy="9144000"/>
@@ -122,11 +122,6 @@
       </a:defRPr>
     </a:lvl9pPr>
   </p:defaultTextStyle>
-  <p:extLst>
-    <p:ext uri="{EFAFB233-063F-42B5-8137-9DF3F51BA10A}">
-      <p15:sldGuideLst xmlns:p15="http://schemas.microsoft.com/office/powerpoint/2012/main"/>
-    </p:ext>
-  </p:extLst>
 </p:presentation>
 </file>
 
@@ -212,7 +207,6 @@
           <a:p>
             <a:fld id="{4D90CDED-DED5-4950-8D8A-00FFCAA83A1B}" type="datetimeFigureOut">
               <a:rPr lang="en-US" smtClean="0"/>
-              <a:t>12/12/2021</a:t>
             </a:fld>
             <a:endParaRPr lang="en-US"/>
           </a:p>
@@ -279,6 +273,7 @@
               <a:rPr lang="en-US" smtClean="0"/>
               <a:t>Edit Master text styles</a:t>
             </a:r>
+            <a:endParaRPr lang="en-US" smtClean="0"/>
           </a:p>
           <a:p>
             <a:pPr lvl="1"/>
@@ -286,6 +281,7 @@
               <a:rPr lang="en-US" smtClean="0"/>
               <a:t>Second level</a:t>
             </a:r>
+            <a:endParaRPr lang="en-US" smtClean="0"/>
           </a:p>
           <a:p>
             <a:pPr lvl="2"/>
@@ -293,6 +289,7 @@
               <a:rPr lang="en-US" smtClean="0"/>
               <a:t>Third level</a:t>
             </a:r>
+            <a:endParaRPr lang="en-US" smtClean="0"/>
           </a:p>
           <a:p>
             <a:pPr lvl="3"/>
@@ -300,6 +297,7 @@
               <a:rPr lang="en-US" smtClean="0"/>
               <a:t>Fourth level</a:t>
             </a:r>
+            <a:endParaRPr lang="en-US" smtClean="0"/>
           </a:p>
           <a:p>
             <a:pPr lvl="4"/>
@@ -371,7 +369,6 @@
           <a:p>
             <a:fld id="{FD20B253-7E6D-4FFF-A48B-C518ADBC2D7F}" type="slidenum">
               <a:rPr lang="en-US" smtClean="0"/>
-              <a:t>‹#›</a:t>
             </a:fld>
             <a:endParaRPr lang="en-US"/>
           </a:p>
@@ -476,7 +473,7 @@
 </file>
 
 <file path=ppt/slideLayouts/slideLayout1.xml><?xml version="1.0" encoding="utf-8"?>
-<p:sldLayout xmlns:a="http://schemas.openxmlformats.org/drawingml/2006/main" xmlns:r="http://schemas.openxmlformats.org/officeDocument/2006/relationships" xmlns:p="http://schemas.openxmlformats.org/presentationml/2006/main" showMasterSp="0" type="title" preserve="1">
+<p:sldLayout xmlns:a="http://schemas.openxmlformats.org/drawingml/2006/main" xmlns:r="http://schemas.openxmlformats.org/officeDocument/2006/relationships" xmlns:p="http://schemas.openxmlformats.org/presentationml/2006/main" type="title" preserve="1" showMasterSp="0">
   <p:cSld name="Title Slide">
     <p:spTree>
       <p:nvGrpSpPr>
@@ -878,7 +875,6 @@
           <a:p>
             <a:fld id="{9CC9E0FF-7D19-4510-9DCE-23D201D9E916}" type="datetime1">
               <a:rPr lang="en-US" smtClean="0"/>
-              <a:t>12/12/2021</a:t>
             </a:fld>
             <a:endParaRPr lang="en-US"/>
           </a:p>
@@ -929,18 +925,12 @@
           <a:p>
             <a:fld id="{040DEF24-717E-4741-8753-F7E431A261E5}" type="slidenum">
               <a:rPr lang="en-US" smtClean="0"/>
-              <a:t>‹#›</a:t>
             </a:fld>
             <a:endParaRPr lang="en-US"/>
           </a:p>
         </p:txBody>
       </p:sp>
     </p:spTree>
-    <p:extLst>
-      <p:ext uri="{BB962C8B-B14F-4D97-AF65-F5344CB8AC3E}">
-        <p14:creationId xmlns:p14="http://schemas.microsoft.com/office/powerpoint/2010/main" val="2019267981"/>
-      </p:ext>
-    </p:extLst>
   </p:cSld>
   <p:clrMapOvr>
     <a:masterClrMapping/>
@@ -1008,6 +998,7 @@
               <a:rPr lang="en-US" smtClean="0"/>
               <a:t>Edit Master text styles</a:t>
             </a:r>
+            <a:endParaRPr lang="en-US" smtClean="0"/>
           </a:p>
           <a:p>
             <a:pPr lvl="1"/>
@@ -1015,6 +1006,7 @@
               <a:rPr lang="en-US" smtClean="0"/>
               <a:t>Second level</a:t>
             </a:r>
+            <a:endParaRPr lang="en-US" smtClean="0"/>
           </a:p>
           <a:p>
             <a:pPr lvl="2"/>
@@ -1022,6 +1014,7 @@
               <a:rPr lang="en-US" smtClean="0"/>
               <a:t>Third level</a:t>
             </a:r>
+            <a:endParaRPr lang="en-US" smtClean="0"/>
           </a:p>
           <a:p>
             <a:pPr lvl="3"/>
@@ -1029,6 +1022,7 @@
               <a:rPr lang="en-US" smtClean="0"/>
               <a:t>Fourth level</a:t>
             </a:r>
+            <a:endParaRPr lang="en-US" smtClean="0"/>
           </a:p>
           <a:p>
             <a:pPr lvl="4"/>
@@ -1057,7 +1051,6 @@
           <a:p>
             <a:fld id="{02BE6C0D-AE79-4D98-BA3B-E3751AE5331F}" type="datetime1">
               <a:rPr lang="en-US" smtClean="0"/>
-              <a:t>12/12/2021</a:t>
             </a:fld>
             <a:endParaRPr lang="en-US"/>
           </a:p>
@@ -1099,18 +1092,12 @@
           <a:p>
             <a:fld id="{040DEF24-717E-4741-8753-F7E431A261E5}" type="slidenum">
               <a:rPr lang="en-US" smtClean="0"/>
-              <a:t>‹#›</a:t>
             </a:fld>
             <a:endParaRPr lang="en-US"/>
           </a:p>
         </p:txBody>
       </p:sp>
     </p:spTree>
-    <p:extLst>
-      <p:ext uri="{BB962C8B-B14F-4D97-AF65-F5344CB8AC3E}">
-        <p14:creationId xmlns:p14="http://schemas.microsoft.com/office/powerpoint/2010/main" val="1273978564"/>
-      </p:ext>
-    </p:extLst>
   </p:cSld>
   <p:clrMapOvr>
     <a:masterClrMapping/>
@@ -1188,6 +1175,7 @@
               <a:rPr lang="en-US" smtClean="0"/>
               <a:t>Edit Master text styles</a:t>
             </a:r>
+            <a:endParaRPr lang="en-US" smtClean="0"/>
           </a:p>
           <a:p>
             <a:pPr lvl="1"/>
@@ -1195,6 +1183,7 @@
               <a:rPr lang="en-US" smtClean="0"/>
               <a:t>Second level</a:t>
             </a:r>
+            <a:endParaRPr lang="en-US" smtClean="0"/>
           </a:p>
           <a:p>
             <a:pPr lvl="2"/>
@@ -1202,6 +1191,7 @@
               <a:rPr lang="en-US" smtClean="0"/>
               <a:t>Third level</a:t>
             </a:r>
+            <a:endParaRPr lang="en-US" smtClean="0"/>
           </a:p>
           <a:p>
             <a:pPr lvl="3"/>
@@ -1209,6 +1199,7 @@
               <a:rPr lang="en-US" smtClean="0"/>
               <a:t>Fourth level</a:t>
             </a:r>
+            <a:endParaRPr lang="en-US" smtClean="0"/>
           </a:p>
           <a:p>
             <a:pPr lvl="4"/>
@@ -1237,7 +1228,6 @@
           <a:p>
             <a:fld id="{64794B53-B5A7-48E6-89FC-70BEF208D151}" type="datetime1">
               <a:rPr lang="en-US" smtClean="0"/>
-              <a:t>12/12/2021</a:t>
             </a:fld>
             <a:endParaRPr lang="en-US"/>
           </a:p>
@@ -1279,18 +1269,12 @@
           <a:p>
             <a:fld id="{040DEF24-717E-4741-8753-F7E431A261E5}" type="slidenum">
               <a:rPr lang="en-US" smtClean="0"/>
-              <a:t>‹#›</a:t>
             </a:fld>
             <a:endParaRPr lang="en-US"/>
           </a:p>
         </p:txBody>
       </p:sp>
     </p:spTree>
-    <p:extLst>
-      <p:ext uri="{BB962C8B-B14F-4D97-AF65-F5344CB8AC3E}">
-        <p14:creationId xmlns:p14="http://schemas.microsoft.com/office/powerpoint/2010/main" val="954411345"/>
-      </p:ext>
-    </p:extLst>
   </p:cSld>
   <p:clrMapOvr>
     <a:masterClrMapping/>
@@ -1358,6 +1342,7 @@
               <a:rPr lang="en-US" smtClean="0"/>
               <a:t>Edit Master text styles</a:t>
             </a:r>
+            <a:endParaRPr lang="en-US" smtClean="0"/>
           </a:p>
           <a:p>
             <a:pPr lvl="1"/>
@@ -1365,6 +1350,7 @@
               <a:rPr lang="en-US" smtClean="0"/>
               <a:t>Second level</a:t>
             </a:r>
+            <a:endParaRPr lang="en-US" smtClean="0"/>
           </a:p>
           <a:p>
             <a:pPr lvl="2"/>
@@ -1372,6 +1358,7 @@
               <a:rPr lang="en-US" smtClean="0"/>
               <a:t>Third level</a:t>
             </a:r>
+            <a:endParaRPr lang="en-US" smtClean="0"/>
           </a:p>
           <a:p>
             <a:pPr lvl="3"/>
@@ -1379,6 +1366,7 @@
               <a:rPr lang="en-US" smtClean="0"/>
               <a:t>Fourth level</a:t>
             </a:r>
+            <a:endParaRPr lang="en-US" smtClean="0"/>
           </a:p>
           <a:p>
             <a:pPr lvl="4"/>
@@ -1407,7 +1395,6 @@
           <a:p>
             <a:fld id="{E4F4B884-B57B-462C-B739-9A72F1ADE961}" type="datetime1">
               <a:rPr lang="en-US" smtClean="0"/>
-              <a:t>12/12/2021</a:t>
             </a:fld>
             <a:endParaRPr lang="en-US"/>
           </a:p>
@@ -1449,18 +1436,12 @@
           <a:p>
             <a:fld id="{040DEF24-717E-4741-8753-F7E431A261E5}" type="slidenum">
               <a:rPr lang="en-US" smtClean="0"/>
-              <a:t>‹#›</a:t>
             </a:fld>
             <a:endParaRPr lang="en-US"/>
           </a:p>
         </p:txBody>
       </p:sp>
     </p:spTree>
-    <p:extLst>
-      <p:ext uri="{BB962C8B-B14F-4D97-AF65-F5344CB8AC3E}">
-        <p14:creationId xmlns:p14="http://schemas.microsoft.com/office/powerpoint/2010/main" val="2316485866"/>
-      </p:ext>
-    </p:extLst>
   </p:cSld>
   <p:clrMapOvr>
     <a:masterClrMapping/>
@@ -1469,7 +1450,7 @@
 </file>
 
 <file path=ppt/slideLayouts/slideLayout3.xml><?xml version="1.0" encoding="utf-8"?>
-<p:sldLayout xmlns:a="http://schemas.openxmlformats.org/drawingml/2006/main" xmlns:r="http://schemas.openxmlformats.org/officeDocument/2006/relationships" xmlns:p="http://schemas.openxmlformats.org/presentationml/2006/main" showMasterSp="0" type="secHead" preserve="1">
+<p:sldLayout xmlns:a="http://schemas.openxmlformats.org/drawingml/2006/main" xmlns:r="http://schemas.openxmlformats.org/officeDocument/2006/relationships" xmlns:p="http://schemas.openxmlformats.org/presentationml/2006/main" type="secHead" preserve="1" showMasterSp="0">
   <p:cSld name="Section Header">
     <p:spTree>
       <p:nvGrpSpPr>
@@ -1695,6 +1676,7 @@
               <a:rPr lang="en-US" smtClean="0"/>
               <a:t>Edit Master text styles</a:t>
             </a:r>
+            <a:endParaRPr lang="en-US" smtClean="0"/>
           </a:p>
         </p:txBody>
       </p:sp>
@@ -1720,7 +1702,6 @@
           <a:p>
             <a:fld id="{B9C8D748-A08B-490E-87AA-BC3835B708B2}" type="datetime1">
               <a:rPr lang="en-US" smtClean="0"/>
-              <a:t>12/12/2021</a:t>
             </a:fld>
             <a:endParaRPr lang="en-US"/>
           </a:p>
@@ -1860,18 +1841,12 @@
           <a:p>
             <a:fld id="{040DEF24-717E-4741-8753-F7E431A261E5}" type="slidenum">
               <a:rPr lang="en-US" smtClean="0"/>
-              <a:t>‹#›</a:t>
             </a:fld>
             <a:endParaRPr lang="en-US"/>
           </a:p>
         </p:txBody>
       </p:sp>
     </p:spTree>
-    <p:extLst>
-      <p:ext uri="{BB962C8B-B14F-4D97-AF65-F5344CB8AC3E}">
-        <p14:creationId xmlns:p14="http://schemas.microsoft.com/office/powerpoint/2010/main" val="2532839539"/>
-      </p:ext>
-    </p:extLst>
   </p:cSld>
   <p:clrMapOvr>
     <a:masterClrMapping/>
@@ -1972,6 +1947,7 @@
               <a:rPr lang="en-US" smtClean="0"/>
               <a:t>Edit Master text styles</a:t>
             </a:r>
+            <a:endParaRPr lang="en-US" smtClean="0"/>
           </a:p>
           <a:p>
             <a:pPr lvl="1"/>
@@ -1979,6 +1955,7 @@
               <a:rPr lang="en-US" smtClean="0"/>
               <a:t>Second level</a:t>
             </a:r>
+            <a:endParaRPr lang="en-US" smtClean="0"/>
           </a:p>
           <a:p>
             <a:pPr lvl="2"/>
@@ -1986,6 +1963,7 @@
               <a:rPr lang="en-US" smtClean="0"/>
               <a:t>Third level</a:t>
             </a:r>
+            <a:endParaRPr lang="en-US" smtClean="0"/>
           </a:p>
           <a:p>
             <a:pPr lvl="3"/>
@@ -1993,6 +1971,7 @@
               <a:rPr lang="en-US" smtClean="0"/>
               <a:t>Fourth level</a:t>
             </a:r>
+            <a:endParaRPr lang="en-US" smtClean="0"/>
           </a:p>
           <a:p>
             <a:pPr lvl="4"/>
@@ -2057,6 +2036,7 @@
               <a:rPr lang="en-US" smtClean="0"/>
               <a:t>Edit Master text styles</a:t>
             </a:r>
+            <a:endParaRPr lang="en-US" smtClean="0"/>
           </a:p>
           <a:p>
             <a:pPr lvl="1"/>
@@ -2064,6 +2044,7 @@
               <a:rPr lang="en-US" smtClean="0"/>
               <a:t>Second level</a:t>
             </a:r>
+            <a:endParaRPr lang="en-US" smtClean="0"/>
           </a:p>
           <a:p>
             <a:pPr lvl="2"/>
@@ -2071,6 +2052,7 @@
               <a:rPr lang="en-US" smtClean="0"/>
               <a:t>Third level</a:t>
             </a:r>
+            <a:endParaRPr lang="en-US" smtClean="0"/>
           </a:p>
           <a:p>
             <a:pPr lvl="3"/>
@@ -2078,6 +2060,7 @@
               <a:rPr lang="en-US" smtClean="0"/>
               <a:t>Fourth level</a:t>
             </a:r>
+            <a:endParaRPr lang="en-US" smtClean="0"/>
           </a:p>
           <a:p>
             <a:pPr lvl="4"/>
@@ -2106,7 +2089,6 @@
           <a:p>
             <a:fld id="{0FCBCAE6-D603-4735-B4B0-803AAA3FEC04}" type="datetime1">
               <a:rPr lang="en-US" smtClean="0"/>
-              <a:t>12/12/2021</a:t>
             </a:fld>
             <a:endParaRPr lang="en-US"/>
           </a:p>
@@ -2148,18 +2130,12 @@
           <a:p>
             <a:fld id="{040DEF24-717E-4741-8753-F7E431A261E5}" type="slidenum">
               <a:rPr lang="en-US" smtClean="0"/>
-              <a:t>‹#›</a:t>
             </a:fld>
             <a:endParaRPr lang="en-US"/>
           </a:p>
         </p:txBody>
       </p:sp>
     </p:spTree>
-    <p:extLst>
-      <p:ext uri="{BB962C8B-B14F-4D97-AF65-F5344CB8AC3E}">
-        <p14:creationId xmlns:p14="http://schemas.microsoft.com/office/powerpoint/2010/main" val="3095659412"/>
-      </p:ext>
-    </p:extLst>
   </p:cSld>
   <p:clrMapOvr>
     <a:masterClrMapping/>
@@ -2277,6 +2253,7 @@
               <a:rPr lang="en-US" smtClean="0"/>
               <a:t>Edit Master text styles</a:t>
             </a:r>
+            <a:endParaRPr lang="en-US" smtClean="0"/>
           </a:p>
         </p:txBody>
       </p:sp>
@@ -2333,6 +2310,7 @@
               <a:rPr lang="en-US" smtClean="0"/>
               <a:t>Edit Master text styles</a:t>
             </a:r>
+            <a:endParaRPr lang="en-US" smtClean="0"/>
           </a:p>
           <a:p>
             <a:pPr lvl="1"/>
@@ -2340,6 +2318,7 @@
               <a:rPr lang="en-US" smtClean="0"/>
               <a:t>Second level</a:t>
             </a:r>
+            <a:endParaRPr lang="en-US" smtClean="0"/>
           </a:p>
           <a:p>
             <a:pPr lvl="2"/>
@@ -2347,6 +2326,7 @@
               <a:rPr lang="en-US" smtClean="0"/>
               <a:t>Third level</a:t>
             </a:r>
+            <a:endParaRPr lang="en-US" smtClean="0"/>
           </a:p>
           <a:p>
             <a:pPr lvl="3"/>
@@ -2354,6 +2334,7 @@
               <a:rPr lang="en-US" smtClean="0"/>
               <a:t>Fourth level</a:t>
             </a:r>
+            <a:endParaRPr lang="en-US" smtClean="0"/>
           </a:p>
           <a:p>
             <a:pPr lvl="4"/>
@@ -2435,6 +2416,7 @@
               <a:rPr lang="en-US" smtClean="0"/>
               <a:t>Edit Master text styles</a:t>
             </a:r>
+            <a:endParaRPr lang="en-US" smtClean="0"/>
           </a:p>
         </p:txBody>
       </p:sp>
@@ -2491,6 +2473,7 @@
               <a:rPr lang="en-US" smtClean="0"/>
               <a:t>Edit Master text styles</a:t>
             </a:r>
+            <a:endParaRPr lang="en-US" smtClean="0"/>
           </a:p>
           <a:p>
             <a:pPr lvl="1"/>
@@ -2498,6 +2481,7 @@
               <a:rPr lang="en-US" smtClean="0"/>
               <a:t>Second level</a:t>
             </a:r>
+            <a:endParaRPr lang="en-US" smtClean="0"/>
           </a:p>
           <a:p>
             <a:pPr lvl="2"/>
@@ -2505,6 +2489,7 @@
               <a:rPr lang="en-US" smtClean="0"/>
               <a:t>Third level</a:t>
             </a:r>
+            <a:endParaRPr lang="en-US" smtClean="0"/>
           </a:p>
           <a:p>
             <a:pPr lvl="3"/>
@@ -2512,6 +2497,7 @@
               <a:rPr lang="en-US" smtClean="0"/>
               <a:t>Fourth level</a:t>
             </a:r>
+            <a:endParaRPr lang="en-US" smtClean="0"/>
           </a:p>
           <a:p>
             <a:pPr lvl="4"/>
@@ -2540,7 +2526,6 @@
           <a:p>
             <a:fld id="{17C15CAB-E48F-495C-92CD-4CF2B2C1B0ED}" type="datetime1">
               <a:rPr lang="en-US" smtClean="0"/>
-              <a:t>12/12/2021</a:t>
             </a:fld>
             <a:endParaRPr lang="en-US"/>
           </a:p>
@@ -2582,18 +2567,12 @@
           <a:p>
             <a:fld id="{040DEF24-717E-4741-8753-F7E431A261E5}" type="slidenum">
               <a:rPr lang="en-US" smtClean="0"/>
-              <a:t>‹#›</a:t>
             </a:fld>
             <a:endParaRPr lang="en-US"/>
           </a:p>
         </p:txBody>
       </p:sp>
     </p:spTree>
-    <p:extLst>
-      <p:ext uri="{BB962C8B-B14F-4D97-AF65-F5344CB8AC3E}">
-        <p14:creationId xmlns:p14="http://schemas.microsoft.com/office/powerpoint/2010/main" val="895330449"/>
-      </p:ext>
-    </p:extLst>
   </p:cSld>
   <p:clrMapOvr>
     <a:masterClrMapping/>
@@ -2658,7 +2637,6 @@
           <a:p>
             <a:fld id="{5302AA14-F259-4723-9AF0-36DE127C0145}" type="datetime1">
               <a:rPr lang="en-US" smtClean="0"/>
-              <a:t>12/12/2021</a:t>
             </a:fld>
             <a:endParaRPr lang="en-US"/>
           </a:p>
@@ -2700,18 +2678,12 @@
           <a:p>
             <a:fld id="{040DEF24-717E-4741-8753-F7E431A261E5}" type="slidenum">
               <a:rPr lang="en-US" smtClean="0"/>
-              <a:t>‹#›</a:t>
             </a:fld>
             <a:endParaRPr lang="en-US"/>
           </a:p>
         </p:txBody>
       </p:sp>
     </p:spTree>
-    <p:extLst>
-      <p:ext uri="{BB962C8B-B14F-4D97-AF65-F5344CB8AC3E}">
-        <p14:creationId xmlns:p14="http://schemas.microsoft.com/office/powerpoint/2010/main" val="2849345578"/>
-      </p:ext>
-    </p:extLst>
   </p:cSld>
   <p:clrMapOvr>
     <a:masterClrMapping/>
@@ -2753,7 +2725,6 @@
           <a:p>
             <a:fld id="{C9349F59-A2E8-4E73-9F17-B6C9798F4358}" type="datetime1">
               <a:rPr lang="en-US" smtClean="0"/>
-              <a:t>12/12/2021</a:t>
             </a:fld>
             <a:endParaRPr lang="en-US"/>
           </a:p>
@@ -2795,18 +2766,12 @@
           <a:p>
             <a:fld id="{040DEF24-717E-4741-8753-F7E431A261E5}" type="slidenum">
               <a:rPr lang="en-US" smtClean="0"/>
-              <a:t>‹#›</a:t>
             </a:fld>
             <a:endParaRPr lang="en-US"/>
           </a:p>
         </p:txBody>
       </p:sp>
     </p:spTree>
-    <p:extLst>
-      <p:ext uri="{BB962C8B-B14F-4D97-AF65-F5344CB8AC3E}">
-        <p14:creationId xmlns:p14="http://schemas.microsoft.com/office/powerpoint/2010/main" val="3159153963"/>
-      </p:ext>
-    </p:extLst>
   </p:cSld>
   <p:clrMapOvr>
     <a:masterClrMapping/>
@@ -2815,7 +2780,7 @@
 </file>
 
 <file path=ppt/slideLayouts/slideLayout8.xml><?xml version="1.0" encoding="utf-8"?>
-<p:sldLayout xmlns:a="http://schemas.openxmlformats.org/drawingml/2006/main" xmlns:r="http://schemas.openxmlformats.org/officeDocument/2006/relationships" xmlns:p="http://schemas.openxmlformats.org/presentationml/2006/main" showMasterSp="0" type="objTx" preserve="1">
+<p:sldLayout xmlns:a="http://schemas.openxmlformats.org/drawingml/2006/main" xmlns:r="http://schemas.openxmlformats.org/officeDocument/2006/relationships" xmlns:p="http://schemas.openxmlformats.org/presentationml/2006/main" type="objTx" preserve="1" showMasterSp="0">
   <p:cSld name="Content with Caption">
     <p:spTree>
       <p:nvGrpSpPr>
@@ -2975,6 +2940,7 @@
               <a:rPr lang="en-US" smtClean="0"/>
               <a:t>Edit Master text styles</a:t>
             </a:r>
+            <a:endParaRPr lang="en-US" smtClean="0"/>
           </a:p>
           <a:p>
             <a:pPr lvl="1"/>
@@ -2982,6 +2948,7 @@
               <a:rPr lang="en-US" smtClean="0"/>
               <a:t>Second level</a:t>
             </a:r>
+            <a:endParaRPr lang="en-US" smtClean="0"/>
           </a:p>
           <a:p>
             <a:pPr lvl="2"/>
@@ -2989,6 +2956,7 @@
               <a:rPr lang="en-US" smtClean="0"/>
               <a:t>Third level</a:t>
             </a:r>
+            <a:endParaRPr lang="en-US" smtClean="0"/>
           </a:p>
           <a:p>
             <a:pPr lvl="3"/>
@@ -2996,6 +2964,7 @@
               <a:rPr lang="en-US" smtClean="0"/>
               <a:t>Fourth level</a:t>
             </a:r>
+            <a:endParaRPr lang="en-US" smtClean="0"/>
           </a:p>
           <a:p>
             <a:pPr lvl="4"/>
@@ -3083,6 +3052,7 @@
               <a:rPr lang="en-US" smtClean="0"/>
               <a:t>Edit Master text styles</a:t>
             </a:r>
+            <a:endParaRPr lang="en-US" smtClean="0"/>
           </a:p>
         </p:txBody>
       </p:sp>
@@ -3103,7 +3073,6 @@
           <a:p>
             <a:fld id="{44F06C92-CE98-4B24-91B3-57666E0FED09}" type="datetime1">
               <a:rPr lang="en-US" smtClean="0"/>
-              <a:t>12/12/2021</a:t>
             </a:fld>
             <a:endParaRPr lang="en-US"/>
           </a:p>
@@ -3172,10 +3141,10 @@
                     <a14:imgProps xmlns:a14="http://schemas.microsoft.com/office/drawing/2010/main">
                       <a14:imgLayer r:embed="rId5">
                         <a14:imgEffect>
-                          <a14:saturation sat="95000"/>
+                          <a14:brightnessContrast bright="-40000" contrast="20000"/>
                         </a14:imgEffect>
                         <a14:imgEffect>
-                          <a14:brightnessContrast bright="-40000" contrast="20000"/>
+                          <a14:saturation sat="95000"/>
                         </a14:imgEffect>
                       </a14:imgLayer>
                     </a14:imgProps>
@@ -3234,18 +3203,12 @@
           <a:p>
             <a:fld id="{040DEF24-717E-4741-8753-F7E431A261E5}" type="slidenum">
               <a:rPr lang="en-US" smtClean="0"/>
-              <a:t>‹#›</a:t>
             </a:fld>
             <a:endParaRPr lang="en-US"/>
           </a:p>
         </p:txBody>
       </p:sp>
     </p:spTree>
-    <p:extLst>
-      <p:ext uri="{BB962C8B-B14F-4D97-AF65-F5344CB8AC3E}">
-        <p14:creationId xmlns:p14="http://schemas.microsoft.com/office/powerpoint/2010/main" val="56002536"/>
-      </p:ext>
-    </p:extLst>
   </p:cSld>
   <p:clrMapOvr>
     <a:masterClrMapping/>
@@ -3254,7 +3217,7 @@
 </file>
 
 <file path=ppt/slideLayouts/slideLayout9.xml><?xml version="1.0" encoding="utf-8"?>
-<p:sldLayout xmlns:a="http://schemas.openxmlformats.org/drawingml/2006/main" xmlns:r="http://schemas.openxmlformats.org/officeDocument/2006/relationships" xmlns:p="http://schemas.openxmlformats.org/presentationml/2006/main" showMasterSp="0" type="picTx" preserve="1">
+<p:sldLayout xmlns:a="http://schemas.openxmlformats.org/drawingml/2006/main" xmlns:r="http://schemas.openxmlformats.org/officeDocument/2006/relationships" xmlns:p="http://schemas.openxmlformats.org/presentationml/2006/main" type="picTx" preserve="1" showMasterSp="0">
   <p:cSld name="Picture with Caption">
     <p:spTree>
       <p:nvGrpSpPr>
@@ -3508,6 +3471,7 @@
               <a:rPr lang="en-US" smtClean="0"/>
               <a:t>Edit Master text styles</a:t>
             </a:r>
+            <a:endParaRPr lang="en-US" smtClean="0"/>
           </a:p>
         </p:txBody>
       </p:sp>
@@ -3528,7 +3492,6 @@
           <a:p>
             <a:fld id="{15CAC543-8889-4E95-B4AC-6EDFB98064E3}" type="datetime1">
               <a:rPr lang="en-US" smtClean="0"/>
-              <a:t>12/12/2021</a:t>
             </a:fld>
             <a:endParaRPr lang="en-US"/>
           </a:p>
@@ -3578,10 +3541,10 @@
                     <a14:imgProps xmlns:a14="http://schemas.microsoft.com/office/drawing/2010/main">
                       <a14:imgLayer r:embed="rId5">
                         <a14:imgEffect>
-                          <a14:saturation sat="95000"/>
+                          <a14:brightnessContrast bright="-40000" contrast="20000"/>
                         </a14:imgEffect>
                         <a14:imgEffect>
-                          <a14:brightnessContrast bright="-40000" contrast="20000"/>
+                          <a14:saturation sat="95000"/>
                         </a14:imgEffect>
                       </a14:imgLayer>
                     </a14:imgProps>
@@ -3640,18 +3603,12 @@
           <a:p>
             <a:fld id="{040DEF24-717E-4741-8753-F7E431A261E5}" type="slidenum">
               <a:rPr lang="en-US" smtClean="0"/>
-              <a:t>‹#›</a:t>
             </a:fld>
             <a:endParaRPr lang="en-US"/>
           </a:p>
         </p:txBody>
       </p:sp>
     </p:spTree>
-    <p:extLst>
-      <p:ext uri="{BB962C8B-B14F-4D97-AF65-F5344CB8AC3E}">
-        <p14:creationId xmlns:p14="http://schemas.microsoft.com/office/powerpoint/2010/main" val="1127244914"/>
-      </p:ext>
-    </p:extLst>
   </p:cSld>
   <p:clrMapOvr>
     <a:masterClrMapping/>
@@ -3744,6 +3701,7 @@
               <a:rPr lang="en-US" smtClean="0"/>
               <a:t>Edit Master text styles</a:t>
             </a:r>
+            <a:endParaRPr lang="en-US" smtClean="0"/>
           </a:p>
           <a:p>
             <a:pPr lvl="1"/>
@@ -3751,6 +3709,7 @@
               <a:rPr lang="en-US" smtClean="0"/>
               <a:t>Second level</a:t>
             </a:r>
+            <a:endParaRPr lang="en-US" smtClean="0"/>
           </a:p>
           <a:p>
             <a:pPr lvl="2"/>
@@ -3758,6 +3717,7 @@
               <a:rPr lang="en-US" smtClean="0"/>
               <a:t>Third level</a:t>
             </a:r>
+            <a:endParaRPr lang="en-US" smtClean="0"/>
           </a:p>
           <a:p>
             <a:pPr lvl="3"/>
@@ -3765,6 +3725,7 @@
               <a:rPr lang="en-US" smtClean="0"/>
               <a:t>Fourth level</a:t>
             </a:r>
+            <a:endParaRPr lang="en-US" smtClean="0"/>
           </a:p>
           <a:p>
             <a:pPr lvl="4"/>
@@ -3809,7 +3770,6 @@
           <a:p>
             <a:fld id="{BDFF3CA4-504F-4AB7-961C-755BCE655230}" type="datetime1">
               <a:rPr lang="en-US" smtClean="0"/>
-              <a:t>12/12/2021</a:t>
             </a:fld>
             <a:endParaRPr lang="en-US"/>
           </a:p>
@@ -3881,7 +3841,7 @@
               <a:avLst/>
             </a:prstGeom>
             <a:blipFill dpi="0" rotWithShape="1">
-              <a:blip r:embed="rId13">
+              <a:blip r:embed="rId12">
                 <a:duotone>
                   <a:schemeClr val="accent1">
                     <a:shade val="45000"/>
@@ -3892,12 +3852,12 @@
                 <a:extLst>
                   <a:ext uri="{BEBA8EAE-BF5A-486C-A8C5-ECC9F3942E4B}">
                     <a14:imgProps xmlns:a14="http://schemas.microsoft.com/office/drawing/2010/main">
-                      <a14:imgLayer r:embed="rId14">
+                      <a14:imgLayer r:embed="rId13">
+                        <a14:imgEffect>
+                          <a14:brightnessContrast bright="-40000" contrast="20000"/>
+                        </a14:imgEffect>
                         <a14:imgEffect>
                           <a14:saturation sat="95000"/>
-                        </a14:imgEffect>
-                        <a14:imgEffect>
-                          <a14:brightnessContrast bright="-40000" contrast="20000"/>
                         </a14:imgEffect>
                       </a14:imgLayer>
                     </a14:imgProps>
@@ -3973,32 +3933,26 @@
           <a:p>
             <a:fld id="{040DEF24-717E-4741-8753-F7E431A261E5}" type="slidenum">
               <a:rPr lang="en-US" smtClean="0"/>
-              <a:t>‹#›</a:t>
             </a:fld>
             <a:endParaRPr lang="en-US"/>
           </a:p>
         </p:txBody>
       </p:sp>
     </p:spTree>
-    <p:extLst>
-      <p:ext uri="{BB962C8B-B14F-4D97-AF65-F5344CB8AC3E}">
-        <p14:creationId xmlns:p14="http://schemas.microsoft.com/office/powerpoint/2010/main" val="1963410978"/>
-      </p:ext>
-    </p:extLst>
   </p:cSld>
   <p:clrMap bg1="lt1" tx1="dk1" bg2="lt2" tx2="dk2" accent1="accent1" accent2="accent2" accent3="accent3" accent4="accent4" accent5="accent5" accent6="accent6" hlink="hlink" folHlink="folHlink"/>
   <p:sldLayoutIdLst>
-    <p:sldLayoutId id="2147483661" r:id="rId1"/>
-    <p:sldLayoutId id="2147483662" r:id="rId2"/>
-    <p:sldLayoutId id="2147483663" r:id="rId3"/>
-    <p:sldLayoutId id="2147483664" r:id="rId4"/>
-    <p:sldLayoutId id="2147483665" r:id="rId5"/>
-    <p:sldLayoutId id="2147483666" r:id="rId6"/>
-    <p:sldLayoutId id="2147483667" r:id="rId7"/>
-    <p:sldLayoutId id="2147483668" r:id="rId8"/>
-    <p:sldLayoutId id="2147483669" r:id="rId9"/>
-    <p:sldLayoutId id="2147483670" r:id="rId10"/>
-    <p:sldLayoutId id="2147483671" r:id="rId11"/>
+    <p:sldLayoutId id="2147483649" r:id="rId1"/>
+    <p:sldLayoutId id="2147483650" r:id="rId2"/>
+    <p:sldLayoutId id="2147483651" r:id="rId3"/>
+    <p:sldLayoutId id="2147483652" r:id="rId4"/>
+    <p:sldLayoutId id="2147483653" r:id="rId5"/>
+    <p:sldLayoutId id="2147483654" r:id="rId6"/>
+    <p:sldLayoutId id="2147483655" r:id="rId7"/>
+    <p:sldLayoutId id="2147483656" r:id="rId8"/>
+    <p:sldLayoutId id="2147483657" r:id="rId9"/>
+    <p:sldLayoutId id="2147483658" r:id="rId10"/>
+    <p:sldLayoutId id="2147483659" r:id="rId11"/>
   </p:sldLayoutIdLst>
   <p:hf hdr="0" ftr="0" dt="0"/>
   <p:txStyles>
@@ -4013,7 +3967,7 @@
         <a:buNone/>
         <a:defRPr sz="5400" kern="1200" cap="all" baseline="0">
           <a:blipFill>
-            <a:blip r:embed="rId15">
+            <a:blip r:embed="rId14">
               <a:extLst>
                 <a:ext uri="{28A0092B-C50C-407E-A947-70E740481C1C}">
                   <a14:useLocalDpi xmlns:a14="http://schemas.microsoft.com/office/drawing/2010/main" val="0"/>
@@ -4042,7 +3996,7 @@
           </a:schemeClr>
         </a:buClr>
         <a:buSzPct val="85000"/>
-        <a:buFont typeface="Wingdings" pitchFamily="2" charset="2"/>
+        <a:buFont typeface="Wingdings" panose="05000000000000000000" pitchFamily="2" charset="2"/>
         <a:buChar char="§"/>
         <a:defRPr sz="2000" kern="1200">
           <a:solidFill>
@@ -4069,7 +4023,7 @@
           </a:schemeClr>
         </a:buClr>
         <a:buSzPct val="85000"/>
-        <a:buFont typeface="Wingdings" pitchFamily="2" charset="2"/>
+        <a:buFont typeface="Wingdings" panose="05000000000000000000" pitchFamily="2" charset="2"/>
         <a:buChar char="§"/>
         <a:defRPr sz="1800" kern="1200">
           <a:solidFill>
@@ -4096,7 +4050,7 @@
           </a:schemeClr>
         </a:buClr>
         <a:buSzPct val="85000"/>
-        <a:buFont typeface="Wingdings" pitchFamily="2" charset="2"/>
+        <a:buFont typeface="Wingdings" panose="05000000000000000000" pitchFamily="2" charset="2"/>
         <a:buChar char="§"/>
         <a:defRPr sz="1600" kern="1200">
           <a:solidFill>
@@ -4123,7 +4077,7 @@
           </a:schemeClr>
         </a:buClr>
         <a:buSzPct val="85000"/>
-        <a:buFont typeface="Wingdings" pitchFamily="2" charset="2"/>
+        <a:buFont typeface="Wingdings" panose="05000000000000000000" pitchFamily="2" charset="2"/>
         <a:buChar char="§"/>
         <a:defRPr sz="1600" kern="1200">
           <a:solidFill>
@@ -4150,7 +4104,7 @@
           </a:schemeClr>
         </a:buClr>
         <a:buSzPct val="85000"/>
-        <a:buFont typeface="Wingdings" pitchFamily="2" charset="2"/>
+        <a:buFont typeface="Wingdings" panose="05000000000000000000" pitchFamily="2" charset="2"/>
         <a:buChar char="§"/>
         <a:defRPr sz="1600" kern="1200">
           <a:solidFill>
@@ -4161,7 +4115,7 @@
           <a:cs typeface="+mn-cs"/>
         </a:defRPr>
       </a:lvl5pPr>
-      <a:lvl6pPr marL="1600000" indent="-228600" algn="l" defTabSz="914400" rtl="0" eaLnBrk="1" latinLnBrk="0" hangingPunct="1">
+      <a:lvl6pPr marL="1600200" indent="-228600" algn="l" defTabSz="914400" rtl="0" eaLnBrk="1" latinLnBrk="0" hangingPunct="1">
         <a:lnSpc>
           <a:spcPct val="90000"/>
         </a:lnSpc>
@@ -4177,7 +4131,7 @@
           </a:schemeClr>
         </a:buClr>
         <a:buSzPct val="85000"/>
-        <a:buFont typeface="Wingdings" pitchFamily="2" charset="2"/>
+        <a:buFont typeface="Wingdings" panose="05000000000000000000" pitchFamily="2" charset="2"/>
         <a:buChar char="§"/>
         <a:defRPr sz="1600" kern="1200">
           <a:solidFill>
@@ -4188,7 +4142,7 @@
           <a:cs typeface="+mn-cs"/>
         </a:defRPr>
       </a:lvl6pPr>
-      <a:lvl7pPr marL="1900000" indent="-228600" algn="l" defTabSz="914400" rtl="0" eaLnBrk="1" latinLnBrk="0" hangingPunct="1">
+      <a:lvl7pPr marL="1899920" indent="-228600" algn="l" defTabSz="914400" rtl="0" eaLnBrk="1" latinLnBrk="0" hangingPunct="1">
         <a:lnSpc>
           <a:spcPct val="90000"/>
         </a:lnSpc>
@@ -4204,7 +4158,7 @@
           </a:schemeClr>
         </a:buClr>
         <a:buSzPct val="85000"/>
-        <a:buFont typeface="Wingdings" pitchFamily="2" charset="2"/>
+        <a:buFont typeface="Wingdings" panose="05000000000000000000" pitchFamily="2" charset="2"/>
         <a:buChar char="§"/>
         <a:defRPr sz="1600" kern="1200">
           <a:solidFill>
@@ -4215,7 +4169,7 @@
           <a:cs typeface="+mn-cs"/>
         </a:defRPr>
       </a:lvl7pPr>
-      <a:lvl8pPr marL="2200000" indent="-228600" algn="l" defTabSz="914400" rtl="0" eaLnBrk="1" latinLnBrk="0" hangingPunct="1">
+      <a:lvl8pPr marL="2200275" indent="-228600" algn="l" defTabSz="914400" rtl="0" eaLnBrk="1" latinLnBrk="0" hangingPunct="1">
         <a:lnSpc>
           <a:spcPct val="90000"/>
         </a:lnSpc>
@@ -4231,7 +4185,7 @@
           </a:schemeClr>
         </a:buClr>
         <a:buSzPct val="85000"/>
-        <a:buFont typeface="Wingdings" pitchFamily="2" charset="2"/>
+        <a:buFont typeface="Wingdings" panose="05000000000000000000" pitchFamily="2" charset="2"/>
         <a:buChar char="§"/>
         <a:defRPr sz="1600" kern="1200">
           <a:solidFill>
@@ -4242,7 +4196,7 @@
           <a:cs typeface="+mn-cs"/>
         </a:defRPr>
       </a:lvl8pPr>
-      <a:lvl9pPr marL="2500000" indent="-228600" algn="l" defTabSz="914400" rtl="0" eaLnBrk="1" latinLnBrk="0" hangingPunct="1">
+      <a:lvl9pPr marL="2499995" indent="-228600" algn="l" defTabSz="914400" rtl="0" eaLnBrk="1" latinLnBrk="0" hangingPunct="1">
         <a:lnSpc>
           <a:spcPct val="90000"/>
         </a:lnSpc>
@@ -4258,7 +4212,7 @@
           </a:schemeClr>
         </a:buClr>
         <a:buSzPct val="85000"/>
-        <a:buFont typeface="Wingdings" pitchFamily="2" charset="2"/>
+        <a:buFont typeface="Wingdings" panose="05000000000000000000" pitchFamily="2" charset="2"/>
         <a:buChar char="§"/>
         <a:defRPr sz="1600" kern="1200">
           <a:solidFill>
@@ -4495,7 +4449,7 @@
           <p:nvPr/>
         </p:nvPicPr>
         <p:blipFill>
-          <a:blip r:embed="rId2" cstate="print">
+          <a:blip r:embed="rId1" cstate="print">
             <a:extLst>
               <a:ext uri="{28A0092B-C50C-407E-A947-70E740481C1C}">
                 <a14:useLocalDpi xmlns:a14="http://schemas.microsoft.com/office/drawing/2010/main" val="0"/>
@@ -4951,6 +4905,10 @@
               </a:rPr>
               <a:t>2</a:t>
             </a:r>
+            <a:endParaRPr lang="en-US" sz="1600" b="1" dirty="0">
+              <a:latin typeface="Arial" panose="020B0604020202020204" pitchFamily="34" charset="0"/>
+              <a:cs typeface="Arial" panose="020B0604020202020204" pitchFamily="34" charset="0"/>
+            </a:endParaRPr>
           </a:p>
         </p:txBody>
       </p:sp>
@@ -4984,6 +4942,10 @@
               </a:rPr>
               <a:t>2017 - 2022 </a:t>
             </a:r>
+            <a:endParaRPr lang="en-US" sz="1600" b="1" dirty="0" smtClean="0">
+              <a:latin typeface="Arial" panose="020B0604020202020204" pitchFamily="34" charset="0"/>
+              <a:cs typeface="Arial" panose="020B0604020202020204" pitchFamily="34" charset="0"/>
+            </a:endParaRPr>
           </a:p>
         </p:txBody>
       </p:sp>
@@ -5225,7 +5187,7 @@
                         <p:par>
                           <p:cTn id="14" fill="hold">
                             <p:stCondLst>
-                              <p:cond delay="2000"/>
+                              <p:cond delay="500"/>
                             </p:stCondLst>
                             <p:childTnLst>
                               <p:par>
@@ -5339,7 +5301,7 @@
                         <p:par>
                           <p:cTn id="24" fill="hold">
                             <p:stCondLst>
-                              <p:cond delay="2600"/>
+                              <p:cond delay="1000"/>
                             </p:stCondLst>
                             <p:childTnLst>
                               <p:par>
@@ -5566,7 +5528,7 @@
             <a:r>
               <a:rPr lang="en-US" sz="4000" b="1" spc="50" dirty="0" smtClean="0">
                 <a:blipFill>
-                  <a:blip r:embed="rId2">
+                  <a:blip r:embed="rId1">
                     <a:extLst>
                       <a:ext uri="{28A0092B-C50C-407E-A947-70E740481C1C}">
                         <a14:useLocalDpi xmlns:a14="http://schemas.microsoft.com/office/drawing/2010/main" val="0"/>
@@ -5605,7 +5567,6 @@
           <a:p>
             <a:fld id="{040DEF24-717E-4741-8753-F7E431A261E5}" type="slidenum">
               <a:rPr lang="en-US" smtClean="0"/>
-              <a:t>10</a:t>
             </a:fld>
             <a:endParaRPr lang="en-US"/>
           </a:p>
@@ -5703,6 +5664,16 @@
               </a:rPr>
               <a:t>XÂY DỰNG ĐỊNH DẠNG LƯU TRỮ CHUNG TRONG HỆ THỐNG</a:t>
             </a:r>
+            <a:endParaRPr lang="en-US" b="1" dirty="0">
+              <a:solidFill>
+                <a:schemeClr val="accent2">
+                  <a:lumMod val="50000"/>
+                </a:schemeClr>
+              </a:solidFill>
+              <a:latin typeface="Arial" panose="020B0604020202020204" pitchFamily="34" charset="0"/>
+              <a:ea typeface="Roboto" panose="02000000000000000000" pitchFamily="2" charset="0"/>
+              <a:cs typeface="Arial" panose="020B0604020202020204" pitchFamily="34" charset="0"/>
+            </a:endParaRPr>
           </a:p>
         </p:txBody>
       </p:sp>
@@ -5751,6 +5722,16 @@
               </a:rPr>
               <a:t>XÂY DỰNG HỆ THỐNG DNS </a:t>
             </a:r>
+            <a:endParaRPr lang="en-US" b="1" dirty="0">
+              <a:solidFill>
+                <a:schemeClr val="accent2">
+                  <a:lumMod val="50000"/>
+                </a:schemeClr>
+              </a:solidFill>
+              <a:latin typeface="Arial" panose="020B0604020202020204" pitchFamily="34" charset="0"/>
+              <a:ea typeface="Roboto" panose="02000000000000000000" pitchFamily="2" charset="0"/>
+              <a:cs typeface="Arial" panose="020B0604020202020204" pitchFamily="34" charset="0"/>
+            </a:endParaRPr>
           </a:p>
         </p:txBody>
       </p:sp>
@@ -6060,6 +6041,10 @@
               </a:rPr>
               <a:t>Xây dựng quy trình xử lý thông tin đăng kí node và account admin tham gia vào hệ thống Blockchain.</a:t>
             </a:r>
+            <a:endParaRPr lang="en-US" sz="1400" dirty="0" smtClean="0">
+              <a:latin typeface="Arial" panose="020B0604020202020204" pitchFamily="34" charset="0"/>
+              <a:cs typeface="Arial" panose="020B0604020202020204" pitchFamily="34" charset="0"/>
+            </a:endParaRPr>
           </a:p>
         </p:txBody>
       </p:sp>
@@ -6176,6 +6161,10 @@
               </a:rPr>
               <a:t>Xây dựng xử lý phân quyền giữa các loại người dùng khác nhau ( Hoster,  Admin, Client ).</a:t>
             </a:r>
+            <a:endParaRPr lang="en-US" sz="1400" dirty="0" smtClean="0">
+              <a:latin typeface="Arial" panose="020B0604020202020204" pitchFamily="34" charset="0"/>
+              <a:cs typeface="Arial" panose="020B0604020202020204" pitchFamily="34" charset="0"/>
+            </a:endParaRPr>
           </a:p>
         </p:txBody>
       </p:sp>
@@ -6342,6 +6331,10 @@
               </a:rPr>
               <a:t>Viết bằng Python Flask</a:t>
             </a:r>
+            <a:endParaRPr lang="en-US" sz="1400" b="1" dirty="0" smtClean="0">
+              <a:latin typeface="Arial" panose="020B0604020202020204" pitchFamily="34" charset="0"/>
+              <a:cs typeface="Arial" panose="020B0604020202020204" pitchFamily="34" charset="0"/>
+            </a:endParaRPr>
           </a:p>
         </p:txBody>
       </p:sp>
@@ -6374,6 +6367,10 @@
               </a:rPr>
               <a:t>Viết bằng Python Socket</a:t>
             </a:r>
+            <a:endParaRPr lang="en-US" sz="1400" b="1" dirty="0" smtClean="0">
+              <a:latin typeface="Arial" panose="020B0604020202020204" pitchFamily="34" charset="0"/>
+              <a:cs typeface="Arial" panose="020B0604020202020204" pitchFamily="34" charset="0"/>
+            </a:endParaRPr>
           </a:p>
         </p:txBody>
       </p:sp>
@@ -6419,13 +6416,7 @@
           <p:cNvGraphicFramePr>
             <a:graphicFrameLocks noGrp="1"/>
           </p:cNvGraphicFramePr>
-          <p:nvPr>
-            <p:extLst>
-              <p:ext uri="{D42A27DB-BD31-4B8C-83A1-F6EECF244321}">
-                <p14:modId xmlns:p14="http://schemas.microsoft.com/office/powerpoint/2010/main" val="307060737"/>
-              </p:ext>
-            </p:extLst>
-          </p:nvPr>
+          <p:nvPr/>
         </p:nvGraphicFramePr>
         <p:xfrm>
           <a:off x="6005026" y="1510258"/>
@@ -6438,20 +6429,8 @@
                 <a:tableStyleId>{7DF18680-E054-41AD-8BC1-D1AEF772440D}</a:tableStyleId>
               </a:tblPr>
               <a:tblGrid>
-                <a:gridCol w="1666719">
-                  <a:extLst>
-                    <a:ext uri="{9D8B030D-6E8A-4147-A177-3AD203B41FA5}">
-                      <a16:colId xmlns:a16="http://schemas.microsoft.com/office/drawing/2014/main" val="4201263822"/>
-                    </a:ext>
-                  </a:extLst>
-                </a:gridCol>
-                <a:gridCol w="3791741">
-                  <a:extLst>
-                    <a:ext uri="{9D8B030D-6E8A-4147-A177-3AD203B41FA5}">
-                      <a16:colId xmlns:a16="http://schemas.microsoft.com/office/drawing/2014/main" val="3429088864"/>
-                    </a:ext>
-                  </a:extLst>
-                </a:gridCol>
+                <a:gridCol w="1666719"/>
+                <a:gridCol w="3791741"/>
               </a:tblGrid>
               <a:tr h="200025">
                 <a:tc>
@@ -6530,11 +6509,6 @@
                   </a:txBody>
                   <a:tcPr marL="28575" marR="28575" marT="19050" marB="19050" anchor="ctr"/>
                 </a:tc>
-                <a:extLst>
-                  <a:ext uri="{0D108BD9-81ED-4DB2-BD59-A6C34878D82A}">
-                    <a16:rowId xmlns:a16="http://schemas.microsoft.com/office/drawing/2014/main" val="2820633989"/>
-                  </a:ext>
-                </a:extLst>
               </a:tr>
               <a:tr h="200025">
                 <a:tc>
@@ -6629,11 +6603,6 @@
                   </a:txBody>
                   <a:tcPr marL="28575" marR="28575" marT="19050" marB="19050" anchor="ctr"/>
                 </a:tc>
-                <a:extLst>
-                  <a:ext uri="{0D108BD9-81ED-4DB2-BD59-A6C34878D82A}">
-                    <a16:rowId xmlns:a16="http://schemas.microsoft.com/office/drawing/2014/main" val="3929702570"/>
-                  </a:ext>
-                </a:extLst>
               </a:tr>
               <a:tr h="200025">
                 <a:tc>
@@ -6728,11 +6697,6 @@
                   </a:txBody>
                   <a:tcPr marL="28575" marR="28575" marT="19050" marB="19050" anchor="ctr"/>
                 </a:tc>
-                <a:extLst>
-                  <a:ext uri="{0D108BD9-81ED-4DB2-BD59-A6C34878D82A}">
-                    <a16:rowId xmlns:a16="http://schemas.microsoft.com/office/drawing/2014/main" val="3449451495"/>
-                  </a:ext>
-                </a:extLst>
               </a:tr>
               <a:tr h="200025">
                 <a:tc>
@@ -6803,11 +6767,6 @@
                   </a:txBody>
                   <a:tcPr marL="28575" marR="28575" marT="19050" marB="19050" anchor="ctr"/>
                 </a:tc>
-                <a:extLst>
-                  <a:ext uri="{0D108BD9-81ED-4DB2-BD59-A6C34878D82A}">
-                    <a16:rowId xmlns:a16="http://schemas.microsoft.com/office/drawing/2014/main" val="4062855595"/>
-                  </a:ext>
-                </a:extLst>
               </a:tr>
               <a:tr h="200025">
                 <a:tc>
@@ -6878,11 +6837,6 @@
                   </a:txBody>
                   <a:tcPr marL="28575" marR="28575" marT="19050" marB="19050" anchor="ctr"/>
                 </a:tc>
-                <a:extLst>
-                  <a:ext uri="{0D108BD9-81ED-4DB2-BD59-A6C34878D82A}">
-                    <a16:rowId xmlns:a16="http://schemas.microsoft.com/office/drawing/2014/main" val="188921536"/>
-                  </a:ext>
-                </a:extLst>
               </a:tr>
             </a:tbl>
           </a:graphicData>
@@ -6925,11 +6879,6 @@
         </p:txBody>
       </p:sp>
     </p:spTree>
-    <p:extLst>
-      <p:ext uri="{BB962C8B-B14F-4D97-AF65-F5344CB8AC3E}">
-        <p14:creationId xmlns:p14="http://schemas.microsoft.com/office/powerpoint/2010/main" val="1527823203"/>
-      </p:ext>
-    </p:extLst>
   </p:cSld>
   <p:clrMapOvr>
     <a:masterClrMapping/>
@@ -7819,7 +7768,6 @@
           <a:p>
             <a:fld id="{040DEF24-717E-4741-8753-F7E431A261E5}" type="slidenum">
               <a:rPr lang="en-US" smtClean="0"/>
-              <a:t>11</a:t>
             </a:fld>
             <a:endParaRPr lang="en-US"/>
           </a:p>
@@ -8003,6 +7951,11 @@
               </a:rPr>
               <a:t>node với port bất kì, thực hiện thêm 5 giao dịch tên miền khác và phân giải tên miền thông qua máy chính. </a:t>
             </a:r>
+            <a:endParaRPr lang="en-US" sz="1400" dirty="0">
+              <a:latin typeface="Arial" panose="020B0604020202020204" pitchFamily="34" charset="0"/>
+              <a:ea typeface="Calibri" panose="020F0502020204030204" pitchFamily="34" charset="0"/>
+              <a:cs typeface="Arial" panose="020B0604020202020204" pitchFamily="34" charset="0"/>
+            </a:endParaRPr>
           </a:p>
         </p:txBody>
       </p:sp>
@@ -8921,11 +8874,6 @@
         </p:sp>
       </p:grpSp>
     </p:spTree>
-    <p:extLst>
-      <p:ext uri="{BB962C8B-B14F-4D97-AF65-F5344CB8AC3E}">
-        <p14:creationId xmlns:p14="http://schemas.microsoft.com/office/powerpoint/2010/main" val="3835862738"/>
-      </p:ext>
-    </p:extLst>
   </p:cSld>
   <p:clrMapOvr>
     <a:masterClrMapping/>
@@ -9174,7 +9122,7 @@
             <a:r>
               <a:rPr lang="en-US" sz="4000" b="1" spc="50" dirty="0" smtClean="0">
                 <a:blipFill>
-                  <a:blip r:embed="rId2">
+                  <a:blip r:embed="rId1">
                     <a:extLst>
                       <a:ext uri="{28A0092B-C50C-407E-A947-70E740481C1C}">
                         <a14:useLocalDpi xmlns:a14="http://schemas.microsoft.com/office/drawing/2010/main" val="0"/>
@@ -9213,7 +9161,6 @@
           <a:p>
             <a:fld id="{040DEF24-717E-4741-8753-F7E431A261E5}" type="slidenum">
               <a:rPr lang="en-US" smtClean="0"/>
-              <a:t>12</a:t>
             </a:fld>
             <a:endParaRPr lang="en-US"/>
           </a:p>
@@ -9321,6 +9268,16 @@
               </a:rPr>
               <a:t>2 </a:t>
             </a:r>
+            <a:endParaRPr lang="en-US" sz="2400" b="1" dirty="0" smtClean="0">
+              <a:solidFill>
+                <a:schemeClr val="accent2">
+                  <a:lumMod val="50000"/>
+                </a:schemeClr>
+              </a:solidFill>
+              <a:latin typeface="Arial" panose="020B0604020202020204" pitchFamily="34" charset="0"/>
+              <a:ea typeface="Roboto" panose="02000000000000000000" pitchFamily="2" charset="0"/>
+              <a:cs typeface="Arial" panose="020B0604020202020204" pitchFamily="34" charset="0"/>
+            </a:endParaRPr>
           </a:p>
           <a:p>
             <a:pPr lvl="0" algn="just">
@@ -9355,6 +9312,11 @@
               </a:rPr>
               <a:t>)</a:t>
             </a:r>
+            <a:endParaRPr lang="en-US" sz="1400" dirty="0" smtClean="0">
+              <a:latin typeface="Arial" panose="020B0604020202020204" pitchFamily="34" charset="0"/>
+              <a:ea typeface="Calibri" panose="020F0502020204030204" pitchFamily="34" charset="0"/>
+              <a:cs typeface="Arial" panose="020B0604020202020204" pitchFamily="34" charset="0"/>
+            </a:endParaRPr>
           </a:p>
           <a:p>
             <a:pPr lvl="0" algn="just">
@@ -9389,6 +9351,11 @@
               </a:rPr>
               <a:t>ảo.</a:t>
             </a:r>
+            <a:endParaRPr lang="en-US" sz="1400" dirty="0" smtClean="0">
+              <a:latin typeface="Arial" panose="020B0604020202020204" pitchFamily="34" charset="0"/>
+              <a:ea typeface="Calibri" panose="020F0502020204030204" pitchFamily="34" charset="0"/>
+              <a:cs typeface="Arial" panose="020B0604020202020204" pitchFamily="34" charset="0"/>
+            </a:endParaRPr>
           </a:p>
           <a:p>
             <a:pPr lvl="0" algn="just">
@@ -9415,6 +9382,11 @@
               </a:rPr>
               <a:t>node với port bất kì, thực hiện thêm 5 giao dịch tên miền khác và phân giải tên miền thông qua một máy ảo. </a:t>
             </a:r>
+            <a:endParaRPr lang="en-US" sz="1400" dirty="0">
+              <a:latin typeface="Arial" panose="020B0604020202020204" pitchFamily="34" charset="0"/>
+              <a:ea typeface="Calibri" panose="020F0502020204030204" pitchFamily="34" charset="0"/>
+              <a:cs typeface="Arial" panose="020B0604020202020204" pitchFamily="34" charset="0"/>
+            </a:endParaRPr>
           </a:p>
         </p:txBody>
       </p:sp>
@@ -10413,11 +10385,6 @@
         </p:txBody>
       </p:sp>
     </p:spTree>
-    <p:extLst>
-      <p:ext uri="{BB962C8B-B14F-4D97-AF65-F5344CB8AC3E}">
-        <p14:creationId xmlns:p14="http://schemas.microsoft.com/office/powerpoint/2010/main" val="1409719431"/>
-      </p:ext>
-    </p:extLst>
   </p:cSld>
   <p:clrMapOvr>
     <a:masterClrMapping/>
@@ -10738,7 +10705,7 @@
             <a:r>
               <a:rPr lang="en-US" sz="4000" b="1" spc="50" dirty="0" smtClean="0">
                 <a:blipFill>
-                  <a:blip r:embed="rId2">
+                  <a:blip r:embed="rId1">
                     <a:extLst>
                       <a:ext uri="{28A0092B-C50C-407E-A947-70E740481C1C}">
                         <a14:useLocalDpi xmlns:a14="http://schemas.microsoft.com/office/drawing/2010/main" val="0"/>
@@ -10777,7 +10744,6 @@
           <a:p>
             <a:fld id="{040DEF24-717E-4741-8753-F7E431A261E5}" type="slidenum">
               <a:rPr lang="en-US" smtClean="0"/>
-              <a:t>13</a:t>
             </a:fld>
             <a:endParaRPr lang="en-US"/>
           </a:p>
@@ -10926,6 +10892,11 @@
               </a:rPr>
               <a:t>ảo.</a:t>
             </a:r>
+            <a:endParaRPr lang="en-US" sz="1400" dirty="0" smtClean="0">
+              <a:latin typeface="Arial" panose="020B0604020202020204" pitchFamily="34" charset="0"/>
+              <a:ea typeface="Calibri" panose="020F0502020204030204" pitchFamily="34" charset="0"/>
+              <a:cs typeface="Arial" panose="020B0604020202020204" pitchFamily="34" charset="0"/>
+            </a:endParaRPr>
           </a:p>
           <a:p>
             <a:pPr lvl="0" algn="just">
@@ -10952,6 +10923,11 @@
               </a:rPr>
               <a:t>node có port khác, đăng nhập với vai trò là admin, thực hiện thêm 5 giao dịch tên miền cộng 1 giao dịch có tên miền trỏ vào địa chỉ của web server máy ảo và tiến hành phân giải trên máy ảo.</a:t>
             </a:r>
+            <a:endParaRPr lang="en-US" sz="1400" dirty="0">
+              <a:latin typeface="Arial" panose="020B0604020202020204" pitchFamily="34" charset="0"/>
+              <a:ea typeface="Calibri" panose="020F0502020204030204" pitchFamily="34" charset="0"/>
+              <a:cs typeface="Arial" panose="020B0604020202020204" pitchFamily="34" charset="0"/>
+            </a:endParaRPr>
           </a:p>
         </p:txBody>
       </p:sp>
@@ -11950,11 +11926,6 @@
         </p:txBody>
       </p:sp>
     </p:spTree>
-    <p:extLst>
-      <p:ext uri="{BB962C8B-B14F-4D97-AF65-F5344CB8AC3E}">
-        <p14:creationId xmlns:p14="http://schemas.microsoft.com/office/powerpoint/2010/main" val="2607231508"/>
-      </p:ext>
-    </p:extLst>
   </p:cSld>
   <p:clrMapOvr>
     <a:masterClrMapping/>
@@ -12303,7 +12274,6 @@
           <a:p>
             <a:fld id="{040DEF24-717E-4741-8753-F7E431A261E5}" type="slidenum">
               <a:rPr lang="en-US" smtClean="0"/>
-              <a:t>14</a:t>
             </a:fld>
             <a:endParaRPr lang="en-US"/>
           </a:p>
@@ -12362,6 +12332,13 @@
               </a:rPr>
               <a:t>Blockchain là một giải pháp khả thi hiện nay, vừa phần nào giải quyết được bài toán bảo mật, vừa mang lại cơ hội khai thác phát triển triệt để giá trị của tên miền. </a:t>
             </a:r>
+            <a:endParaRPr lang="en-US" sz="1600" b="1" spc="50" dirty="0">
+              <a:solidFill>
+                <a:schemeClr val="accent2"/>
+              </a:solidFill>
+              <a:latin typeface="Arial" panose="020B0604020202020204" pitchFamily="34" charset="0"/>
+              <a:cs typeface="Arial" panose="020B0604020202020204" pitchFamily="34" charset="0"/>
+            </a:endParaRPr>
           </a:p>
         </p:txBody>
       </p:sp>
@@ -12411,6 +12388,16 @@
               </a:rPr>
               <a:t>Tóm tắt những điều mà đề tài đã đạt được:</a:t>
             </a:r>
+            <a:endParaRPr lang="en-US" sz="2400" b="1" dirty="0">
+              <a:solidFill>
+                <a:schemeClr val="accent2">
+                  <a:lumMod val="50000"/>
+                </a:schemeClr>
+              </a:solidFill>
+              <a:latin typeface="Roboto" panose="02000000000000000000" pitchFamily="2" charset="0"/>
+              <a:ea typeface="Roboto" panose="02000000000000000000" pitchFamily="2" charset="0"/>
+              <a:cs typeface="Arial" panose="020B0604020202020204" pitchFamily="34" charset="0"/>
+            </a:endParaRPr>
           </a:p>
           <a:p>
             <a:pPr marL="285750" lvl="0" indent="-285750">
@@ -12433,6 +12420,10 @@
               </a:rPr>
               <a:t>Nêu rõ khái niệm, điểm mạnh và yếu của DNS server và cách DNS server hiện tại hoạt động.</a:t>
             </a:r>
+            <a:endParaRPr lang="en-US" sz="1400" dirty="0">
+              <a:latin typeface="Arial" panose="020B0604020202020204" pitchFamily="34" charset="0"/>
+              <a:cs typeface="Arial" panose="020B0604020202020204" pitchFamily="34" charset="0"/>
+            </a:endParaRPr>
           </a:p>
           <a:p>
             <a:pPr marL="285750" lvl="0" indent="-285750">
@@ -12455,6 +12446,10 @@
               </a:rPr>
               <a:t>Nêu rõ khái niệm, điểm mạnh và yếu của Blockchain và hiểu thêm về giải pháp DNS phát triển bằng công nghệ Blockchain.</a:t>
             </a:r>
+            <a:endParaRPr lang="en-US" sz="1400" dirty="0">
+              <a:latin typeface="Arial" panose="020B0604020202020204" pitchFamily="34" charset="0"/>
+              <a:cs typeface="Arial" panose="020B0604020202020204" pitchFamily="34" charset="0"/>
+            </a:endParaRPr>
           </a:p>
           <a:p>
             <a:pPr marL="285750" lvl="0" indent="-285750">
@@ -12477,6 +12472,10 @@
               </a:rPr>
               <a:t>Xây dựng được và tái hiện hệ thống Blockchain DNS trên máy tính cá nhân. </a:t>
             </a:r>
+            <a:endParaRPr lang="en-US" sz="1400" dirty="0">
+              <a:latin typeface="Arial" panose="020B0604020202020204" pitchFamily="34" charset="0"/>
+              <a:cs typeface="Arial" panose="020B0604020202020204" pitchFamily="34" charset="0"/>
+            </a:endParaRPr>
           </a:p>
           <a:p>
             <a:pPr marL="285750" lvl="0" indent="-285750">
@@ -12525,6 +12524,10 @@
               </a:rPr>
               <a:t>Phần mềm tận dụng những DNS record kiểu cũ giúp việc kế thừa và chuyển hóa công nghệ dễ dàng.</a:t>
             </a:r>
+            <a:endParaRPr lang="en-US" sz="1400" dirty="0" smtClean="0">
+              <a:latin typeface="Arial" panose="020B0604020202020204" pitchFamily="34" charset="0"/>
+              <a:cs typeface="Arial" panose="020B0604020202020204" pitchFamily="34" charset="0"/>
+            </a:endParaRPr>
           </a:p>
           <a:p>
             <a:pPr marL="285750" lvl="0" indent="-285750">
@@ -12547,6 +12550,10 @@
               </a:rPr>
               <a:t>Áp dụng DNS Server cho máy tính cá nhân có hệ điều hành không phải Windows Server.</a:t>
             </a:r>
+            <a:endParaRPr lang="en-US" sz="1400" dirty="0" smtClean="0">
+              <a:latin typeface="Arial" panose="020B0604020202020204" pitchFamily="34" charset="0"/>
+              <a:cs typeface="Arial" panose="020B0604020202020204" pitchFamily="34" charset="0"/>
+            </a:endParaRPr>
           </a:p>
           <a:p>
             <a:pPr marL="285750" lvl="0" indent="-285750">
@@ -12979,7 +12986,6 @@
           <a:p>
             <a:fld id="{040DEF24-717E-4741-8753-F7E431A261E5}" type="slidenum">
               <a:rPr lang="en-US" smtClean="0"/>
-              <a:t>15</a:t>
             </a:fld>
             <a:endParaRPr lang="en-US"/>
           </a:p>
@@ -12994,7 +13000,7 @@
         <p:spPr>
           <a:xfrm>
             <a:off x="1069849" y="1200150"/>
-            <a:ext cx="10241280" cy="4660315"/>
+            <a:ext cx="10241280" cy="4656455"/>
           </a:xfrm>
           <a:prstGeom prst="rect">
             <a:avLst/>
@@ -13038,6 +13044,16 @@
               </a:rPr>
               <a:t>tài còn có những hạn chế nhất định sau đây:</a:t>
             </a:r>
+            <a:endParaRPr lang="en-US" sz="2400" b="1" dirty="0">
+              <a:solidFill>
+                <a:schemeClr val="accent2">
+                  <a:lumMod val="50000"/>
+                </a:schemeClr>
+              </a:solidFill>
+              <a:latin typeface="Roboto" panose="02000000000000000000" pitchFamily="2" charset="0"/>
+              <a:ea typeface="Roboto" panose="02000000000000000000" pitchFamily="2" charset="0"/>
+              <a:cs typeface="Arial" panose="020B0604020202020204" pitchFamily="34" charset="0"/>
+            </a:endParaRPr>
           </a:p>
           <a:p>
             <a:pPr marL="285750" lvl="0" indent="-285750">
@@ -13085,7 +13101,7 @@
                 <a:latin typeface="Arial" panose="020B0604020202020204" pitchFamily="34" charset="0"/>
                 <a:cs typeface="Arial" panose="020B0604020202020204" pitchFamily="34" charset="0"/>
               </a:rPr>
-              <a:t>Môi trường cần mạng wifi, không thể dùng hotspot trên điện thoại để phát nên khó trong việc di chuyển đến những nơi xa </a:t>
+              <a:t>Môi trường cần mạng wifi, không thể dùng hotspot trên điện thoại lâu dài để phát nên khó trong việc di chuyển đến những nơi xa </a:t>
             </a:r>
             <a:r>
               <a:rPr lang="en-US" sz="1400" dirty="0" smtClean="0">
@@ -13101,6 +13117,10 @@
               </a:rPr>
               <a:t>wifi. </a:t>
             </a:r>
+            <a:endParaRPr lang="en-US" sz="1400" dirty="0">
+              <a:latin typeface="Arial" panose="020B0604020202020204" pitchFamily="34" charset="0"/>
+              <a:cs typeface="Arial" panose="020B0604020202020204" pitchFamily="34" charset="0"/>
+            </a:endParaRPr>
           </a:p>
           <a:p>
             <a:pPr marL="285750" lvl="0" indent="-285750">
@@ -13164,6 +13184,10 @@
               </a:rPr>
               <a:t>Ở đề tài, mô hình này đã đạt được những điều cơ bản của hệ thống Blockchain thông thường nhưng thiếu một số bước kiểm soát tính chất hợp lệ của giao dịch.</a:t>
             </a:r>
+            <a:endParaRPr lang="en-US" sz="1400" dirty="0">
+              <a:latin typeface="Arial" panose="020B0604020202020204" pitchFamily="34" charset="0"/>
+              <a:cs typeface="Arial" panose="020B0604020202020204" pitchFamily="34" charset="0"/>
+            </a:endParaRPr>
           </a:p>
           <a:p>
             <a:pPr marL="285750" lvl="0" indent="-285750">
@@ -13190,6 +13214,10 @@
               </a:rPr>
               <a:t>.</a:t>
             </a:r>
+            <a:endParaRPr lang="en-US" sz="1400" dirty="0" smtClean="0">
+              <a:latin typeface="Arial" panose="020B0604020202020204" pitchFamily="34" charset="0"/>
+              <a:cs typeface="Arial" panose="020B0604020202020204" pitchFamily="34" charset="0"/>
+            </a:endParaRPr>
           </a:p>
           <a:p>
             <a:pPr lvl="0">
@@ -13224,6 +13252,16 @@
               </a:rPr>
               <a:t>Các hướng mở rộng sẽ phần lớn nhắm vào hạn chế đã nêu trên như sau :</a:t>
             </a:r>
+            <a:endParaRPr lang="en-US" sz="2400" b="1" dirty="0">
+              <a:solidFill>
+                <a:schemeClr val="accent2">
+                  <a:lumMod val="50000"/>
+                </a:schemeClr>
+              </a:solidFill>
+              <a:latin typeface="Roboto" panose="02000000000000000000" pitchFamily="2" charset="0"/>
+              <a:ea typeface="Roboto" panose="02000000000000000000" pitchFamily="2" charset="0"/>
+              <a:cs typeface="Arial" panose="020B0604020202020204" pitchFamily="34" charset="0"/>
+            </a:endParaRPr>
           </a:p>
           <a:p>
             <a:pPr marL="285750" lvl="0" indent="-285750">
@@ -13243,6 +13281,10 @@
               </a:rPr>
               <a:t>Phát triển thêm hệ thống Blockchain về mặt bảo mật giao dịch bằng chữ kí số hay các giải pháp bảo mật khác ở hiện tại.</a:t>
             </a:r>
+            <a:endParaRPr lang="en-US" sz="1400" dirty="0">
+              <a:latin typeface="Arial" panose="020B0604020202020204" pitchFamily="34" charset="0"/>
+              <a:cs typeface="Arial" panose="020B0604020202020204" pitchFamily="34" charset="0"/>
+            </a:endParaRPr>
           </a:p>
           <a:p>
             <a:pPr marL="285750" lvl="0" indent="-285750">
@@ -13262,6 +13304,10 @@
               </a:rPr>
               <a:t>Đưa nhiều lựa chọn hơn trên giao diện giao tiếp người dùng, cho phép nhiều loại người dùng khác nhau trở thành Miner và trả công qua ví điện tử thật.</a:t>
             </a:r>
+            <a:endParaRPr lang="en-US" sz="1400" dirty="0">
+              <a:latin typeface="Arial" panose="020B0604020202020204" pitchFamily="34" charset="0"/>
+              <a:cs typeface="Arial" panose="020B0604020202020204" pitchFamily="34" charset="0"/>
+            </a:endParaRPr>
           </a:p>
           <a:p>
             <a:pPr marL="285750" lvl="0" indent="-285750">
@@ -13281,6 +13327,10 @@
               </a:rPr>
               <a:t>Giao diện và ứng dụng được áp dụng ở nhiều môi trường khác nhau kể cả điện thoại. </a:t>
             </a:r>
+            <a:endParaRPr lang="en-US" sz="1400" dirty="0">
+              <a:latin typeface="Arial" panose="020B0604020202020204" pitchFamily="34" charset="0"/>
+              <a:cs typeface="Arial" panose="020B0604020202020204" pitchFamily="34" charset="0"/>
+            </a:endParaRPr>
           </a:p>
         </p:txBody>
       </p:sp>
@@ -13661,6 +13711,13 @@
                 </a:rPr>
                 <a:t>YOU</a:t>
               </a:r>
+              <a:endParaRPr lang="en-US" sz="7500" i="1" dirty="0">
+                <a:solidFill>
+                  <a:srgbClr val="CE2127"/>
+                </a:solidFill>
+                <a:latin typeface="Roboto Black" panose="02000000000000000000" pitchFamily="2" charset="0"/>
+                <a:ea typeface="Roboto Black" panose="02000000000000000000" pitchFamily="2" charset="0"/>
+              </a:endParaRPr>
             </a:p>
           </p:txBody>
         </p:sp>
@@ -13776,7 +13833,6 @@
           <a:p>
             <a:fld id="{040DEF24-717E-4741-8753-F7E431A261E5}" type="slidenum">
               <a:rPr lang="en-US" smtClean="0"/>
-              <a:t>16</a:t>
             </a:fld>
             <a:endParaRPr lang="en-US"/>
           </a:p>
@@ -14072,6 +14128,16 @@
               </a:rPr>
               <a:t>Lý thuyết</a:t>
             </a:r>
+            <a:endParaRPr lang="en-US" sz="2400" b="1" dirty="0" smtClean="0">
+              <a:solidFill>
+                <a:schemeClr val="accent2">
+                  <a:lumMod val="50000"/>
+                </a:schemeClr>
+              </a:solidFill>
+              <a:latin typeface="Arial" panose="020B0604020202020204" pitchFamily="34" charset="0"/>
+              <a:ea typeface="Roboto" panose="02000000000000000000" pitchFamily="2" charset="0"/>
+              <a:cs typeface="Arial" panose="020B0604020202020204" pitchFamily="34" charset="0"/>
+            </a:endParaRPr>
           </a:p>
           <a:p>
             <a:pPr>
@@ -14257,6 +14323,10 @@
               </a:rPr>
               <a:t>7</a:t>
             </a:r>
+            <a:endParaRPr lang="en-US" sz="1600" dirty="0">
+              <a:latin typeface="Arial" panose="020B0604020202020204" pitchFamily="34" charset="0"/>
+              <a:cs typeface="Arial" panose="020B0604020202020204" pitchFamily="34" charset="0"/>
+            </a:endParaRPr>
           </a:p>
           <a:p>
             <a:pPr>
@@ -14302,6 +14372,10 @@
               </a:rPr>
               <a:t>8</a:t>
             </a:r>
+            <a:endParaRPr lang="en-US" sz="1600" dirty="0">
+              <a:latin typeface="Arial" panose="020B0604020202020204" pitchFamily="34" charset="0"/>
+              <a:cs typeface="Arial" panose="020B0604020202020204" pitchFamily="34" charset="0"/>
+            </a:endParaRPr>
           </a:p>
         </p:txBody>
       </p:sp>
@@ -14348,6 +14422,16 @@
               </a:rPr>
               <a:t>Thực hành</a:t>
             </a:r>
+            <a:endParaRPr lang="en-US" sz="2400" b="1" dirty="0" smtClean="0">
+              <a:solidFill>
+                <a:schemeClr val="accent2">
+                  <a:lumMod val="50000"/>
+                </a:schemeClr>
+              </a:solidFill>
+              <a:latin typeface="Arial" panose="020B0604020202020204" pitchFamily="34" charset="0"/>
+              <a:ea typeface="Roboto" panose="02000000000000000000" pitchFamily="2" charset="0"/>
+              <a:cs typeface="Arial" panose="020B0604020202020204" pitchFamily="34" charset="0"/>
+            </a:endParaRPr>
           </a:p>
           <a:p>
             <a:pPr>
@@ -14393,6 +14477,10 @@
               </a:rPr>
               <a:t>9</a:t>
             </a:r>
+            <a:endParaRPr lang="en-US" sz="1600" dirty="0">
+              <a:latin typeface="Arial" panose="020B0604020202020204" pitchFamily="34" charset="0"/>
+              <a:cs typeface="Arial" panose="020B0604020202020204" pitchFamily="34" charset="0"/>
+            </a:endParaRPr>
           </a:p>
           <a:p>
             <a:pPr>
@@ -14673,7 +14761,7 @@
                         <p:par>
                           <p:cTn id="16" fill="hold">
                             <p:stCondLst>
-                              <p:cond delay="1100"/>
+                              <p:cond delay="500"/>
                             </p:stCondLst>
                             <p:childTnLst>
                               <p:par>
@@ -14836,7 +14924,7 @@
             <a:r>
               <a:rPr lang="en-US" sz="4000" b="1" spc="50" dirty="0" smtClean="0">
                 <a:blipFill>
-                  <a:blip r:embed="rId2">
+                  <a:blip r:embed="rId1">
                     <a:extLst>
                       <a:ext uri="{28A0092B-C50C-407E-A947-70E740481C1C}">
                         <a14:useLocalDpi xmlns:a14="http://schemas.microsoft.com/office/drawing/2010/main" val="0"/>
@@ -15016,7 +15104,7 @@
           <p:nvPr/>
         </p:nvPicPr>
         <p:blipFill>
-          <a:blip r:embed="rId3">
+          <a:blip r:embed="rId2">
             <a:extLst>
               <a:ext uri="{28A0092B-C50C-407E-A947-70E740481C1C}">
                 <a14:useLocalDpi xmlns:a14="http://schemas.microsoft.com/office/drawing/2010/main" val="0"/>
@@ -15095,6 +15183,10 @@
               </a:rPr>
               <a:t>cryptoms.fr </a:t>
             </a:r>
+            <a:endParaRPr lang="en-US" sz="1600" i="1" dirty="0" smtClean="0">
+              <a:latin typeface="Arial" panose="020B0604020202020204" pitchFamily="34" charset="0"/>
+              <a:cs typeface="Arial" panose="020B0604020202020204" pitchFamily="34" charset="0"/>
+            </a:endParaRPr>
           </a:p>
           <a:p>
             <a:pPr marL="342900" indent="-342900" algn="just">
@@ -15117,6 +15209,13 @@
               </a:rPr>
               <a:t>Máy tính trước khi gửi đi,DNS resolver sẽ kiểm tra domain trong Web cache hoặc DNS cache để trả lại kết quả.</a:t>
             </a:r>
+            <a:endParaRPr lang="en-US" sz="1400" dirty="0" smtClean="0">
+              <a:solidFill>
+                <a:srgbClr val="002060"/>
+              </a:solidFill>
+              <a:latin typeface="Arial" panose="020B0604020202020204" pitchFamily="34" charset="0"/>
+              <a:cs typeface="Arial" panose="020B0604020202020204" pitchFamily="34" charset="0"/>
+            </a:endParaRPr>
           </a:p>
           <a:p>
             <a:pPr marL="342900" lvl="0" indent="-342900" algn="just">
@@ -15139,6 +15238,13 @@
               </a:rPr>
               <a:t>Nếu không có kết quả, DR sẽ hỏi tên miền mức ROOT chỉ cho máy chủ tên miền cục bộ địa chỉ mà nó quản lý có đuôi “.fr”. </a:t>
             </a:r>
+            <a:endParaRPr lang="en-US" sz="1400" dirty="0" smtClean="0">
+              <a:solidFill>
+                <a:srgbClr val="002060"/>
+              </a:solidFill>
+              <a:latin typeface="Arial" panose="020B0604020202020204" pitchFamily="34" charset="0"/>
+              <a:cs typeface="Arial" panose="020B0604020202020204" pitchFamily="34" charset="0"/>
+            </a:endParaRPr>
           </a:p>
           <a:p>
             <a:pPr marL="342900" lvl="0" indent="-342900" algn="just">
@@ -15171,6 +15277,13 @@
               </a:rPr>
               <a:t>gửi yêu cầu đến máy chủ quản lý tên miền Pháp “.fr” tìm tên miền cryptoms.fr. </a:t>
             </a:r>
+            <a:endParaRPr lang="en-US" sz="1400" dirty="0">
+              <a:solidFill>
+                <a:srgbClr val="002060"/>
+              </a:solidFill>
+              <a:latin typeface="Arial" panose="020B0604020202020204" pitchFamily="34" charset="0"/>
+              <a:cs typeface="Arial" panose="020B0604020202020204" pitchFamily="34" charset="0"/>
+            </a:endParaRPr>
           </a:p>
           <a:p>
             <a:pPr marL="342900" lvl="0" indent="-342900" algn="just">
@@ -15260,6 +15373,13 @@
               </a:rPr>
               <a:t>dùng sử dụng địa chỉ IP này kết nối đến server chứa website có địa chỉ “cryptoms.fr”.</a:t>
             </a:r>
+            <a:endParaRPr lang="en-US" sz="1400" b="1" dirty="0">
+              <a:solidFill>
+                <a:srgbClr val="002060"/>
+              </a:solidFill>
+              <a:latin typeface="Arial" panose="020B0604020202020204" pitchFamily="34" charset="0"/>
+              <a:cs typeface="Arial" panose="020B0604020202020204" pitchFamily="34" charset="0"/>
+            </a:endParaRPr>
           </a:p>
           <a:p>
             <a:pPr marL="342900" lvl="0" indent="-342900" algn="just">
@@ -15290,8 +15410,8 @@
         </p:nvSpPr>
         <p:spPr>
           <a:xfrm>
-            <a:off x="7153824" y="6361062"/>
-            <a:ext cx="4334841" cy="276999"/>
+            <a:off x="6854104" y="6404242"/>
+            <a:ext cx="4142105" cy="275590"/>
           </a:xfrm>
           <a:prstGeom prst="rect">
             <a:avLst/>
@@ -15306,13 +15426,23 @@
           <a:p>
             <a:pPr lvl="0"/>
             <a:r>
-              <a:rPr lang="en-US" sz="1200" dirty="0" smtClean="0"/>
+              <a:rPr lang="en-US" sz="1200" dirty="0" smtClean="0">
+                <a:latin typeface="Arial" panose="020B0604020202020204" pitchFamily="34" charset="0"/>
+                <a:cs typeface="Arial" panose="020B0604020202020204" pitchFamily="34" charset="0"/>
+              </a:rPr>
               <a:t>* DNS </a:t>
             </a:r>
             <a:r>
-              <a:rPr lang="en-US" sz="1200" dirty="0"/>
+              <a:rPr lang="en-US" sz="1200" dirty="0">
+                <a:latin typeface="Arial" panose="020B0604020202020204" pitchFamily="34" charset="0"/>
+                <a:cs typeface="Arial" panose="020B0604020202020204" pitchFamily="34" charset="0"/>
+              </a:rPr>
               <a:t>resolver – DR – Máy chủ phân giải tên miền cục bộ </a:t>
             </a:r>
+            <a:endParaRPr lang="en-US" sz="1200" dirty="0">
+              <a:latin typeface="Arial" panose="020B0604020202020204" pitchFamily="34" charset="0"/>
+              <a:cs typeface="Arial" panose="020B0604020202020204" pitchFamily="34" charset="0"/>
+            </a:endParaRPr>
           </a:p>
         </p:txBody>
       </p:sp>
@@ -15353,7 +15483,7 @@
               <p:nvPr/>
             </p:nvPicPr>
             <p:blipFill>
-              <a:blip r:embed="rId4"/>
+              <a:blip r:embed="rId3"/>
               <a:stretch>
                 <a:fillRect/>
               </a:stretch>
@@ -16197,7 +16327,7 @@
             <a:r>
               <a:rPr lang="en-US" sz="4000" b="1" spc="50" dirty="0" smtClean="0">
                 <a:blipFill>
-                  <a:blip r:embed="rId2">
+                  <a:blip r:embed="rId1">
                     <a:extLst>
                       <a:ext uri="{28A0092B-C50C-407E-A947-70E740481C1C}">
                         <a14:useLocalDpi xmlns:a14="http://schemas.microsoft.com/office/drawing/2010/main" val="0"/>
@@ -16211,6 +16341,20 @@
               </a:rPr>
               <a:t>DNS - DOMAIN NAME SYSTEM </a:t>
             </a:r>
+            <a:endParaRPr lang="en-US" sz="4000" b="1" spc="50" dirty="0" smtClean="0">
+              <a:blipFill>
+                <a:blip r:embed="rId1">
+                  <a:extLst>
+                    <a:ext uri="{28A0092B-C50C-407E-A947-70E740481C1C}">
+                      <a14:useLocalDpi xmlns:a14="http://schemas.microsoft.com/office/drawing/2010/main" val="0"/>
+                    </a:ext>
+                  </a:extLst>
+                </a:blip>
+                <a:tile tx="6350" ty="-127000" sx="65000" sy="64000" flip="none" algn="tl"/>
+              </a:blipFill>
+              <a:latin typeface="Times New Roman" panose="02020603050405020304" pitchFamily="18" charset="0"/>
+              <a:cs typeface="Times New Roman" panose="02020603050405020304" pitchFamily="18" charset="0"/>
+            </a:endParaRPr>
           </a:p>
         </p:txBody>
       </p:sp>
@@ -16231,7 +16375,6 @@
           <a:p>
             <a:fld id="{040DEF24-717E-4741-8753-F7E431A261E5}" type="slidenum">
               <a:rPr lang="en-US" smtClean="0"/>
-              <a:t>4</a:t>
             </a:fld>
             <a:endParaRPr lang="en-US" dirty="0"/>
           </a:p>
@@ -16338,7 +16481,7 @@
           <p:nvPr/>
         </p:nvPicPr>
         <p:blipFill>
-          <a:blip r:embed="rId3">
+          <a:blip r:embed="rId2">
             <a:extLst>
               <a:ext uri="{28A0092B-C50C-407E-A947-70E740481C1C}">
                 <a14:useLocalDpi xmlns:a14="http://schemas.microsoft.com/office/drawing/2010/main" val="0"/>
@@ -16578,6 +16721,13 @@
               </a:rPr>
               <a:t>Không cần lưu trữ một dãy IP dài và khó nhớ</a:t>
             </a:r>
+            <a:endParaRPr lang="en-US" sz="1400" b="1" dirty="0">
+              <a:solidFill>
+                <a:schemeClr val="tx1"/>
+              </a:solidFill>
+              <a:latin typeface="Arial" panose="020B0604020202020204" pitchFamily="34" charset="0"/>
+              <a:cs typeface="Arial" panose="020B0604020202020204" pitchFamily="34" charset="0"/>
+            </a:endParaRPr>
           </a:p>
         </p:txBody>
       </p:sp>
@@ -16637,6 +16787,13 @@
               </a:rPr>
               <a:t>Cập nhật danh sách IP dễ dàng</a:t>
             </a:r>
+            <a:endParaRPr lang="en-US" sz="1400" b="1" dirty="0">
+              <a:solidFill>
+                <a:schemeClr val="tx1"/>
+              </a:solidFill>
+              <a:latin typeface="Arial" panose="020B0604020202020204" pitchFamily="34" charset="0"/>
+              <a:cs typeface="Arial" panose="020B0604020202020204" pitchFamily="34" charset="0"/>
+            </a:endParaRPr>
           </a:p>
         </p:txBody>
       </p:sp>
@@ -16696,6 +16853,13 @@
               </a:rPr>
               <a:t>DNS có tốc độ truy cập Internet cao nhất</a:t>
             </a:r>
+            <a:endParaRPr lang="en-US" sz="1400" b="1" dirty="0">
+              <a:solidFill>
+                <a:schemeClr val="tx1"/>
+              </a:solidFill>
+              <a:latin typeface="Arial" panose="020B0604020202020204" pitchFamily="34" charset="0"/>
+              <a:cs typeface="Arial" panose="020B0604020202020204" pitchFamily="34" charset="0"/>
+            </a:endParaRPr>
           </a:p>
         </p:txBody>
       </p:sp>
@@ -16761,6 +16925,13 @@
               </a:rPr>
               <a:t>Kỳ </a:t>
             </a:r>
+            <a:endParaRPr lang="en-US" sz="1400" b="1" dirty="0" smtClean="0">
+              <a:solidFill>
+                <a:schemeClr val="tx1"/>
+              </a:solidFill>
+              <a:latin typeface="Arial" panose="020B0604020202020204" pitchFamily="34" charset="0"/>
+              <a:cs typeface="Arial" panose="020B0604020202020204" pitchFamily="34" charset="0"/>
+            </a:endParaRPr>
           </a:p>
           <a:p>
             <a:pPr algn="ctr"/>
@@ -17092,6 +17263,13 @@
               </a:rPr>
               <a:t>DNS là nguyên nhân chính dẫn đến cuộc tấn công DNS</a:t>
             </a:r>
+            <a:endParaRPr lang="en-US" sz="1400" b="1" dirty="0">
+              <a:solidFill>
+                <a:schemeClr val="tx1"/>
+              </a:solidFill>
+              <a:latin typeface="Arial" panose="020B0604020202020204" pitchFamily="34" charset="0"/>
+              <a:cs typeface="Arial" panose="020B0604020202020204" pitchFamily="34" charset="0"/>
+            </a:endParaRPr>
           </a:p>
         </p:txBody>
       </p:sp>
@@ -18139,7 +18317,6 @@
           <a:p>
             <a:fld id="{040DEF24-717E-4741-8753-F7E431A261E5}" type="slidenum">
               <a:rPr lang="en-US" smtClean="0"/>
-              <a:t>5</a:t>
             </a:fld>
             <a:endParaRPr lang="en-US" dirty="0"/>
           </a:p>
@@ -18222,7 +18399,7 @@
               <a:buNone/>
               <a:defRPr sz="5400" kern="1200" cap="all" baseline="0">
                 <a:blipFill>
-                  <a:blip r:embed="rId2">
+                  <a:blip r:embed="rId1">
                     <a:extLst>
                       <a:ext uri="{28A0092B-C50C-407E-A947-70E740481C1C}">
                         <a14:useLocalDpi xmlns:a14="http://schemas.microsoft.com/office/drawing/2010/main" val="0"/>
@@ -18246,7 +18423,7 @@
             <a:r>
               <a:rPr lang="en-US" sz="4000" b="1" spc="50" dirty="0" smtClean="0">
                 <a:blipFill>
-                  <a:blip r:embed="rId2">
+                  <a:blip r:embed="rId1">
                     <a:extLst>
                       <a:ext uri="{28A0092B-C50C-407E-A947-70E740481C1C}">
                         <a14:useLocalDpi xmlns:a14="http://schemas.microsoft.com/office/drawing/2010/main" val="0"/>
@@ -18260,6 +18437,20 @@
               </a:rPr>
               <a:t>Blockchain</a:t>
             </a:r>
+            <a:endParaRPr lang="en-US" sz="4000" b="1" spc="50" dirty="0" smtClean="0">
+              <a:blipFill>
+                <a:blip r:embed="rId1">
+                  <a:extLst>
+                    <a:ext uri="{28A0092B-C50C-407E-A947-70E740481C1C}">
+                      <a14:useLocalDpi xmlns:a14="http://schemas.microsoft.com/office/drawing/2010/main" val="0"/>
+                    </a:ext>
+                  </a:extLst>
+                </a:blip>
+                <a:tile tx="6350" ty="-127000" sx="65000" sy="64000" flip="none" algn="tl"/>
+              </a:blipFill>
+              <a:latin typeface="Times New Roman" panose="02020603050405020304" pitchFamily="18" charset="0"/>
+              <a:cs typeface="Times New Roman" panose="02020603050405020304" pitchFamily="18" charset="0"/>
+            </a:endParaRPr>
           </a:p>
         </p:txBody>
       </p:sp>
@@ -18361,6 +18552,10 @@
               </a:rPr>
               <a:t>block có hash khối hiện tại và khối trước là 0 và dữ liệu là null </a:t>
             </a:r>
+            <a:endParaRPr lang="en-US" sz="1400" dirty="0" smtClean="0">
+              <a:latin typeface="Arial" panose="020B0604020202020204" pitchFamily="34" charset="0"/>
+              <a:cs typeface="Arial" panose="020B0604020202020204" pitchFamily="34" charset="0"/>
+            </a:endParaRPr>
           </a:p>
         </p:txBody>
       </p:sp>
@@ -18373,7 +18568,7 @@
           <p:nvPr/>
         </p:nvPicPr>
         <p:blipFill>
-          <a:blip r:embed="rId3">
+          <a:blip r:embed="rId2">
             <a:extLst>
               <a:ext uri="{28A0092B-C50C-407E-A947-70E740481C1C}">
                 <a14:useLocalDpi xmlns:a14="http://schemas.microsoft.com/office/drawing/2010/main" val="0"/>
@@ -18621,6 +18816,14 @@
               </a:rPr>
               <a:t> </a:t>
             </a:r>
+            <a:endParaRPr lang="en-US" sz="1400" dirty="0">
+              <a:solidFill>
+                <a:schemeClr val="tx1"/>
+              </a:solidFill>
+              <a:latin typeface="Arial" panose="020B0604020202020204" pitchFamily="34" charset="0"/>
+              <a:ea typeface="Calibri" panose="020F0502020204030204" pitchFamily="34" charset="0"/>
+              <a:cs typeface="Arial" panose="020B0604020202020204" pitchFamily="34" charset="0"/>
+            </a:endParaRPr>
           </a:p>
         </p:txBody>
       </p:sp>
@@ -18690,6 +18893,14 @@
               </a:rPr>
               <a:t>chơi</a:t>
             </a:r>
+            <a:endParaRPr lang="en-US" sz="1400" b="1" dirty="0" smtClean="0">
+              <a:solidFill>
+                <a:schemeClr val="tx1"/>
+              </a:solidFill>
+              <a:latin typeface="Arial" panose="020B0604020202020204" pitchFamily="34" charset="0"/>
+              <a:ea typeface="Calibri" panose="020F0502020204030204" pitchFamily="34" charset="0"/>
+              <a:cs typeface="Arial" panose="020B0604020202020204" pitchFamily="34" charset="0"/>
+            </a:endParaRPr>
           </a:p>
           <a:p>
             <a:pPr lvl="0" algn="ctr"/>
@@ -18771,6 +18982,11 @@
               </a:rPr>
               <a:t> Các thông tin, dữ liệu trong Blockchain được phân tán và an toàn tuyệt đối.</a:t>
             </a:r>
+            <a:endParaRPr lang="en-US" sz="1400" dirty="0">
+              <a:latin typeface="Times New Roman" panose="02020603050405020304" pitchFamily="18" charset="0"/>
+              <a:ea typeface="Calibri" panose="020F0502020204030204" pitchFamily="34" charset="0"/>
+              <a:cs typeface="Times New Roman" panose="02020603050405020304" pitchFamily="18" charset="0"/>
+            </a:endParaRPr>
           </a:p>
         </p:txBody>
       </p:sp>
@@ -18825,6 +19041,11 @@
               </a:rPr>
               <a:t> dữ liệu trong Blockchain không thể sửa (có thể sửa nhưng sẽ để lại dấu vết) và sẽ lưu trữ mãi mãi.</a:t>
             </a:r>
+            <a:endParaRPr lang="en-US" sz="1400" dirty="0">
+              <a:latin typeface="Times New Roman" panose="02020603050405020304" pitchFamily="18" charset="0"/>
+              <a:ea typeface="Calibri" panose="020F0502020204030204" pitchFamily="34" charset="0"/>
+              <a:cs typeface="Times New Roman" panose="02020603050405020304" pitchFamily="18" charset="0"/>
+            </a:endParaRPr>
           </a:p>
         </p:txBody>
       </p:sp>
@@ -18876,6 +19097,11 @@
               </a:rPr>
               <a:t> Ai cũng có thể theo dõi dữ liệu Blockchain đi từ địa chỉ này tới địa chỉ khác và có thể thống kê toàn bộ lịch sử trên địa chỉ đó.</a:t>
             </a:r>
+            <a:endParaRPr lang="en-US" sz="1400" dirty="0">
+              <a:latin typeface="Times New Roman" panose="02020603050405020304" pitchFamily="18" charset="0"/>
+              <a:ea typeface="Calibri" panose="020F0502020204030204" pitchFamily="34" charset="0"/>
+              <a:cs typeface="Times New Roman" panose="02020603050405020304" pitchFamily="18" charset="0"/>
+            </a:endParaRPr>
           </a:p>
         </p:txBody>
       </p:sp>
@@ -18927,6 +19153,11 @@
               </a:rPr>
               <a:t> là hợp đồng kỹ thuật số được nhúng vào đoạn code if-this-then-that (IFTTT), cho phép chúng tự thực thi mà không cần bên thứ ba.</a:t>
             </a:r>
+            <a:endParaRPr lang="en-US" sz="1400" dirty="0">
+              <a:latin typeface="Times New Roman" panose="02020603050405020304" pitchFamily="18" charset="0"/>
+              <a:ea typeface="Calibri" panose="020F0502020204030204" pitchFamily="34" charset="0"/>
+              <a:cs typeface="Times New Roman" panose="02020603050405020304" pitchFamily="18" charset="0"/>
+            </a:endParaRPr>
           </a:p>
         </p:txBody>
       </p:sp>
@@ -19061,6 +19292,7 @@
                 <a:rPr lang="en-US" sz="1200" dirty="0" smtClean="0"/>
                 <a:t>Genesis</a:t>
               </a:r>
+              <a:endParaRPr lang="en-US" sz="1200" dirty="0" smtClean="0"/>
             </a:p>
             <a:p>
               <a:pPr algn="ctr"/>
@@ -19658,11 +19890,6 @@
         </p:sp>
       </p:grpSp>
     </p:spTree>
-    <p:extLst>
-      <p:ext uri="{BB962C8B-B14F-4D97-AF65-F5344CB8AC3E}">
-        <p14:creationId xmlns:p14="http://schemas.microsoft.com/office/powerpoint/2010/main" val="3514610611"/>
-      </p:ext>
-    </p:extLst>
   </p:cSld>
   <p:clrMapOvr>
     <a:masterClrMapping/>
@@ -21165,7 +21392,6 @@
           <a:p>
             <a:fld id="{040DEF24-717E-4741-8753-F7E431A261E5}" type="slidenum">
               <a:rPr lang="en-US" smtClean="0"/>
-              <a:t>6</a:t>
             </a:fld>
             <a:endParaRPr lang="en-US"/>
           </a:p>
@@ -21225,7 +21451,7 @@
           <p:nvPr/>
         </p:nvPicPr>
         <p:blipFill rotWithShape="1">
-          <a:blip r:embed="rId2" cstate="print">
+          <a:blip r:embed="rId1" cstate="print">
             <a:extLst>
               <a:ext uri="{28A0092B-C50C-407E-A947-70E740481C1C}">
                 <a14:useLocalDpi xmlns:a14="http://schemas.microsoft.com/office/drawing/2010/main" val="0"/>
@@ -21233,7 +21459,9 @@
             </a:extLst>
           </a:blip>
           <a:srcRect l="-2540" t="1" r="-3003" b="619"/>
-          <a:stretch/>
+          <a:stretch>
+            <a:fillRect/>
+          </a:stretch>
         </p:blipFill>
         <p:spPr>
           <a:xfrm>
@@ -21258,7 +21486,7 @@
           <p:nvPr/>
         </p:nvPicPr>
         <p:blipFill>
-          <a:blip r:embed="rId3" cstate="print">
+          <a:blip r:embed="rId2" cstate="print">
             <a:extLst>
               <a:ext uri="{28A0092B-C50C-407E-A947-70E740481C1C}">
                 <a14:useLocalDpi xmlns:a14="http://schemas.microsoft.com/office/drawing/2010/main" val="0"/>
@@ -21321,6 +21549,16 @@
               </a:rPr>
               <a:t>Proof of work và Proof of stake</a:t>
             </a:r>
+            <a:endParaRPr lang="en-US" sz="2400" b="1" dirty="0">
+              <a:solidFill>
+                <a:schemeClr val="accent2">
+                  <a:lumMod val="50000"/>
+                </a:schemeClr>
+              </a:solidFill>
+              <a:latin typeface="Arial" panose="020B0604020202020204" pitchFamily="34" charset="0"/>
+              <a:ea typeface="Roboto" panose="02000000000000000000" pitchFamily="2" charset="0"/>
+              <a:cs typeface="Arial" panose="020B0604020202020204" pitchFamily="34" charset="0"/>
+            </a:endParaRPr>
           </a:p>
         </p:txBody>
       </p:sp>
@@ -21491,6 +21729,10 @@
               </a:rPr>
               <a:t>Khuyết điểm: </a:t>
             </a:r>
+            <a:endParaRPr lang="en-US" sz="1400" dirty="0" smtClean="0">
+              <a:latin typeface="Arial" panose="020B0604020202020204" pitchFamily="34" charset="0"/>
+              <a:cs typeface="Arial" panose="020B0604020202020204" pitchFamily="34" charset="0"/>
+            </a:endParaRPr>
           </a:p>
           <a:p>
             <a:pPr marL="285750" indent="-285750" algn="just">
@@ -21504,6 +21746,10 @@
               </a:rPr>
               <a:t>Dễ bị tấn công 51%</a:t>
             </a:r>
+            <a:endParaRPr lang="en-US" sz="1400" dirty="0" smtClean="0">
+              <a:latin typeface="Arial" panose="020B0604020202020204" pitchFamily="34" charset="0"/>
+              <a:cs typeface="Arial" panose="020B0604020202020204" pitchFamily="34" charset="0"/>
+            </a:endParaRPr>
           </a:p>
           <a:p>
             <a:pPr marL="285750" indent="-285750" algn="just">
@@ -21517,6 +21763,10 @@
               </a:rPr>
               <a:t>Hao tổn nhiều điện năng tiêu thụ</a:t>
             </a:r>
+            <a:endParaRPr lang="en-US" sz="1400" dirty="0" smtClean="0">
+              <a:latin typeface="Arial" panose="020B0604020202020204" pitchFamily="34" charset="0"/>
+              <a:cs typeface="Arial" panose="020B0604020202020204" pitchFamily="34" charset="0"/>
+            </a:endParaRPr>
           </a:p>
         </p:txBody>
       </p:sp>
@@ -21550,6 +21800,10 @@
               </a:rPr>
               <a:t>Khuyết điểm: </a:t>
             </a:r>
+            <a:endParaRPr lang="en-US" sz="1400" dirty="0" smtClean="0">
+              <a:latin typeface="Arial" panose="020B0604020202020204" pitchFamily="34" charset="0"/>
+              <a:cs typeface="Arial" panose="020B0604020202020204" pitchFamily="34" charset="0"/>
+            </a:endParaRPr>
           </a:p>
           <a:p>
             <a:pPr marL="285750" indent="-285750" algn="just">
@@ -21563,6 +21817,10 @@
               </a:rPr>
               <a:t>Khi gặp sự cố không mong muốn, sẽ mất phần đặt cọc ( Vd: mất wifi, cúp điện, ... )</a:t>
             </a:r>
+            <a:endParaRPr lang="en-US" sz="1400" dirty="0" smtClean="0">
+              <a:latin typeface="Arial" panose="020B0604020202020204" pitchFamily="34" charset="0"/>
+              <a:cs typeface="Arial" panose="020B0604020202020204" pitchFamily="34" charset="0"/>
+            </a:endParaRPr>
           </a:p>
         </p:txBody>
       </p:sp>
@@ -22057,7 +22315,6 @@
           <a:p>
             <a:fld id="{040DEF24-717E-4741-8753-F7E431A261E5}" type="slidenum">
               <a:rPr lang="en-US" smtClean="0"/>
-              <a:t>7</a:t>
             </a:fld>
             <a:endParaRPr lang="en-US"/>
           </a:p>
@@ -22149,6 +22406,11 @@
               </a:rPr>
               <a:t>Namecoin</a:t>
             </a:r>
+            <a:endParaRPr lang="en-US" sz="1600" b="1" dirty="0">
+              <a:latin typeface="Times New Roman" panose="02020603050405020304" pitchFamily="18" charset="0"/>
+              <a:ea typeface="Calibri" panose="020F0502020204030204" pitchFamily="34" charset="0"/>
+              <a:cs typeface="Times New Roman" panose="02020603050405020304" pitchFamily="18" charset="0"/>
+            </a:endParaRPr>
           </a:p>
           <a:p>
             <a:pPr marL="342900" lvl="0" indent="-342900" algn="just">
@@ -22169,6 +22431,11 @@
               </a:rPr>
               <a:t>Blockstack</a:t>
             </a:r>
+            <a:endParaRPr lang="en-US" sz="1600" b="1" dirty="0">
+              <a:latin typeface="Times New Roman" panose="02020603050405020304" pitchFamily="18" charset="0"/>
+              <a:ea typeface="Calibri" panose="020F0502020204030204" pitchFamily="34" charset="0"/>
+              <a:cs typeface="Times New Roman" panose="02020603050405020304" pitchFamily="18" charset="0"/>
+            </a:endParaRPr>
           </a:p>
           <a:p>
             <a:pPr marL="342900" lvl="0" indent="-342900" algn="just">
@@ -22222,6 +22489,11 @@
               </a:rPr>
               <a:t>Handshake</a:t>
             </a:r>
+            <a:endParaRPr lang="en-US" sz="1600" b="1" dirty="0">
+              <a:latin typeface="Times New Roman" panose="02020603050405020304" pitchFamily="18" charset="0"/>
+              <a:ea typeface="Calibri" panose="020F0502020204030204" pitchFamily="34" charset="0"/>
+              <a:cs typeface="Times New Roman" panose="02020603050405020304" pitchFamily="18" charset="0"/>
+            </a:endParaRPr>
           </a:p>
           <a:p>
             <a:pPr marL="342900" lvl="0" indent="-342900" algn="just">
@@ -22242,6 +22514,11 @@
               </a:rPr>
               <a:t>Nebulis</a:t>
             </a:r>
+            <a:endParaRPr lang="en-US" sz="1600" b="1" dirty="0">
+              <a:latin typeface="Times New Roman" panose="02020603050405020304" pitchFamily="18" charset="0"/>
+              <a:ea typeface="Calibri" panose="020F0502020204030204" pitchFamily="34" charset="0"/>
+              <a:cs typeface="Times New Roman" panose="02020603050405020304" pitchFamily="18" charset="0"/>
+            </a:endParaRPr>
           </a:p>
           <a:p>
             <a:pPr marL="342900" lvl="0" indent="-342900" algn="just">
@@ -22262,6 +22539,11 @@
               </a:rPr>
               <a:t>Dot BIT</a:t>
             </a:r>
+            <a:endParaRPr lang="en-US" sz="1600" b="1" dirty="0">
+              <a:latin typeface="Times New Roman" panose="02020603050405020304" pitchFamily="18" charset="0"/>
+              <a:ea typeface="Calibri" panose="020F0502020204030204" pitchFamily="34" charset="0"/>
+              <a:cs typeface="Times New Roman" panose="02020603050405020304" pitchFamily="18" charset="0"/>
+            </a:endParaRPr>
           </a:p>
           <a:p>
             <a:pPr marL="342900" lvl="0" indent="-342900" algn="just">
@@ -22282,6 +22564,11 @@
               </a:rPr>
               <a:t>Emercoin DNS</a:t>
             </a:r>
+            <a:endParaRPr lang="en-US" sz="1600" b="1" dirty="0">
+              <a:latin typeface="Times New Roman" panose="02020603050405020304" pitchFamily="18" charset="0"/>
+              <a:ea typeface="Calibri" panose="020F0502020204030204" pitchFamily="34" charset="0"/>
+              <a:cs typeface="Times New Roman" panose="02020603050405020304" pitchFamily="18" charset="0"/>
+            </a:endParaRPr>
           </a:p>
           <a:p>
             <a:pPr marL="342900" lvl="0" indent="-342900" algn="just">
@@ -22302,6 +22589,11 @@
               </a:rPr>
               <a:t>PeerName</a:t>
             </a:r>
+            <a:endParaRPr lang="en-US" sz="1600" b="1" dirty="0">
+              <a:latin typeface="Times New Roman" panose="02020603050405020304" pitchFamily="18" charset="0"/>
+              <a:ea typeface="Calibri" panose="020F0502020204030204" pitchFamily="34" charset="0"/>
+              <a:cs typeface="Times New Roman" panose="02020603050405020304" pitchFamily="18" charset="0"/>
+            </a:endParaRPr>
           </a:p>
           <a:p>
             <a:pPr marL="342900" lvl="0" indent="-342900" algn="just">
@@ -22322,6 +22614,11 @@
               </a:rPr>
               <a:t>Blockchain DNS for Firefox</a:t>
             </a:r>
+            <a:endParaRPr lang="en-US" sz="1600" b="1" dirty="0">
+              <a:latin typeface="Times New Roman" panose="02020603050405020304" pitchFamily="18" charset="0"/>
+              <a:ea typeface="Calibri" panose="020F0502020204030204" pitchFamily="34" charset="0"/>
+              <a:cs typeface="Times New Roman" panose="02020603050405020304" pitchFamily="18" charset="0"/>
+            </a:endParaRPr>
           </a:p>
           <a:p>
             <a:pPr marL="342900" lvl="0" indent="-342900" algn="just">
@@ -22342,6 +22639,11 @@
               </a:rPr>
               <a:t>FrigGate for Chrome and other browsers</a:t>
             </a:r>
+            <a:endParaRPr lang="en-US" sz="1600" b="1" dirty="0">
+              <a:latin typeface="Times New Roman" panose="02020603050405020304" pitchFamily="18" charset="0"/>
+              <a:ea typeface="Calibri" panose="020F0502020204030204" pitchFamily="34" charset="0"/>
+              <a:cs typeface="Times New Roman" panose="02020603050405020304" pitchFamily="18" charset="0"/>
+            </a:endParaRPr>
           </a:p>
           <a:p>
             <a:pPr marL="342900" lvl="0" indent="-342900" algn="just">
@@ -22362,6 +22664,11 @@
               </a:rPr>
               <a:t>NEM Blockchain DNS extension</a:t>
             </a:r>
+            <a:endParaRPr lang="en-US" sz="1600" b="1" dirty="0">
+              <a:latin typeface="Times New Roman" panose="02020603050405020304" pitchFamily="18" charset="0"/>
+              <a:ea typeface="Calibri" panose="020F0502020204030204" pitchFamily="34" charset="0"/>
+              <a:cs typeface="Times New Roman" panose="02020603050405020304" pitchFamily="18" charset="0"/>
+            </a:endParaRPr>
           </a:p>
           <a:p>
             <a:pPr marL="342900" lvl="0" indent="-342900" algn="just">
@@ -22382,6 +22689,11 @@
               </a:rPr>
               <a:t>Unstoppable Domains</a:t>
             </a:r>
+            <a:endParaRPr lang="en-US" sz="1600" b="1" dirty="0">
+              <a:latin typeface="Times New Roman" panose="02020603050405020304" pitchFamily="18" charset="0"/>
+              <a:ea typeface="Calibri" panose="020F0502020204030204" pitchFamily="34" charset="0"/>
+              <a:cs typeface="Times New Roman" panose="02020603050405020304" pitchFamily="18" charset="0"/>
+            </a:endParaRPr>
           </a:p>
           <a:p>
             <a:pPr marL="342900" lvl="0" indent="-342900" algn="just">
@@ -22402,6 +22714,11 @@
               </a:rPr>
               <a:t>Aloaha Blockchain DNS</a:t>
             </a:r>
+            <a:endParaRPr lang="en-US" sz="1600" b="1" dirty="0">
+              <a:latin typeface="Times New Roman" panose="02020603050405020304" pitchFamily="18" charset="0"/>
+              <a:ea typeface="Calibri" panose="020F0502020204030204" pitchFamily="34" charset="0"/>
+              <a:cs typeface="Times New Roman" panose="02020603050405020304" pitchFamily="18" charset="0"/>
+            </a:endParaRPr>
           </a:p>
         </p:txBody>
       </p:sp>
@@ -22433,11 +22750,7 @@
           </a:extLst>
         </p:spPr>
         <p:txBody>
-          <a:bodyPr vert="horz" wrap="square" lIns="91440" tIns="45720" rIns="91440" bIns="45720" numCol="1" anchor="t" anchorCtr="0" compatLnSpc="1">
-            <a:prstTxWarp prst="textNoShape">
-              <a:avLst/>
-            </a:prstTxWarp>
-          </a:bodyPr>
+          <a:bodyPr vert="horz" wrap="square" lIns="91440" tIns="45720" rIns="91440" bIns="45720" numCol="1" anchor="t" anchorCtr="0" compatLnSpc="1"/>
           <a:lstStyle/>
           <a:p>
             <a:endParaRPr lang="en-US"/>
@@ -22453,7 +22766,7 @@
           <p:nvPr/>
         </p:nvPicPr>
         <p:blipFill>
-          <a:blip r:embed="rId2">
+          <a:blip r:embed="rId1">
             <a:extLst>
               <a:ext uri="{28A0092B-C50C-407E-A947-70E740481C1C}">
                 <a14:useLocalDpi xmlns:a14="http://schemas.microsoft.com/office/drawing/2010/main" val="0"/>
@@ -22494,7 +22807,7 @@
           <p:nvPr/>
         </p:nvPicPr>
         <p:blipFill>
-          <a:blip r:embed="rId3" cstate="print">
+          <a:blip r:embed="rId2" cstate="print">
             <a:extLst>
               <a:ext uri="{28A0092B-C50C-407E-A947-70E740481C1C}">
                 <a14:useLocalDpi xmlns:a14="http://schemas.microsoft.com/office/drawing/2010/main" val="0"/>
@@ -22535,7 +22848,7 @@
           <p:nvPr/>
         </p:nvPicPr>
         <p:blipFill>
-          <a:blip r:embed="rId4" cstate="print">
+          <a:blip r:embed="rId3" cstate="print">
             <a:extLst>
               <a:ext uri="{28A0092B-C50C-407E-A947-70E740481C1C}">
                 <a14:useLocalDpi xmlns:a14="http://schemas.microsoft.com/office/drawing/2010/main" val="0"/>
@@ -22652,6 +22965,10 @@
               </a:rPr>
               <a:t>://www.softwaretestinghelp.com/best-blockchain-dns-software/</a:t>
             </a:r>
+            <a:endParaRPr lang="en-US" sz="1100" dirty="0">
+              <a:latin typeface="Arial" panose="020B0604020202020204" pitchFamily="34" charset="0"/>
+              <a:cs typeface="Arial" panose="020B0604020202020204" pitchFamily="34" charset="0"/>
+            </a:endParaRPr>
           </a:p>
         </p:txBody>
       </p:sp>
@@ -22690,15 +23007,20 @@
               </a:rPr>
               <a:t>Danh sách xếp hạng 13 phần mềm DNS Blockchain </a:t>
             </a:r>
+            <a:endParaRPr lang="en-US" sz="2400" b="1" dirty="0">
+              <a:solidFill>
+                <a:schemeClr val="accent2">
+                  <a:lumMod val="50000"/>
+                </a:schemeClr>
+              </a:solidFill>
+              <a:latin typeface="Arial" panose="020B0604020202020204" pitchFamily="34" charset="0"/>
+              <a:ea typeface="Roboto" panose="02000000000000000000" pitchFamily="2" charset="0"/>
+              <a:cs typeface="Arial" panose="020B0604020202020204" pitchFamily="34" charset="0"/>
+            </a:endParaRPr>
           </a:p>
         </p:txBody>
       </p:sp>
     </p:spTree>
-    <p:extLst>
-      <p:ext uri="{BB962C8B-B14F-4D97-AF65-F5344CB8AC3E}">
-        <p14:creationId xmlns:p14="http://schemas.microsoft.com/office/powerpoint/2010/main" val="2145206009"/>
-      </p:ext>
-    </p:extLst>
   </p:cSld>
   <p:clrMapOvr>
     <a:masterClrMapping/>
@@ -23125,7 +23447,7 @@
             <a:r>
               <a:rPr lang="en-US" sz="4000" b="1" spc="50" dirty="0" smtClean="0">
                 <a:blipFill>
-                  <a:blip r:embed="rId2">
+                  <a:blip r:embed="rId1">
                     <a:extLst>
                       <a:ext uri="{28A0092B-C50C-407E-A947-70E740481C1C}">
                         <a14:useLocalDpi xmlns:a14="http://schemas.microsoft.com/office/drawing/2010/main" val="0"/>
@@ -23164,7 +23486,6 @@
           <a:p>
             <a:fld id="{040DEF24-717E-4741-8753-F7E431A261E5}" type="slidenum">
               <a:rPr lang="en-US" smtClean="0"/>
-              <a:t>8</a:t>
             </a:fld>
             <a:endParaRPr lang="en-US"/>
           </a:p>
@@ -23177,7 +23498,7 @@
           <p:nvPr/>
         </p:nvPicPr>
         <p:blipFill>
-          <a:blip r:embed="rId3"/>
+          <a:blip r:embed="rId2"/>
           <a:stretch>
             <a:fillRect/>
           </a:stretch>
@@ -23329,6 +23650,11 @@
               </a:rPr>
               <a:t>Data Access: </a:t>
             </a:r>
+            <a:endParaRPr lang="en-US" sz="1400" b="1" dirty="0" smtClean="0">
+              <a:latin typeface="Arial" panose="020B0604020202020204" pitchFamily="34" charset="0"/>
+              <a:ea typeface="Calibri" panose="020F0502020204030204" pitchFamily="34" charset="0"/>
+              <a:cs typeface="Arial" panose="020B0604020202020204" pitchFamily="34" charset="0"/>
+            </a:endParaRPr>
           </a:p>
         </p:txBody>
       </p:sp>
@@ -23393,6 +23719,11 @@
               </a:rPr>
               <a:t>Center ( DSC ) đóng vai trò hạn chế kiểm tra dữ liệu đầu vào trùng lặp hoặc không hợp lệ</a:t>
             </a:r>
+            <a:endParaRPr lang="en-US" sz="1400" dirty="0" smtClean="0">
+              <a:latin typeface="Arial" panose="020B0604020202020204" pitchFamily="34" charset="0"/>
+              <a:ea typeface="Calibri" panose="020F0502020204030204" pitchFamily="34" charset="0"/>
+              <a:cs typeface="Arial" panose="020B0604020202020204" pitchFamily="34" charset="0"/>
+            </a:endParaRPr>
           </a:p>
           <a:p>
             <a:pPr marL="342900" lvl="0" indent="-342900" algn="just">
@@ -23453,6 +23784,11 @@
               </a:rPr>
               <a:t>sinh. </a:t>
             </a:r>
+            <a:endParaRPr lang="en-US" sz="1400" dirty="0" smtClean="0">
+              <a:latin typeface="Arial" panose="020B0604020202020204" pitchFamily="34" charset="0"/>
+              <a:ea typeface="Calibri" panose="020F0502020204030204" pitchFamily="34" charset="0"/>
+              <a:cs typeface="Arial" panose="020B0604020202020204" pitchFamily="34" charset="0"/>
+            </a:endParaRPr>
           </a:p>
         </p:txBody>
       </p:sp>
@@ -23544,6 +23880,11 @@
               </a:rPr>
               <a:t>Blockchain lưu trữ những dữ liệu tên miền đã được đồng bộ hóa. </a:t>
             </a:r>
+            <a:endParaRPr lang="en-US" sz="1400" dirty="0">
+              <a:latin typeface="Arial" panose="020B0604020202020204" pitchFamily="34" charset="0"/>
+              <a:ea typeface="Calibri" panose="020F0502020204030204" pitchFamily="34" charset="0"/>
+              <a:cs typeface="Arial" panose="020B0604020202020204" pitchFamily="34" charset="0"/>
+            </a:endParaRPr>
           </a:p>
         </p:txBody>
       </p:sp>
@@ -23701,6 +24042,16 @@
               </a:rPr>
               <a:t>Giai đoạn tương tác</a:t>
             </a:r>
+            <a:endParaRPr lang="en-US" sz="1400" b="1" dirty="0">
+              <a:solidFill>
+                <a:schemeClr val="accent2">
+                  <a:lumMod val="50000"/>
+                </a:schemeClr>
+              </a:solidFill>
+              <a:latin typeface="Arial" panose="020B0604020202020204" pitchFamily="34" charset="0"/>
+              <a:ea typeface="Roboto" panose="02000000000000000000" pitchFamily="2" charset="0"/>
+              <a:cs typeface="Arial" panose="020B0604020202020204" pitchFamily="34" charset="0"/>
+            </a:endParaRPr>
           </a:p>
         </p:txBody>
       </p:sp>
@@ -23784,6 +24135,11 @@
               </a:rPr>
               <a:t>chỉ định theo một lựa chọn nào đó ( ở ví dụ sẽ là quốc gia ) nhờ đó có thể áp dụng phân quyền tạo nên một Permissioned Blockchain ( kết hợp giữa Public và Private ).</a:t>
             </a:r>
+            <a:endParaRPr lang="en-US" sz="1400" dirty="0">
+              <a:latin typeface="Arial" panose="020B0604020202020204" pitchFamily="34" charset="0"/>
+              <a:ea typeface="Calibri" panose="020F0502020204030204" pitchFamily="34" charset="0"/>
+              <a:cs typeface="Arial" panose="020B0604020202020204" pitchFamily="34" charset="0"/>
+            </a:endParaRPr>
           </a:p>
           <a:p>
             <a:pPr marL="342900" lvl="0" indent="-342900" algn="just">
@@ -23804,6 +24160,11 @@
               </a:rPr>
               <a:t>Giai đoạn cuối cùng là Data Access, là nơi tiếp nhận thông tin của các người dùng và trực tiếp trả về kết quả thông qua việc xử lý thông tin ở TLDChain.</a:t>
             </a:r>
+            <a:endParaRPr lang="en-US" sz="1400" dirty="0">
+              <a:latin typeface="Arial" panose="020B0604020202020204" pitchFamily="34" charset="0"/>
+              <a:ea typeface="Calibri" panose="020F0502020204030204" pitchFamily="34" charset="0"/>
+              <a:cs typeface="Arial" panose="020B0604020202020204" pitchFamily="34" charset="0"/>
+            </a:endParaRPr>
           </a:p>
         </p:txBody>
       </p:sp>
@@ -23844,6 +24205,11 @@
               </a:rPr>
               <a:t>Data Publish:</a:t>
             </a:r>
+            <a:endParaRPr lang="en-US" sz="1400" b="1" dirty="0">
+              <a:latin typeface="Arial" panose="020B0604020202020204" pitchFamily="34" charset="0"/>
+              <a:ea typeface="Calibri" panose="020F0502020204030204" pitchFamily="34" charset="0"/>
+              <a:cs typeface="Arial" panose="020B0604020202020204" pitchFamily="34" charset="0"/>
+            </a:endParaRPr>
           </a:p>
         </p:txBody>
       </p:sp>
@@ -24503,7 +24869,7 @@
             <a:r>
               <a:rPr lang="en-US" sz="4000" b="1" spc="50" dirty="0" smtClean="0">
                 <a:blipFill>
-                  <a:blip r:embed="rId2">
+                  <a:blip r:embed="rId1">
                     <a:extLst>
                       <a:ext uri="{28A0092B-C50C-407E-A947-70E740481C1C}">
                         <a14:useLocalDpi xmlns:a14="http://schemas.microsoft.com/office/drawing/2010/main" val="0"/>
@@ -24542,7 +24908,6 @@
           <a:p>
             <a:fld id="{040DEF24-717E-4741-8753-F7E431A261E5}" type="slidenum">
               <a:rPr lang="en-US" smtClean="0"/>
-              <a:t>9</a:t>
             </a:fld>
             <a:endParaRPr lang="en-US"/>
           </a:p>
@@ -24602,7 +24967,7 @@
           <p:nvPr/>
         </p:nvPicPr>
         <p:blipFill>
-          <a:blip r:embed="rId3"/>
+          <a:blip r:embed="rId2"/>
           <a:stretch>
             <a:fillRect/>
           </a:stretch>
@@ -24648,7 +25013,7 @@
           </a:bodyPr>
           <a:lstStyle/>
           <a:p>
-            <a:pPr>
+            <a:pPr algn="l">
               <a:lnSpc>
                 <a:spcPct val="125000"/>
               </a:lnSpc>
@@ -24769,7 +25134,7 @@
           </a:bodyPr>
           <a:lstStyle/>
           <a:p>
-            <a:pPr algn="just">
+            <a:pPr algn="l">
               <a:lnSpc>
                 <a:spcPct val="114000"/>
               </a:lnSpc>
@@ -24795,9 +25160,13 @@
               </a:rPr>
               <a:t>thống DNS Blockchain trực tiếp kiểm tra dãy Blocks hiện tại có đáp ứng điều kiện hay không theo 2 trường hợp như sau: </a:t>
             </a:r>
-          </a:p>
-          <a:p>
-            <a:pPr marL="285750" indent="-285750">
+            <a:endParaRPr lang="vi-VN" sz="1400" dirty="0">
+              <a:latin typeface="Arial" panose="020B0604020202020204" pitchFamily="34" charset="0"/>
+              <a:cs typeface="Arial" panose="020B0604020202020204" pitchFamily="34" charset="0"/>
+            </a:endParaRPr>
+          </a:p>
+          <a:p>
+            <a:pPr marL="285750" indent="-285750" algn="l">
               <a:lnSpc>
                 <a:spcPct val="114000"/>
               </a:lnSpc>
@@ -24818,9 +25187,13 @@
               </a:rPr>
               <a:t>( Đ ): Sử dụng các khối Blocks đó để khởi tạo Blockchain và tiếp tục mở rộng nhằm tạo blockchain dài nhất.</a:t>
             </a:r>
-          </a:p>
-          <a:p>
-            <a:pPr marL="285750" indent="-285750">
+            <a:endParaRPr lang="vi-VN" sz="1400" dirty="0">
+              <a:latin typeface="Arial" panose="020B0604020202020204" pitchFamily="34" charset="0"/>
+              <a:cs typeface="Arial" panose="020B0604020202020204" pitchFamily="34" charset="0"/>
+            </a:endParaRPr>
+          </a:p>
+          <a:p>
+            <a:pPr marL="285750" indent="-285750" algn="l">
               <a:lnSpc>
                 <a:spcPct val="114000"/>
               </a:lnSpc>
@@ -24881,7 +25254,7 @@
           </a:bodyPr>
           <a:lstStyle/>
           <a:p>
-            <a:pPr>
+            <a:pPr algn="l">
               <a:lnSpc>
                 <a:spcPct val="114000"/>
               </a:lnSpc>
@@ -24924,7 +25297,7 @@
           </a:bodyPr>
           <a:lstStyle/>
           <a:p>
-            <a:pPr>
+            <a:pPr algn="l">
               <a:lnSpc>
                 <a:spcPct val="114000"/>
               </a:lnSpc>
@@ -24976,7 +25349,7 @@
           </a:bodyPr>
           <a:lstStyle/>
           <a:p>
-            <a:pPr algn="just">
+            <a:pPr algn="l">
               <a:lnSpc>
                 <a:spcPct val="114000"/>
               </a:lnSpc>
@@ -25037,9 +25410,13 @@
               </a:rPr>
               <a:t>sau: </a:t>
             </a:r>
-          </a:p>
-          <a:p>
-            <a:pPr marL="285750" indent="-285750">
+            <a:endParaRPr lang="vi-VN" sz="1400" dirty="0">
+              <a:latin typeface="Arial" panose="020B0604020202020204" pitchFamily="34" charset="0"/>
+              <a:cs typeface="Arial" panose="020B0604020202020204" pitchFamily="34" charset="0"/>
+            </a:endParaRPr>
+          </a:p>
+          <a:p>
+            <a:pPr marL="285750" indent="-285750" algn="l">
               <a:lnSpc>
                 <a:spcPct val="114000"/>
               </a:lnSpc>
@@ -25053,9 +25430,13 @@
               </a:rPr>
               <a:t>Đúng ( Đ ) : Thêm vào bộ nhớ đệm Transaction và phát động thuật toán Proof of Work cho các nodes tạo số Nonce cho Block mới. </a:t>
             </a:r>
-          </a:p>
-          <a:p>
-            <a:pPr marL="285750" indent="-285750">
+            <a:endParaRPr lang="vi-VN" sz="1400" dirty="0">
+              <a:latin typeface="Arial" panose="020B0604020202020204" pitchFamily="34" charset="0"/>
+              <a:cs typeface="Arial" panose="020B0604020202020204" pitchFamily="34" charset="0"/>
+            </a:endParaRPr>
+          </a:p>
+          <a:p>
+            <a:pPr marL="285750" indent="-285750" algn="l">
               <a:lnSpc>
                 <a:spcPct val="114000"/>
               </a:lnSpc>
@@ -25102,7 +25483,7 @@
           </a:bodyPr>
           <a:lstStyle/>
           <a:p>
-            <a:pPr>
+            <a:pPr algn="l">
               <a:lnSpc>
                 <a:spcPct val="125000"/>
               </a:lnSpc>
@@ -25154,7 +25535,7 @@
           </a:bodyPr>
           <a:lstStyle/>
           <a:p>
-            <a:pPr>
+            <a:pPr algn="l">
               <a:lnSpc>
                 <a:spcPct val="125000"/>
               </a:lnSpc>
@@ -25166,15 +25547,14 @@
               </a:rPr>
               <a:t>7. Hệ thống trước khi tắt sẽ tính toán blockchain dài nhất, xác thực blockchain và gửi lên cho các nodes để cập nhật. </a:t>
             </a:r>
+            <a:endParaRPr lang="vi-VN" sz="1400" dirty="0">
+              <a:latin typeface="Arial" panose="020B0604020202020204" pitchFamily="34" charset="0"/>
+              <a:cs typeface="Arial" panose="020B0604020202020204" pitchFamily="34" charset="0"/>
+            </a:endParaRPr>
           </a:p>
         </p:txBody>
       </p:sp>
     </p:spTree>
-    <p:extLst>
-      <p:ext uri="{BB962C8B-B14F-4D97-AF65-F5344CB8AC3E}">
-        <p14:creationId xmlns:p14="http://schemas.microsoft.com/office/powerpoint/2010/main" val="3128187166"/>
-      </p:ext>
-    </p:extLst>
   </p:cSld>
   <p:clrMapOvr>
     <a:masterClrMapping/>
@@ -25676,7 +26056,7 @@
     </a:clrScheme>
     <a:fontScheme name="Wood Type">
       <a:majorFont>
-        <a:latin typeface="Rockwell Condensed" panose="02060603050405020104"/>
+        <a:latin typeface="Rockwell Condensed"/>
         <a:ea typeface=""/>
         <a:cs typeface=""/>
         <a:font script="Grek" typeface="Cambria"/>
@@ -25712,7 +26092,7 @@
         <a:font script="Uigh" typeface="Microsoft Uighur"/>
       </a:majorFont>
       <a:minorFont>
-        <a:latin typeface="Rockwell" panose="02060603020205020403"/>
+        <a:latin typeface="Rockwell"/>
         <a:ea typeface=""/>
         <a:cs typeface=""/>
         <a:font script="Grek" typeface="Cambria"/>
@@ -25852,11 +26232,9 @@
       </a:bgFillStyleLst>
     </a:fmtScheme>
   </a:themeElements>
-  <a:objectDefaults/>
-  <a:extraClrSchemeLst/>
   <a:extLst>
     <a:ext uri="{05A4C25C-085E-4340-85A3-A5531E510DB2}">
-      <thm15:themeFamily xmlns:thm15="http://schemas.microsoft.com/office/thememl/2012/main" name="Wood Type" id="{7ACABC62-BF99-48CF-A9DC-4DB89C7B13DC}" vid="{142A1326-48AB-42A9-8428-CB14AA30176D}"/>
+      <thm15:themeFamily xmlns:thm15="http://schemas.microsoft.com/office/thememl/2012/main" name="Office Theme" id="{62F939B6-93AF-4DB8-9C6B-D6C7DFDC589F}" vid="{4A3C46E8-61CC-4603-A589-7422A47A8E4A}"/>
     </a:ext>
   </a:extLst>
 </a:theme>
@@ -26113,8 +26491,6 @@
       </a:bgFillStyleLst>
     </a:fmtScheme>
   </a:themeElements>
-  <a:objectDefaults/>
-  <a:extraClrSchemeLst/>
   <a:extLst>
     <a:ext uri="{05A4C25C-085E-4340-85A3-A5531E510DB2}">
       <thm15:themeFamily xmlns:thm15="http://schemas.microsoft.com/office/thememl/2012/main" name="Office Theme" id="{62F939B6-93AF-4DB8-9C6B-D6C7DFDC589F}" vid="{4A3C46E8-61CC-4603-A589-7422A47A8E4A}"/>

</xml_diff>